<commit_message>
Quick update to pptx to reflect new location of source
Signed-off-by: Kevin Putnam <kevin.putnam@gmail.com>
</commit_message>
<xml_diff>
--- a/_downloads/rest-sphinx-for-open-source.pptx
+++ b/_downloads/rest-sphinx-for-open-source.pptx
@@ -14133,23 +14133,17 @@
               <a:buNone/>
             </a:pPr>
             <a:r>
-              <a:rPr b="0" i="0" lang="en-US" sz="1800" u="sng" cap="none" strike="noStrike">
+              <a:rPr lang="en-US" sz="1800" u="sng">
                 <a:solidFill>
-                  <a:schemeClr val="dk1"/>
+                  <a:schemeClr val="hlink"/>
                 </a:solidFill>
                 <a:latin typeface="Calibri"/>
                 <a:ea typeface="Calibri"/>
                 <a:cs typeface="Calibri"/>
                 <a:sym typeface="Calibri"/>
-                <a:hlinkClick r:id="rId3">
-                  <a:extLst>
-                    <a:ext uri="{A12FA001-AC4F-418D-AE19-62706E023703}">
-                      <ahyp:hlinkClr val="tx"/>
-                    </a:ext>
-                  </a:extLst>
-                </a:hlinkClick>
+                <a:hlinkClick r:id="rId3"/>
               </a:rPr>
-              <a:t>https://raw.githubusercontent.com/intelkevinputnam/tech-writing-school/main/ktp-adv.rst</a:t>
+              <a:t>https://raw.githubusercontent.com/kevinputnam/tech-writing-school/main/ktp-adv.rst</a:t>
             </a:r>
             <a:endParaRPr sz="1800">
               <a:solidFill>
@@ -16788,6 +16782,285 @@
 </file>
 
 <file path=ppt/theme/theme1.xml><?xml version="1.0" encoding="utf-8"?>
+<a:theme xmlns:a="http://schemas.openxmlformats.org/drawingml/2006/main" xmlns:r="http://schemas.openxmlformats.org/officeDocument/2006/relationships">
+  <a:themeElements>
+    <a:clrScheme name="Default">
+      <a:dk1>
+        <a:srgbClr val="000000"/>
+      </a:dk1>
+      <a:lt1>
+        <a:srgbClr val="FFFFFF"/>
+      </a:lt1>
+      <a:dk2>
+        <a:srgbClr val="158158"/>
+      </a:dk2>
+      <a:lt2>
+        <a:srgbClr val="F3F3F3"/>
+      </a:lt2>
+      <a:accent1>
+        <a:srgbClr val="058DC7"/>
+      </a:accent1>
+      <a:accent2>
+        <a:srgbClr val="50B432"/>
+      </a:accent2>
+      <a:accent3>
+        <a:srgbClr val="ED561B"/>
+      </a:accent3>
+      <a:accent4>
+        <a:srgbClr val="EDEF00"/>
+      </a:accent4>
+      <a:accent5>
+        <a:srgbClr val="24CBE5"/>
+      </a:accent5>
+      <a:accent6>
+        <a:srgbClr val="64E572"/>
+      </a:accent6>
+      <a:hlink>
+        <a:srgbClr val="2200CC"/>
+      </a:hlink>
+      <a:folHlink>
+        <a:srgbClr val="551A8B"/>
+      </a:folHlink>
+    </a:clrScheme>
+    <a:fontScheme name="Office">
+      <a:majorFont>
+        <a:latin typeface="Arial"/>
+        <a:ea typeface=""/>
+        <a:cs typeface=""/>
+        <a:font script="Jpan" typeface="ＭＳ Ｐゴシック"/>
+        <a:font script="Hang" typeface="맑은 고딕"/>
+        <a:font script="Hans" typeface="宋体"/>
+        <a:font script="Hant" typeface="新細明體"/>
+        <a:font script="Arab" typeface="Times New Roman"/>
+        <a:font script="Hebr" typeface="Times New Roman"/>
+        <a:font script="Thai" typeface="Angsana New"/>
+        <a:font script="Ethi" typeface="Nyala"/>
+        <a:font script="Beng" typeface="Vrinda"/>
+        <a:font script="Gujr" typeface="Shruti"/>
+        <a:font script="Khmr" typeface="MoolBoran"/>
+        <a:font script="Knda" typeface="Tunga"/>
+        <a:font script="Guru" typeface="Raavi"/>
+        <a:font script="Cans" typeface="Euphemia"/>
+        <a:font script="Cher" typeface="Plantagenet Cherokee"/>
+        <a:font script="Yiii" typeface="Microsoft Yi Baiti"/>
+        <a:font script="Tibt" typeface="Microsoft Himalaya"/>
+        <a:font script="Thaa" typeface="MV Boli"/>
+        <a:font script="Deva" typeface="Mangal"/>
+        <a:font script="Telu" typeface="Gautami"/>
+        <a:font script="Taml" typeface="Latha"/>
+        <a:font script="Syrc" typeface="Estrangelo Edessa"/>
+        <a:font script="Orya" typeface="Kalinga"/>
+        <a:font script="Mlym" typeface="Kartika"/>
+        <a:font script="Laoo" typeface="DokChampa"/>
+        <a:font script="Sinh" typeface="Iskoola Pota"/>
+        <a:font script="Mong" typeface="Mongolian Baiti"/>
+        <a:font script="Viet" typeface="Times New Roman"/>
+        <a:font script="Uigh" typeface="Microsoft Uighur"/>
+        <a:font script="Geor" typeface="Sylfaen"/>
+      </a:majorFont>
+      <a:minorFont>
+        <a:latin typeface="Arial"/>
+        <a:ea typeface=""/>
+        <a:cs typeface=""/>
+        <a:font script="Jpan" typeface="ＭＳ Ｐゴシック"/>
+        <a:font script="Hang" typeface="맑은 고딕"/>
+        <a:font script="Hans" typeface="宋体"/>
+        <a:font script="Hant" typeface="新細明體"/>
+        <a:font script="Arab" typeface="Arial"/>
+        <a:font script="Hebr" typeface="Arial"/>
+        <a:font script="Thai" typeface="Cordia New"/>
+        <a:font script="Ethi" typeface="Nyala"/>
+        <a:font script="Beng" typeface="Vrinda"/>
+        <a:font script="Gujr" typeface="Shruti"/>
+        <a:font script="Khmr" typeface="DaunPenh"/>
+        <a:font script="Knda" typeface="Tunga"/>
+        <a:font script="Guru" typeface="Raavi"/>
+        <a:font script="Cans" typeface="Euphemia"/>
+        <a:font script="Cher" typeface="Plantagenet Cherokee"/>
+        <a:font script="Yiii" typeface="Microsoft Yi Baiti"/>
+        <a:font script="Tibt" typeface="Microsoft Himalaya"/>
+        <a:font script="Thaa" typeface="MV Boli"/>
+        <a:font script="Deva" typeface="Mangal"/>
+        <a:font script="Telu" typeface="Gautami"/>
+        <a:font script="Taml" typeface="Latha"/>
+        <a:font script="Syrc" typeface="Estrangelo Edessa"/>
+        <a:font script="Orya" typeface="Kalinga"/>
+        <a:font script="Mlym" typeface="Kartika"/>
+        <a:font script="Laoo" typeface="DokChampa"/>
+        <a:font script="Sinh" typeface="Iskoola Pota"/>
+        <a:font script="Mong" typeface="Mongolian Baiti"/>
+        <a:font script="Viet" typeface="Arial"/>
+        <a:font script="Uigh" typeface="Microsoft Uighur"/>
+        <a:font script="Geor" typeface="Sylfaen"/>
+      </a:minorFont>
+    </a:fontScheme>
+    <a:fmtScheme name="Office">
+      <a:fillStyleLst>
+        <a:solidFill>
+          <a:schemeClr val="phClr"/>
+        </a:solidFill>
+        <a:gradFill rotWithShape="1">
+          <a:gsLst>
+            <a:gs pos="0">
+              <a:schemeClr val="phClr">
+                <a:tint val="50000"/>
+                <a:satMod val="300000"/>
+              </a:schemeClr>
+            </a:gs>
+            <a:gs pos="35000">
+              <a:schemeClr val="phClr">
+                <a:tint val="37000"/>
+                <a:satMod val="300000"/>
+              </a:schemeClr>
+            </a:gs>
+            <a:gs pos="100000">
+              <a:schemeClr val="phClr">
+                <a:tint val="15000"/>
+                <a:satMod val="350000"/>
+              </a:schemeClr>
+            </a:gs>
+          </a:gsLst>
+          <a:lin ang="16200000" scaled="1"/>
+        </a:gradFill>
+        <a:gradFill rotWithShape="1">
+          <a:gsLst>
+            <a:gs pos="0">
+              <a:schemeClr val="phClr">
+                <a:tint val="100000"/>
+                <a:shade val="100000"/>
+                <a:satMod val="130000"/>
+              </a:schemeClr>
+            </a:gs>
+            <a:gs pos="100000">
+              <a:schemeClr val="phClr">
+                <a:tint val="50000"/>
+                <a:shade val="100000"/>
+                <a:satMod val="350000"/>
+              </a:schemeClr>
+            </a:gs>
+          </a:gsLst>
+          <a:lin ang="16200000" scaled="0"/>
+        </a:gradFill>
+      </a:fillStyleLst>
+      <a:lnStyleLst>
+        <a:ln w="9525" cap="flat" cmpd="sng" algn="ctr">
+          <a:solidFill>
+            <a:schemeClr val="phClr">
+              <a:shade val="95000"/>
+              <a:satMod val="105000"/>
+            </a:schemeClr>
+          </a:solidFill>
+          <a:prstDash val="solid"/>
+        </a:ln>
+        <a:ln w="25400" cap="flat" cmpd="sng" algn="ctr">
+          <a:solidFill>
+            <a:schemeClr val="phClr"/>
+          </a:solidFill>
+          <a:prstDash val="solid"/>
+        </a:ln>
+        <a:ln w="38100" cap="flat" cmpd="sng" algn="ctr">
+          <a:solidFill>
+            <a:schemeClr val="phClr"/>
+          </a:solidFill>
+          <a:prstDash val="solid"/>
+        </a:ln>
+      </a:lnStyleLst>
+      <a:effectStyleLst>
+        <a:effectStyle>
+          <a:effectLst>
+            <a:outerShdw blurRad="40000" dist="20000" dir="5400000" rotWithShape="0">
+              <a:srgbClr val="000000">
+                <a:alpha val="38000"/>
+              </a:srgbClr>
+            </a:outerShdw>
+          </a:effectLst>
+        </a:effectStyle>
+        <a:effectStyle>
+          <a:effectLst>
+            <a:outerShdw blurRad="40000" dist="23000" dir="5400000" rotWithShape="0">
+              <a:srgbClr val="000000">
+                <a:alpha val="35000"/>
+              </a:srgbClr>
+            </a:outerShdw>
+          </a:effectLst>
+        </a:effectStyle>
+        <a:effectStyle>
+          <a:effectLst>
+            <a:outerShdw blurRad="40000" dist="23000" dir="5400000" rotWithShape="0">
+              <a:srgbClr val="000000">
+                <a:alpha val="35000"/>
+              </a:srgbClr>
+            </a:outerShdw>
+          </a:effectLst>
+          <a:scene3d>
+            <a:camera prst="orthographicFront">
+              <a:rot lat="0" lon="0" rev="0"/>
+            </a:camera>
+            <a:lightRig rig="threePt" dir="t">
+              <a:rot lat="0" lon="0" rev="1200000"/>
+            </a:lightRig>
+          </a:scene3d>
+          <a:sp3d>
+            <a:bevelT w="63500" h="25400"/>
+          </a:sp3d>
+        </a:effectStyle>
+      </a:effectStyleLst>
+      <a:bgFillStyleLst>
+        <a:solidFill>
+          <a:schemeClr val="phClr"/>
+        </a:solidFill>
+        <a:gradFill rotWithShape="1">
+          <a:gsLst>
+            <a:gs pos="0">
+              <a:schemeClr val="phClr">
+                <a:tint val="40000"/>
+                <a:satMod val="350000"/>
+              </a:schemeClr>
+            </a:gs>
+            <a:gs pos="40000">
+              <a:schemeClr val="phClr">
+                <a:tint val="45000"/>
+                <a:shade val="99000"/>
+                <a:satMod val="350000"/>
+              </a:schemeClr>
+            </a:gs>
+            <a:gs pos="100000">
+              <a:schemeClr val="phClr">
+                <a:shade val="20000"/>
+                <a:satMod val="255000"/>
+              </a:schemeClr>
+            </a:gs>
+          </a:gsLst>
+          <a:path path="circle">
+            <a:fillToRect l="50000" t="-80000" r="50000" b="180000"/>
+          </a:path>
+        </a:gradFill>
+        <a:gradFill rotWithShape="1">
+          <a:gsLst>
+            <a:gs pos="0">
+              <a:schemeClr val="phClr">
+                <a:tint val="80000"/>
+                <a:satMod val="300000"/>
+              </a:schemeClr>
+            </a:gs>
+            <a:gs pos="100000">
+              <a:schemeClr val="phClr">
+                <a:shade val="30000"/>
+                <a:satMod val="200000"/>
+              </a:schemeClr>
+            </a:gs>
+          </a:gsLst>
+          <a:path path="circle">
+            <a:fillToRect l="50000" t="50000" r="50000" b="50000"/>
+          </a:path>
+        </a:gradFill>
+      </a:bgFillStyleLst>
+    </a:fmtScheme>
+  </a:themeElements>
+</a:theme>
+</file>
+
+<file path=ppt/theme/theme2.xml><?xml version="1.0" encoding="utf-8"?>
 <a:theme xmlns:a="http://schemas.openxmlformats.org/drawingml/2006/main" xmlns:r="http://schemas.openxmlformats.org/officeDocument/2006/relationships" name="Office Theme">
   <a:themeElements>
     <a:clrScheme name="Office">
@@ -17064,283 +17337,4 @@
     </a:fmtScheme>
   </a:themeElements>
 </a:theme>
-</file>
-
-<file path=ppt/theme/theme2.xml><?xml version="1.0" encoding="utf-8"?>
-<a:theme xmlns:a="http://schemas.openxmlformats.org/drawingml/2006/main" xmlns:r="http://schemas.openxmlformats.org/officeDocument/2006/relationships">
-  <a:themeElements>
-    <a:clrScheme name="Default">
-      <a:dk1>
-        <a:srgbClr val="000000"/>
-      </a:dk1>
-      <a:lt1>
-        <a:srgbClr val="FFFFFF"/>
-      </a:lt1>
-      <a:dk2>
-        <a:srgbClr val="158158"/>
-      </a:dk2>
-      <a:lt2>
-        <a:srgbClr val="F3F3F3"/>
-      </a:lt2>
-      <a:accent1>
-        <a:srgbClr val="058DC7"/>
-      </a:accent1>
-      <a:accent2>
-        <a:srgbClr val="50B432"/>
-      </a:accent2>
-      <a:accent3>
-        <a:srgbClr val="ED561B"/>
-      </a:accent3>
-      <a:accent4>
-        <a:srgbClr val="EDEF00"/>
-      </a:accent4>
-      <a:accent5>
-        <a:srgbClr val="24CBE5"/>
-      </a:accent5>
-      <a:accent6>
-        <a:srgbClr val="64E572"/>
-      </a:accent6>
-      <a:hlink>
-        <a:srgbClr val="2200CC"/>
-      </a:hlink>
-      <a:folHlink>
-        <a:srgbClr val="551A8B"/>
-      </a:folHlink>
-    </a:clrScheme>
-    <a:fontScheme name="Office">
-      <a:majorFont>
-        <a:latin typeface="Arial"/>
-        <a:ea typeface=""/>
-        <a:cs typeface=""/>
-        <a:font script="Jpan" typeface="ＭＳ Ｐゴシック"/>
-        <a:font script="Hang" typeface="맑은 고딕"/>
-        <a:font script="Hans" typeface="宋体"/>
-        <a:font script="Hant" typeface="新細明體"/>
-        <a:font script="Arab" typeface="Times New Roman"/>
-        <a:font script="Hebr" typeface="Times New Roman"/>
-        <a:font script="Thai" typeface="Angsana New"/>
-        <a:font script="Ethi" typeface="Nyala"/>
-        <a:font script="Beng" typeface="Vrinda"/>
-        <a:font script="Gujr" typeface="Shruti"/>
-        <a:font script="Khmr" typeface="MoolBoran"/>
-        <a:font script="Knda" typeface="Tunga"/>
-        <a:font script="Guru" typeface="Raavi"/>
-        <a:font script="Cans" typeface="Euphemia"/>
-        <a:font script="Cher" typeface="Plantagenet Cherokee"/>
-        <a:font script="Yiii" typeface="Microsoft Yi Baiti"/>
-        <a:font script="Tibt" typeface="Microsoft Himalaya"/>
-        <a:font script="Thaa" typeface="MV Boli"/>
-        <a:font script="Deva" typeface="Mangal"/>
-        <a:font script="Telu" typeface="Gautami"/>
-        <a:font script="Taml" typeface="Latha"/>
-        <a:font script="Syrc" typeface="Estrangelo Edessa"/>
-        <a:font script="Orya" typeface="Kalinga"/>
-        <a:font script="Mlym" typeface="Kartika"/>
-        <a:font script="Laoo" typeface="DokChampa"/>
-        <a:font script="Sinh" typeface="Iskoola Pota"/>
-        <a:font script="Mong" typeface="Mongolian Baiti"/>
-        <a:font script="Viet" typeface="Times New Roman"/>
-        <a:font script="Uigh" typeface="Microsoft Uighur"/>
-        <a:font script="Geor" typeface="Sylfaen"/>
-      </a:majorFont>
-      <a:minorFont>
-        <a:latin typeface="Arial"/>
-        <a:ea typeface=""/>
-        <a:cs typeface=""/>
-        <a:font script="Jpan" typeface="ＭＳ Ｐゴシック"/>
-        <a:font script="Hang" typeface="맑은 고딕"/>
-        <a:font script="Hans" typeface="宋体"/>
-        <a:font script="Hant" typeface="新細明體"/>
-        <a:font script="Arab" typeface="Arial"/>
-        <a:font script="Hebr" typeface="Arial"/>
-        <a:font script="Thai" typeface="Cordia New"/>
-        <a:font script="Ethi" typeface="Nyala"/>
-        <a:font script="Beng" typeface="Vrinda"/>
-        <a:font script="Gujr" typeface="Shruti"/>
-        <a:font script="Khmr" typeface="DaunPenh"/>
-        <a:font script="Knda" typeface="Tunga"/>
-        <a:font script="Guru" typeface="Raavi"/>
-        <a:font script="Cans" typeface="Euphemia"/>
-        <a:font script="Cher" typeface="Plantagenet Cherokee"/>
-        <a:font script="Yiii" typeface="Microsoft Yi Baiti"/>
-        <a:font script="Tibt" typeface="Microsoft Himalaya"/>
-        <a:font script="Thaa" typeface="MV Boli"/>
-        <a:font script="Deva" typeface="Mangal"/>
-        <a:font script="Telu" typeface="Gautami"/>
-        <a:font script="Taml" typeface="Latha"/>
-        <a:font script="Syrc" typeface="Estrangelo Edessa"/>
-        <a:font script="Orya" typeface="Kalinga"/>
-        <a:font script="Mlym" typeface="Kartika"/>
-        <a:font script="Laoo" typeface="DokChampa"/>
-        <a:font script="Sinh" typeface="Iskoola Pota"/>
-        <a:font script="Mong" typeface="Mongolian Baiti"/>
-        <a:font script="Viet" typeface="Arial"/>
-        <a:font script="Uigh" typeface="Microsoft Uighur"/>
-        <a:font script="Geor" typeface="Sylfaen"/>
-      </a:minorFont>
-    </a:fontScheme>
-    <a:fmtScheme name="Office">
-      <a:fillStyleLst>
-        <a:solidFill>
-          <a:schemeClr val="phClr"/>
-        </a:solidFill>
-        <a:gradFill rotWithShape="1">
-          <a:gsLst>
-            <a:gs pos="0">
-              <a:schemeClr val="phClr">
-                <a:tint val="50000"/>
-                <a:satMod val="300000"/>
-              </a:schemeClr>
-            </a:gs>
-            <a:gs pos="35000">
-              <a:schemeClr val="phClr">
-                <a:tint val="37000"/>
-                <a:satMod val="300000"/>
-              </a:schemeClr>
-            </a:gs>
-            <a:gs pos="100000">
-              <a:schemeClr val="phClr">
-                <a:tint val="15000"/>
-                <a:satMod val="350000"/>
-              </a:schemeClr>
-            </a:gs>
-          </a:gsLst>
-          <a:lin ang="16200000" scaled="1"/>
-        </a:gradFill>
-        <a:gradFill rotWithShape="1">
-          <a:gsLst>
-            <a:gs pos="0">
-              <a:schemeClr val="phClr">
-                <a:tint val="100000"/>
-                <a:shade val="100000"/>
-                <a:satMod val="130000"/>
-              </a:schemeClr>
-            </a:gs>
-            <a:gs pos="100000">
-              <a:schemeClr val="phClr">
-                <a:tint val="50000"/>
-                <a:shade val="100000"/>
-                <a:satMod val="350000"/>
-              </a:schemeClr>
-            </a:gs>
-          </a:gsLst>
-          <a:lin ang="16200000" scaled="0"/>
-        </a:gradFill>
-      </a:fillStyleLst>
-      <a:lnStyleLst>
-        <a:ln w="9525" cap="flat" cmpd="sng" algn="ctr">
-          <a:solidFill>
-            <a:schemeClr val="phClr">
-              <a:shade val="95000"/>
-              <a:satMod val="105000"/>
-            </a:schemeClr>
-          </a:solidFill>
-          <a:prstDash val="solid"/>
-        </a:ln>
-        <a:ln w="25400" cap="flat" cmpd="sng" algn="ctr">
-          <a:solidFill>
-            <a:schemeClr val="phClr"/>
-          </a:solidFill>
-          <a:prstDash val="solid"/>
-        </a:ln>
-        <a:ln w="38100" cap="flat" cmpd="sng" algn="ctr">
-          <a:solidFill>
-            <a:schemeClr val="phClr"/>
-          </a:solidFill>
-          <a:prstDash val="solid"/>
-        </a:ln>
-      </a:lnStyleLst>
-      <a:effectStyleLst>
-        <a:effectStyle>
-          <a:effectLst>
-            <a:outerShdw blurRad="40000" dist="20000" dir="5400000" rotWithShape="0">
-              <a:srgbClr val="000000">
-                <a:alpha val="38000"/>
-              </a:srgbClr>
-            </a:outerShdw>
-          </a:effectLst>
-        </a:effectStyle>
-        <a:effectStyle>
-          <a:effectLst>
-            <a:outerShdw blurRad="40000" dist="23000" dir="5400000" rotWithShape="0">
-              <a:srgbClr val="000000">
-                <a:alpha val="35000"/>
-              </a:srgbClr>
-            </a:outerShdw>
-          </a:effectLst>
-        </a:effectStyle>
-        <a:effectStyle>
-          <a:effectLst>
-            <a:outerShdw blurRad="40000" dist="23000" dir="5400000" rotWithShape="0">
-              <a:srgbClr val="000000">
-                <a:alpha val="35000"/>
-              </a:srgbClr>
-            </a:outerShdw>
-          </a:effectLst>
-          <a:scene3d>
-            <a:camera prst="orthographicFront">
-              <a:rot lat="0" lon="0" rev="0"/>
-            </a:camera>
-            <a:lightRig rig="threePt" dir="t">
-              <a:rot lat="0" lon="0" rev="1200000"/>
-            </a:lightRig>
-          </a:scene3d>
-          <a:sp3d>
-            <a:bevelT w="63500" h="25400"/>
-          </a:sp3d>
-        </a:effectStyle>
-      </a:effectStyleLst>
-      <a:bgFillStyleLst>
-        <a:solidFill>
-          <a:schemeClr val="phClr"/>
-        </a:solidFill>
-        <a:gradFill rotWithShape="1">
-          <a:gsLst>
-            <a:gs pos="0">
-              <a:schemeClr val="phClr">
-                <a:tint val="40000"/>
-                <a:satMod val="350000"/>
-              </a:schemeClr>
-            </a:gs>
-            <a:gs pos="40000">
-              <a:schemeClr val="phClr">
-                <a:tint val="45000"/>
-                <a:shade val="99000"/>
-                <a:satMod val="350000"/>
-              </a:schemeClr>
-            </a:gs>
-            <a:gs pos="100000">
-              <a:schemeClr val="phClr">
-                <a:shade val="20000"/>
-                <a:satMod val="255000"/>
-              </a:schemeClr>
-            </a:gs>
-          </a:gsLst>
-          <a:path path="circle">
-            <a:fillToRect l="50000" t="-80000" r="50000" b="180000"/>
-          </a:path>
-        </a:gradFill>
-        <a:gradFill rotWithShape="1">
-          <a:gsLst>
-            <a:gs pos="0">
-              <a:schemeClr val="phClr">
-                <a:tint val="80000"/>
-                <a:satMod val="300000"/>
-              </a:schemeClr>
-            </a:gs>
-            <a:gs pos="100000">
-              <a:schemeClr val="phClr">
-                <a:shade val="30000"/>
-                <a:satMod val="200000"/>
-              </a:schemeClr>
-            </a:gs>
-          </a:gsLst>
-          <a:path path="circle">
-            <a:fillToRect l="50000" t="50000" r="50000" b="50000"/>
-          </a:path>
-        </a:gradFill>
-      </a:bgFillStyleLst>
-    </a:fmtScheme>
-  </a:themeElements>
-</a:theme>
 </file>
</xml_diff>

<commit_message>
Final updates of pptx ahead of training session
Signed-off-by: Kevin Putnam <kevin.putnam@gmail.com>
</commit_message>
<xml_diff>
--- a/_downloads/rest-sphinx-for-open-source.pptx
+++ b/_downloads/rest-sphinx-for-open-source.pptx
@@ -22,6 +22,8 @@
     <p:sldId id="267" r:id="rId16"/>
     <p:sldId id="268" r:id="rId17"/>
     <p:sldId id="269" r:id="rId18"/>
+    <p:sldId id="270" r:id="rId19"/>
+    <p:sldId id="271" r:id="rId20"/>
   </p:sldIdLst>
   <p:sldSz cy="6858000" cx="12192000"/>
   <p:notesSz cx="6858000" cy="9144000"/>
@@ -801,7 +803,7 @@
       </p:grpSpPr>
       <p:sp>
         <p:nvSpPr>
-          <p:cNvPr id="160" name="Google Shape;160;p11:notes"/>
+          <p:cNvPr id="160" name="Google Shape;160;p10:notes"/>
           <p:cNvSpPr txBox="1"/>
           <p:nvPr>
             <p:ph idx="1" type="body"/>
@@ -840,7 +842,7 @@
       </p:sp>
       <p:sp>
         <p:nvSpPr>
-          <p:cNvPr id="161" name="Google Shape;161;p11:notes"/>
+          <p:cNvPr id="161" name="Google Shape;161;p10:notes"/>
           <p:cNvSpPr/>
           <p:nvPr>
             <p:ph idx="2" type="sldImg"/>
@@ -900,42 +902,7 @@
       </p:grpSpPr>
       <p:sp>
         <p:nvSpPr>
-          <p:cNvPr id="166" name="Google Shape;166;g3a0fe41bbae_0_5:notes"/>
-          <p:cNvSpPr/>
-          <p:nvPr>
-            <p:ph idx="2" type="sldImg"/>
-          </p:nvPr>
-        </p:nvSpPr>
-        <p:spPr>
-          <a:xfrm>
-            <a:off x="1143225" y="685800"/>
-            <a:ext cx="4572300" cy="3429000"/>
-          </a:xfrm>
-          <a:custGeom>
-            <a:rect b="b" l="l" r="r" t="t"/>
-            <a:pathLst>
-              <a:path extrusionOk="0" h="120000" w="120000">
-                <a:moveTo>
-                  <a:pt x="0" y="0"/>
-                </a:moveTo>
-                <a:lnTo>
-                  <a:pt x="120000" y="0"/>
-                </a:lnTo>
-                <a:lnTo>
-                  <a:pt x="120000" y="120000"/>
-                </a:lnTo>
-                <a:lnTo>
-                  <a:pt x="0" y="120000"/>
-                </a:lnTo>
-                <a:close/>
-              </a:path>
-            </a:pathLst>
-          </a:custGeom>
-        </p:spPr>
-      </p:sp>
-      <p:sp>
-        <p:nvSpPr>
-          <p:cNvPr id="167" name="Google Shape;167;g3a0fe41bbae_0_5:notes"/>
+          <p:cNvPr id="166" name="Google Shape;166;p11:notes"/>
           <p:cNvSpPr txBox="1"/>
           <p:nvPr>
             <p:ph idx="1" type="body"/>
@@ -972,73 +939,9 @@
           </a:p>
         </p:txBody>
       </p:sp>
-    </p:spTree>
-  </p:cSld>
-  <p:clrMapOvr>
-    <a:masterClrMapping/>
-  </p:clrMapOvr>
-</p:notes>
-</file>
-
-<file path=ppt/notesSlides/notesSlide12.xml><?xml version="1.0" encoding="utf-8"?>
-<p:notes xmlns:a="http://schemas.openxmlformats.org/drawingml/2006/main" xmlns:r="http://schemas.openxmlformats.org/officeDocument/2006/relationships" xmlns:mc="http://schemas.openxmlformats.org/markup-compatibility/2006" xmlns:mv="urn:schemas-microsoft-com:mac:vml" xmlns:p="http://schemas.openxmlformats.org/presentationml/2006/main" xmlns:c="http://schemas.openxmlformats.org/drawingml/2006/chart" xmlns:dgm="http://schemas.openxmlformats.org/drawingml/2006/diagram" xmlns:o="urn:schemas-microsoft-com:office:office" xmlns:v="urn:schemas-microsoft-com:vml" xmlns:pvml="urn:schemas-microsoft-com:office:powerpoint" xmlns:com="http://schemas.openxmlformats.org/drawingml/2006/compatibility" xmlns:p14="http://schemas.microsoft.com/office/powerpoint/2010/main" xmlns:p15="http://schemas.microsoft.com/office/powerpoint/2012/main" xmlns:ahyp="http://schemas.microsoft.com/office/drawing/2018/hyperlinkcolor" showMasterPhAnim="0" showMasterSp="0">
-  <p:cSld>
-    <p:spTree>
-      <p:nvGrpSpPr>
-        <p:cNvPr id="171" name="Shape 171"/>
-        <p:cNvGrpSpPr/>
-        <p:nvPr/>
-      </p:nvGrpSpPr>
-      <p:grpSpPr>
-        <a:xfrm>
-          <a:off x="0" y="0"/>
-          <a:ext cx="0" cy="0"/>
-          <a:chOff x="0" y="0"/>
-          <a:chExt cx="0" cy="0"/>
-        </a:xfrm>
-      </p:grpSpPr>
       <p:sp>
         <p:nvSpPr>
-          <p:cNvPr id="172" name="Google Shape;172;p12:notes"/>
-          <p:cNvSpPr txBox="1"/>
-          <p:nvPr>
-            <p:ph idx="1" type="body"/>
-          </p:nvPr>
-        </p:nvSpPr>
-        <p:spPr>
-          <a:xfrm>
-            <a:off x="685800" y="4343400"/>
-            <a:ext cx="5486400" cy="4114800"/>
-          </a:xfrm>
-          <a:prstGeom prst="rect">
-            <a:avLst/>
-          </a:prstGeom>
-        </p:spPr>
-        <p:txBody>
-          <a:bodyPr anchorCtr="0" anchor="t" bIns="91425" lIns="91425" spcFirstLastPara="1" rIns="91425" wrap="square" tIns="91425">
-            <a:noAutofit/>
-          </a:bodyPr>
-          <a:lstStyle/>
-          <a:p>
-            <a:pPr indent="0" lvl="0" marL="0" rtl="0" algn="l">
-              <a:spcBef>
-                <a:spcPts val="0"/>
-              </a:spcBef>
-              <a:spcAft>
-                <a:spcPts val="0"/>
-              </a:spcAft>
-              <a:buNone/>
-            </a:pPr>
-            <a:r>
-              <a:t/>
-            </a:r>
-            <a:endParaRPr/>
-          </a:p>
-        </p:txBody>
-      </p:sp>
-      <p:sp>
-        <p:nvSpPr>
-          <p:cNvPr id="173" name="Google Shape;173;p12:notes"/>
+          <p:cNvPr id="167" name="Google Shape;167;p11:notes"/>
           <p:cNvSpPr/>
           <p:nvPr>
             <p:ph idx="2" type="sldImg"/>
@@ -1079,12 +982,12 @@
 </p:notes>
 </file>
 
-<file path=ppt/notesSlides/notesSlide13.xml><?xml version="1.0" encoding="utf-8"?>
+<file path=ppt/notesSlides/notesSlide12.xml><?xml version="1.0" encoding="utf-8"?>
 <p:notes xmlns:a="http://schemas.openxmlformats.org/drawingml/2006/main" xmlns:r="http://schemas.openxmlformats.org/officeDocument/2006/relationships" xmlns:mc="http://schemas.openxmlformats.org/markup-compatibility/2006" xmlns:mv="urn:schemas-microsoft-com:mac:vml" xmlns:p="http://schemas.openxmlformats.org/presentationml/2006/main" xmlns:c="http://schemas.openxmlformats.org/drawingml/2006/chart" xmlns:dgm="http://schemas.openxmlformats.org/drawingml/2006/diagram" xmlns:o="urn:schemas-microsoft-com:office:office" xmlns:v="urn:schemas-microsoft-com:vml" xmlns:pvml="urn:schemas-microsoft-com:office:powerpoint" xmlns:com="http://schemas.openxmlformats.org/drawingml/2006/compatibility" xmlns:p14="http://schemas.microsoft.com/office/powerpoint/2010/main" xmlns:p15="http://schemas.microsoft.com/office/powerpoint/2012/main" xmlns:ahyp="http://schemas.microsoft.com/office/drawing/2018/hyperlinkcolor" showMasterPhAnim="0" showMasterSp="0">
   <p:cSld>
     <p:spTree>
       <p:nvGrpSpPr>
-        <p:cNvPr id="177" name="Shape 177"/>
+        <p:cNvPr id="171" name="Shape 171"/>
         <p:cNvGrpSpPr/>
         <p:nvPr/>
       </p:nvGrpSpPr>
@@ -1098,7 +1001,7 @@
       </p:grpSpPr>
       <p:sp>
         <p:nvSpPr>
-          <p:cNvPr id="178" name="Google Shape;178;g3a0fe41bbae_0_0:notes"/>
+          <p:cNvPr id="172" name="Google Shape;172;g3a0fe41bbae_0_5:notes"/>
           <p:cNvSpPr/>
           <p:nvPr>
             <p:ph idx="2" type="sldImg"/>
@@ -1133,7 +1036,106 @@
       </p:sp>
       <p:sp>
         <p:nvSpPr>
-          <p:cNvPr id="179" name="Google Shape;179;g3a0fe41bbae_0_0:notes"/>
+          <p:cNvPr id="173" name="Google Shape;173;g3a0fe41bbae_0_5:notes"/>
+          <p:cNvSpPr txBox="1"/>
+          <p:nvPr>
+            <p:ph idx="1" type="body"/>
+          </p:nvPr>
+        </p:nvSpPr>
+        <p:spPr>
+          <a:xfrm>
+            <a:off x="685800" y="4343400"/>
+            <a:ext cx="5486400" cy="4114800"/>
+          </a:xfrm>
+          <a:prstGeom prst="rect">
+            <a:avLst/>
+          </a:prstGeom>
+        </p:spPr>
+        <p:txBody>
+          <a:bodyPr anchorCtr="0" anchor="t" bIns="91425" lIns="91425" spcFirstLastPara="1" rIns="91425" wrap="square" tIns="91425">
+            <a:noAutofit/>
+          </a:bodyPr>
+          <a:lstStyle/>
+          <a:p>
+            <a:pPr indent="0" lvl="0" marL="0" rtl="0" algn="l">
+              <a:spcBef>
+                <a:spcPts val="0"/>
+              </a:spcBef>
+              <a:spcAft>
+                <a:spcPts val="0"/>
+              </a:spcAft>
+              <a:buNone/>
+            </a:pPr>
+            <a:r>
+              <a:t/>
+            </a:r>
+            <a:endParaRPr/>
+          </a:p>
+        </p:txBody>
+      </p:sp>
+    </p:spTree>
+  </p:cSld>
+  <p:clrMapOvr>
+    <a:masterClrMapping/>
+  </p:clrMapOvr>
+</p:notes>
+</file>
+
+<file path=ppt/notesSlides/notesSlide13.xml><?xml version="1.0" encoding="utf-8"?>
+<p:notes xmlns:a="http://schemas.openxmlformats.org/drawingml/2006/main" xmlns:r="http://schemas.openxmlformats.org/officeDocument/2006/relationships" xmlns:mc="http://schemas.openxmlformats.org/markup-compatibility/2006" xmlns:mv="urn:schemas-microsoft-com:mac:vml" xmlns:p="http://schemas.openxmlformats.org/presentationml/2006/main" xmlns:c="http://schemas.openxmlformats.org/drawingml/2006/chart" xmlns:dgm="http://schemas.openxmlformats.org/drawingml/2006/diagram" xmlns:o="urn:schemas-microsoft-com:office:office" xmlns:v="urn:schemas-microsoft-com:vml" xmlns:pvml="urn:schemas-microsoft-com:office:powerpoint" xmlns:com="http://schemas.openxmlformats.org/drawingml/2006/compatibility" xmlns:p14="http://schemas.microsoft.com/office/powerpoint/2010/main" xmlns:p15="http://schemas.microsoft.com/office/powerpoint/2012/main" xmlns:ahyp="http://schemas.microsoft.com/office/drawing/2018/hyperlinkcolor" showMasterPhAnim="0" showMasterSp="0">
+  <p:cSld>
+    <p:spTree>
+      <p:nvGrpSpPr>
+        <p:cNvPr id="177" name="Shape 177"/>
+        <p:cNvGrpSpPr/>
+        <p:nvPr/>
+      </p:nvGrpSpPr>
+      <p:grpSpPr>
+        <a:xfrm>
+          <a:off x="0" y="0"/>
+          <a:ext cx="0" cy="0"/>
+          <a:chOff x="0" y="0"/>
+          <a:chExt cx="0" cy="0"/>
+        </a:xfrm>
+      </p:grpSpPr>
+      <p:sp>
+        <p:nvSpPr>
+          <p:cNvPr id="178" name="Google Shape;178;g3a10585ea2e_0_10:notes"/>
+          <p:cNvSpPr/>
+          <p:nvPr>
+            <p:ph idx="2" type="sldImg"/>
+          </p:nvPr>
+        </p:nvSpPr>
+        <p:spPr>
+          <a:xfrm>
+            <a:off x="1143225" y="685800"/>
+            <a:ext cx="4572300" cy="3429000"/>
+          </a:xfrm>
+          <a:custGeom>
+            <a:rect b="b" l="l" r="r" t="t"/>
+            <a:pathLst>
+              <a:path extrusionOk="0" h="120000" w="120000">
+                <a:moveTo>
+                  <a:pt x="0" y="0"/>
+                </a:moveTo>
+                <a:lnTo>
+                  <a:pt x="120000" y="0"/>
+                </a:lnTo>
+                <a:lnTo>
+                  <a:pt x="120000" y="120000"/>
+                </a:lnTo>
+                <a:lnTo>
+                  <a:pt x="0" y="120000"/>
+                </a:lnTo>
+                <a:close/>
+              </a:path>
+            </a:pathLst>
+          </a:custGeom>
+        </p:spPr>
+      </p:sp>
+      <p:sp>
+        <p:nvSpPr>
+          <p:cNvPr id="179" name="Google Shape;179;g3a10585ea2e_0_10:notes"/>
           <p:cNvSpPr txBox="1"/>
           <p:nvPr>
             <p:ph idx="1" type="body"/>
@@ -1197,7 +1199,7 @@
       </p:grpSpPr>
       <p:sp>
         <p:nvSpPr>
-          <p:cNvPr id="184" name="Google Shape;184;p3:notes"/>
+          <p:cNvPr id="184" name="Google Shape;184;p12:notes"/>
           <p:cNvSpPr txBox="1"/>
           <p:nvPr>
             <p:ph idx="1" type="body"/>
@@ -1236,7 +1238,205 @@
       </p:sp>
       <p:sp>
         <p:nvSpPr>
-          <p:cNvPr id="185" name="Google Shape;185;p3:notes"/>
+          <p:cNvPr id="185" name="Google Shape;185;p12:notes"/>
+          <p:cNvSpPr/>
+          <p:nvPr>
+            <p:ph idx="2" type="sldImg"/>
+          </p:nvPr>
+        </p:nvSpPr>
+        <p:spPr>
+          <a:xfrm>
+            <a:off x="1143225" y="685800"/>
+            <a:ext cx="4572225" cy="3429000"/>
+          </a:xfrm>
+          <a:custGeom>
+            <a:rect b="b" l="l" r="r" t="t"/>
+            <a:pathLst>
+              <a:path extrusionOk="0" h="120000" w="120000">
+                <a:moveTo>
+                  <a:pt x="0" y="0"/>
+                </a:moveTo>
+                <a:lnTo>
+                  <a:pt x="120000" y="0"/>
+                </a:lnTo>
+                <a:lnTo>
+                  <a:pt x="120000" y="120000"/>
+                </a:lnTo>
+                <a:lnTo>
+                  <a:pt x="0" y="120000"/>
+                </a:lnTo>
+                <a:close/>
+              </a:path>
+            </a:pathLst>
+          </a:custGeom>
+        </p:spPr>
+      </p:sp>
+    </p:spTree>
+  </p:cSld>
+  <p:clrMapOvr>
+    <a:masterClrMapping/>
+  </p:clrMapOvr>
+</p:notes>
+</file>
+
+<file path=ppt/notesSlides/notesSlide15.xml><?xml version="1.0" encoding="utf-8"?>
+<p:notes xmlns:a="http://schemas.openxmlformats.org/drawingml/2006/main" xmlns:r="http://schemas.openxmlformats.org/officeDocument/2006/relationships" xmlns:mc="http://schemas.openxmlformats.org/markup-compatibility/2006" xmlns:mv="urn:schemas-microsoft-com:mac:vml" xmlns:p="http://schemas.openxmlformats.org/presentationml/2006/main" xmlns:c="http://schemas.openxmlformats.org/drawingml/2006/chart" xmlns:dgm="http://schemas.openxmlformats.org/drawingml/2006/diagram" xmlns:o="urn:schemas-microsoft-com:office:office" xmlns:v="urn:schemas-microsoft-com:vml" xmlns:pvml="urn:schemas-microsoft-com:office:powerpoint" xmlns:com="http://schemas.openxmlformats.org/drawingml/2006/compatibility" xmlns:p14="http://schemas.microsoft.com/office/powerpoint/2010/main" xmlns:p15="http://schemas.microsoft.com/office/powerpoint/2012/main" xmlns:ahyp="http://schemas.microsoft.com/office/drawing/2018/hyperlinkcolor" showMasterPhAnim="0" showMasterSp="0">
+  <p:cSld>
+    <p:spTree>
+      <p:nvGrpSpPr>
+        <p:cNvPr id="189" name="Shape 189"/>
+        <p:cNvGrpSpPr/>
+        <p:nvPr/>
+      </p:nvGrpSpPr>
+      <p:grpSpPr>
+        <a:xfrm>
+          <a:off x="0" y="0"/>
+          <a:ext cx="0" cy="0"/>
+          <a:chOff x="0" y="0"/>
+          <a:chExt cx="0" cy="0"/>
+        </a:xfrm>
+      </p:grpSpPr>
+      <p:sp>
+        <p:nvSpPr>
+          <p:cNvPr id="190" name="Google Shape;190;g3a0fe41bbae_0_0:notes"/>
+          <p:cNvSpPr/>
+          <p:nvPr>
+            <p:ph idx="2" type="sldImg"/>
+          </p:nvPr>
+        </p:nvSpPr>
+        <p:spPr>
+          <a:xfrm>
+            <a:off x="1143225" y="685800"/>
+            <a:ext cx="4572300" cy="3429000"/>
+          </a:xfrm>
+          <a:custGeom>
+            <a:rect b="b" l="l" r="r" t="t"/>
+            <a:pathLst>
+              <a:path extrusionOk="0" h="120000" w="120000">
+                <a:moveTo>
+                  <a:pt x="0" y="0"/>
+                </a:moveTo>
+                <a:lnTo>
+                  <a:pt x="120000" y="0"/>
+                </a:lnTo>
+                <a:lnTo>
+                  <a:pt x="120000" y="120000"/>
+                </a:lnTo>
+                <a:lnTo>
+                  <a:pt x="0" y="120000"/>
+                </a:lnTo>
+                <a:close/>
+              </a:path>
+            </a:pathLst>
+          </a:custGeom>
+        </p:spPr>
+      </p:sp>
+      <p:sp>
+        <p:nvSpPr>
+          <p:cNvPr id="191" name="Google Shape;191;g3a0fe41bbae_0_0:notes"/>
+          <p:cNvSpPr txBox="1"/>
+          <p:nvPr>
+            <p:ph idx="1" type="body"/>
+          </p:nvPr>
+        </p:nvSpPr>
+        <p:spPr>
+          <a:xfrm>
+            <a:off x="685800" y="4343400"/>
+            <a:ext cx="5486400" cy="4114800"/>
+          </a:xfrm>
+          <a:prstGeom prst="rect">
+            <a:avLst/>
+          </a:prstGeom>
+        </p:spPr>
+        <p:txBody>
+          <a:bodyPr anchorCtr="0" anchor="t" bIns="91425" lIns="91425" spcFirstLastPara="1" rIns="91425" wrap="square" tIns="91425">
+            <a:noAutofit/>
+          </a:bodyPr>
+          <a:lstStyle/>
+          <a:p>
+            <a:pPr indent="0" lvl="0" marL="0" rtl="0" algn="l">
+              <a:spcBef>
+                <a:spcPts val="0"/>
+              </a:spcBef>
+              <a:spcAft>
+                <a:spcPts val="0"/>
+              </a:spcAft>
+              <a:buNone/>
+            </a:pPr>
+            <a:r>
+              <a:t/>
+            </a:r>
+            <a:endParaRPr/>
+          </a:p>
+        </p:txBody>
+      </p:sp>
+    </p:spTree>
+  </p:cSld>
+  <p:clrMapOvr>
+    <a:masterClrMapping/>
+  </p:clrMapOvr>
+</p:notes>
+</file>
+
+<file path=ppt/notesSlides/notesSlide16.xml><?xml version="1.0" encoding="utf-8"?>
+<p:notes xmlns:a="http://schemas.openxmlformats.org/drawingml/2006/main" xmlns:r="http://schemas.openxmlformats.org/officeDocument/2006/relationships" xmlns:mc="http://schemas.openxmlformats.org/markup-compatibility/2006" xmlns:mv="urn:schemas-microsoft-com:mac:vml" xmlns:p="http://schemas.openxmlformats.org/presentationml/2006/main" xmlns:c="http://schemas.openxmlformats.org/drawingml/2006/chart" xmlns:dgm="http://schemas.openxmlformats.org/drawingml/2006/diagram" xmlns:o="urn:schemas-microsoft-com:office:office" xmlns:v="urn:schemas-microsoft-com:vml" xmlns:pvml="urn:schemas-microsoft-com:office:powerpoint" xmlns:com="http://schemas.openxmlformats.org/drawingml/2006/compatibility" xmlns:p14="http://schemas.microsoft.com/office/powerpoint/2010/main" xmlns:p15="http://schemas.microsoft.com/office/powerpoint/2012/main" xmlns:ahyp="http://schemas.microsoft.com/office/drawing/2018/hyperlinkcolor" showMasterPhAnim="0" showMasterSp="0">
+  <p:cSld>
+    <p:spTree>
+      <p:nvGrpSpPr>
+        <p:cNvPr id="195" name="Shape 195"/>
+        <p:cNvGrpSpPr/>
+        <p:nvPr/>
+      </p:nvGrpSpPr>
+      <p:grpSpPr>
+        <a:xfrm>
+          <a:off x="0" y="0"/>
+          <a:ext cx="0" cy="0"/>
+          <a:chOff x="0" y="0"/>
+          <a:chExt cx="0" cy="0"/>
+        </a:xfrm>
+      </p:grpSpPr>
+      <p:sp>
+        <p:nvSpPr>
+          <p:cNvPr id="196" name="Google Shape;196;p3:notes"/>
+          <p:cNvSpPr txBox="1"/>
+          <p:nvPr>
+            <p:ph idx="1" type="body"/>
+          </p:nvPr>
+        </p:nvSpPr>
+        <p:spPr>
+          <a:xfrm>
+            <a:off x="685800" y="4343400"/>
+            <a:ext cx="5486400" cy="4114800"/>
+          </a:xfrm>
+          <a:prstGeom prst="rect">
+            <a:avLst/>
+          </a:prstGeom>
+        </p:spPr>
+        <p:txBody>
+          <a:bodyPr anchorCtr="0" anchor="t" bIns="91425" lIns="91425" spcFirstLastPara="1" rIns="91425" wrap="square" tIns="91425">
+            <a:noAutofit/>
+          </a:bodyPr>
+          <a:lstStyle/>
+          <a:p>
+            <a:pPr indent="0" lvl="0" marL="0" rtl="0" algn="l">
+              <a:spcBef>
+                <a:spcPts val="0"/>
+              </a:spcBef>
+              <a:spcAft>
+                <a:spcPts val="0"/>
+              </a:spcAft>
+              <a:buNone/>
+            </a:pPr>
+            <a:r>
+              <a:t/>
+            </a:r>
+            <a:endParaRPr/>
+          </a:p>
+        </p:txBody>
+      </p:sp>
+      <p:sp>
+        <p:nvSpPr>
+          <p:cNvPr id="197" name="Google Shape;197;p3:notes"/>
           <p:cNvSpPr/>
           <p:nvPr>
             <p:ph idx="2" type="sldImg"/>
@@ -1395,46 +1595,7 @@
       </p:grpSpPr>
       <p:sp>
         <p:nvSpPr>
-          <p:cNvPr id="93" name="Google Shape;93;p4:notes"/>
-          <p:cNvSpPr txBox="1"/>
-          <p:nvPr>
-            <p:ph idx="1" type="body"/>
-          </p:nvPr>
-        </p:nvSpPr>
-        <p:spPr>
-          <a:xfrm>
-            <a:off x="685800" y="4343400"/>
-            <a:ext cx="5486400" cy="4114800"/>
-          </a:xfrm>
-          <a:prstGeom prst="rect">
-            <a:avLst/>
-          </a:prstGeom>
-        </p:spPr>
-        <p:txBody>
-          <a:bodyPr anchorCtr="0" anchor="t" bIns="91425" lIns="91425" spcFirstLastPara="1" rIns="91425" wrap="square" tIns="91425">
-            <a:noAutofit/>
-          </a:bodyPr>
-          <a:lstStyle/>
-          <a:p>
-            <a:pPr indent="0" lvl="0" marL="0" rtl="0" algn="l">
-              <a:spcBef>
-                <a:spcPts val="0"/>
-              </a:spcBef>
-              <a:spcAft>
-                <a:spcPts val="0"/>
-              </a:spcAft>
-              <a:buNone/>
-            </a:pPr>
-            <a:r>
-              <a:t/>
-            </a:r>
-            <a:endParaRPr/>
-          </a:p>
-        </p:txBody>
-      </p:sp>
-      <p:sp>
-        <p:nvSpPr>
-          <p:cNvPr id="94" name="Google Shape;94;p4:notes"/>
+          <p:cNvPr id="93" name="Google Shape;93;g3a10585ea2e_0_0:notes"/>
           <p:cNvSpPr/>
           <p:nvPr>
             <p:ph idx="2" type="sldImg"/>
@@ -1443,7 +1604,7 @@
         <p:spPr>
           <a:xfrm>
             <a:off x="1143225" y="685800"/>
-            <a:ext cx="4572225" cy="3429000"/>
+            <a:ext cx="4572300" cy="3429000"/>
           </a:xfrm>
           <a:custGeom>
             <a:rect b="b" l="l" r="r" t="t"/>
@@ -1466,6 +1627,45 @@
             </a:pathLst>
           </a:custGeom>
         </p:spPr>
+      </p:sp>
+      <p:sp>
+        <p:nvSpPr>
+          <p:cNvPr id="94" name="Google Shape;94;g3a10585ea2e_0_0:notes"/>
+          <p:cNvSpPr txBox="1"/>
+          <p:nvPr>
+            <p:ph idx="1" type="body"/>
+          </p:nvPr>
+        </p:nvSpPr>
+        <p:spPr>
+          <a:xfrm>
+            <a:off x="685800" y="4343400"/>
+            <a:ext cx="5486400" cy="4114800"/>
+          </a:xfrm>
+          <a:prstGeom prst="rect">
+            <a:avLst/>
+          </a:prstGeom>
+        </p:spPr>
+        <p:txBody>
+          <a:bodyPr anchorCtr="0" anchor="t" bIns="91425" lIns="91425" spcFirstLastPara="1" rIns="91425" wrap="square" tIns="91425">
+            <a:noAutofit/>
+          </a:bodyPr>
+          <a:lstStyle/>
+          <a:p>
+            <a:pPr indent="0" lvl="0" marL="0" rtl="0" algn="l">
+              <a:spcBef>
+                <a:spcPts val="0"/>
+              </a:spcBef>
+              <a:spcAft>
+                <a:spcPts val="0"/>
+              </a:spcAft>
+              <a:buNone/>
+            </a:pPr>
+            <a:r>
+              <a:t/>
+            </a:r>
+            <a:endParaRPr/>
+          </a:p>
+        </p:txBody>
       </p:sp>
     </p:spTree>
   </p:cSld>
@@ -1494,7 +1694,7 @@
       </p:grpSpPr>
       <p:sp>
         <p:nvSpPr>
-          <p:cNvPr id="99" name="Google Shape;99;p5:notes"/>
+          <p:cNvPr id="99" name="Google Shape;99;p4:notes"/>
           <p:cNvSpPr txBox="1"/>
           <p:nvPr>
             <p:ph idx="1" type="body"/>
@@ -1533,7 +1733,7 @@
       </p:sp>
       <p:sp>
         <p:nvSpPr>
-          <p:cNvPr id="100" name="Google Shape;100;p5:notes"/>
+          <p:cNvPr id="100" name="Google Shape;100;p4:notes"/>
           <p:cNvSpPr/>
           <p:nvPr>
             <p:ph idx="2" type="sldImg"/>
@@ -1579,7 +1779,7 @@
   <p:cSld>
     <p:spTree>
       <p:nvGrpSpPr>
-        <p:cNvPr id="105" name="Shape 105"/>
+        <p:cNvPr id="104" name="Shape 104"/>
         <p:cNvGrpSpPr/>
         <p:nvPr/>
       </p:nvGrpSpPr>
@@ -1593,7 +1793,7 @@
       </p:grpSpPr>
       <p:sp>
         <p:nvSpPr>
-          <p:cNvPr id="106" name="Google Shape;106;p6:notes"/>
+          <p:cNvPr id="105" name="Google Shape;105;p5:notes"/>
           <p:cNvSpPr txBox="1"/>
           <p:nvPr>
             <p:ph idx="1" type="body"/>
@@ -1632,7 +1832,7 @@
       </p:sp>
       <p:sp>
         <p:nvSpPr>
-          <p:cNvPr id="107" name="Google Shape;107;p6:notes"/>
+          <p:cNvPr id="106" name="Google Shape;106;p5:notes"/>
           <p:cNvSpPr/>
           <p:nvPr>
             <p:ph idx="2" type="sldImg"/>
@@ -1678,7 +1878,7 @@
   <p:cSld>
     <p:spTree>
       <p:nvGrpSpPr>
-        <p:cNvPr id="124" name="Shape 124"/>
+        <p:cNvPr id="111" name="Shape 111"/>
         <p:cNvGrpSpPr/>
         <p:nvPr/>
       </p:nvGrpSpPr>
@@ -1692,7 +1892,7 @@
       </p:grpSpPr>
       <p:sp>
         <p:nvSpPr>
-          <p:cNvPr id="125" name="Google Shape;125;p7:notes"/>
+          <p:cNvPr id="112" name="Google Shape;112;p6:notes"/>
           <p:cNvSpPr txBox="1"/>
           <p:nvPr>
             <p:ph idx="1" type="body"/>
@@ -1731,7 +1931,7 @@
       </p:sp>
       <p:sp>
         <p:nvSpPr>
-          <p:cNvPr id="126" name="Google Shape;126;p7:notes"/>
+          <p:cNvPr id="113" name="Google Shape;113;p6:notes"/>
           <p:cNvSpPr/>
           <p:nvPr>
             <p:ph idx="2" type="sldImg"/>
@@ -1777,7 +1977,7 @@
   <p:cSld>
     <p:spTree>
       <p:nvGrpSpPr>
-        <p:cNvPr id="132" name="Shape 132"/>
+        <p:cNvPr id="130" name="Shape 130"/>
         <p:cNvGrpSpPr/>
         <p:nvPr/>
       </p:nvGrpSpPr>
@@ -1791,7 +1991,7 @@
       </p:grpSpPr>
       <p:sp>
         <p:nvSpPr>
-          <p:cNvPr id="133" name="Google Shape;133;p8:notes"/>
+          <p:cNvPr id="131" name="Google Shape;131;p7:notes"/>
           <p:cNvSpPr txBox="1"/>
           <p:nvPr>
             <p:ph idx="1" type="body"/>
@@ -1830,7 +2030,7 @@
       </p:sp>
       <p:sp>
         <p:nvSpPr>
-          <p:cNvPr id="134" name="Google Shape;134;p8:notes"/>
+          <p:cNvPr id="132" name="Google Shape;132;p7:notes"/>
           <p:cNvSpPr/>
           <p:nvPr>
             <p:ph idx="2" type="sldImg"/>
@@ -1876,7 +2076,7 @@
   <p:cSld>
     <p:spTree>
       <p:nvGrpSpPr>
-        <p:cNvPr id="147" name="Shape 147"/>
+        <p:cNvPr id="138" name="Shape 138"/>
         <p:cNvGrpSpPr/>
         <p:nvPr/>
       </p:nvGrpSpPr>
@@ -1890,7 +2090,7 @@
       </p:grpSpPr>
       <p:sp>
         <p:nvSpPr>
-          <p:cNvPr id="148" name="Google Shape;148;p9:notes"/>
+          <p:cNvPr id="139" name="Google Shape;139;p8:notes"/>
           <p:cNvSpPr txBox="1"/>
           <p:nvPr>
             <p:ph idx="1" type="body"/>
@@ -1929,7 +2129,7 @@
       </p:sp>
       <p:sp>
         <p:nvSpPr>
-          <p:cNvPr id="149" name="Google Shape;149;p9:notes"/>
+          <p:cNvPr id="140" name="Google Shape;140;p8:notes"/>
           <p:cNvSpPr/>
           <p:nvPr>
             <p:ph idx="2" type="sldImg"/>
@@ -1989,7 +2189,7 @@
       </p:grpSpPr>
       <p:sp>
         <p:nvSpPr>
-          <p:cNvPr id="154" name="Google Shape;154;p10:notes"/>
+          <p:cNvPr id="154" name="Google Shape;154;p9:notes"/>
           <p:cNvSpPr txBox="1"/>
           <p:nvPr>
             <p:ph idx="1" type="body"/>
@@ -2028,7 +2228,7 @@
       </p:sp>
       <p:sp>
         <p:nvSpPr>
-          <p:cNvPr id="155" name="Google Shape;155;p10:notes"/>
+          <p:cNvPr id="155" name="Google Shape;155;p9:notes"/>
           <p:cNvSpPr/>
           <p:nvPr>
             <p:ph idx="2" type="sldImg"/>
@@ -12258,7 +12458,7 @@
             </a:pPr>
             <a:r>
               <a:rPr lang="en-US"/>
-              <a:t>Sphinx basics</a:t>
+              <a:t>Sphinx</a:t>
             </a:r>
             <a:endParaRPr/>
           </a:p>
@@ -12287,34 +12487,43 @@
         </p:spPr>
         <p:txBody>
           <a:bodyPr anchorCtr="0" anchor="t" bIns="45700" lIns="91425" spcFirstLastPara="1" rIns="91425" wrap="square" tIns="45700">
-            <a:normAutofit lnSpcReduction="10000"/>
+            <a:normAutofit fontScale="92500" lnSpcReduction="20000"/>
           </a:bodyPr>
           <a:lstStyle/>
           <a:p>
-            <a:pPr indent="-228600" lvl="0" marL="228600" rtl="0" algn="l">
-              <a:lnSpc>
-                <a:spcPct val="90000"/>
-              </a:lnSpc>
-              <a:spcBef>
-                <a:spcPts val="0"/>
-              </a:spcBef>
-              <a:spcAft>
-                <a:spcPts val="0"/>
-              </a:spcAft>
-              <a:buClr>
-                <a:schemeClr val="dk1"/>
-              </a:buClr>
-              <a:buSzPts val="2800"/>
-              <a:buChar char="•"/>
+            <a:pPr indent="0" lvl="0" marL="0" rtl="0" algn="l">
+              <a:lnSpc>
+                <a:spcPct val="90000"/>
+              </a:lnSpc>
+              <a:spcBef>
+                <a:spcPts val="0"/>
+              </a:spcBef>
+              <a:spcAft>
+                <a:spcPts val="0"/>
+              </a:spcAft>
+              <a:buClr>
+                <a:schemeClr val="dk1"/>
+              </a:buClr>
+              <a:buSzPct val="100000"/>
+              <a:buNone/>
             </a:pPr>
             <a:r>
+              <a:rPr lang="en-US" u="sng">
+                <a:solidFill>
+                  <a:schemeClr val="hlink"/>
+                </a:solidFill>
+                <a:hlinkClick r:id="rId3"/>
+              </a:rPr>
+              <a:t>Sphinx</a:t>
+            </a:r>
+            <a:r>
               <a:rPr lang="en-US"/>
-              <a:t>The .. toctree:: directive is the most important element of a Sphinx project. Every reST file must be referenced by a toctree.</a:t>
+              <a:t> is an open-source documentation generation framework that uses reStructuredText as its source. </a:t>
             </a:r>
             <a:endParaRPr/>
           </a:p>
           <a:p>
-            <a:pPr indent="-228600" lvl="0" marL="228600" rtl="0" algn="l">
+            <a:pPr indent="0" lvl="0" marL="0" rtl="0" algn="l">
               <a:lnSpc>
                 <a:spcPct val="90000"/>
               </a:lnSpc>
@@ -12327,17 +12536,16 @@
               <a:buClr>
                 <a:schemeClr val="dk1"/>
               </a:buClr>
-              <a:buSzPts val="2800"/>
-              <a:buChar char="•"/>
+              <a:buSzPct val="100000"/>
+              <a:buNone/>
             </a:pPr>
             <a:r>
-              <a:rPr lang="en-US"/>
-              <a:t>Link to any reference target using the :ref: role no matter what file it is in (this is why they should be unique).</a:t>
+              <a:t/>
             </a:r>
             <a:endParaRPr/>
           </a:p>
           <a:p>
-            <a:pPr indent="-228600" lvl="0" marL="228600" rtl="0" algn="l">
+            <a:pPr indent="0" lvl="0" marL="0" rtl="0" algn="l">
               <a:lnSpc>
                 <a:spcPct val="90000"/>
               </a:lnSpc>
@@ -12350,97 +12558,100 @@
               <a:buClr>
                 <a:schemeClr val="dk1"/>
               </a:buClr>
-              <a:buSzPts val="2800"/>
-              <a:buChar char="•"/>
+              <a:buSzPct val="100000"/>
+              <a:buNone/>
             </a:pPr>
             <a:r>
               <a:rPr lang="en-US"/>
-              <a:t>Only two files are required (the 3</a:t>
-            </a:r>
-            <a:r>
-              <a:rPr baseline="30000" lang="en-US"/>
-              <a:t>rd</a:t>
-            </a:r>
-            <a:r>
-              <a:rPr lang="en-US"/>
-              <a:t> is optional):</a:t>
+              <a:t>It was originally developed to create documentation for the Python programming language and is written in Python.</a:t>
             </a:r>
             <a:endParaRPr/>
           </a:p>
           <a:p>
-            <a:pPr indent="-457200" lvl="1" marL="914400" rtl="0" algn="l">
-              <a:lnSpc>
-                <a:spcPct val="90000"/>
-              </a:lnSpc>
-              <a:spcBef>
-                <a:spcPts val="500"/>
-              </a:spcBef>
-              <a:spcAft>
-                <a:spcPts val="0"/>
-              </a:spcAft>
-              <a:buClr>
-                <a:schemeClr val="dk1"/>
-              </a:buClr>
-              <a:buSzPts val="2400"/>
-              <a:buFont typeface="Calibri"/>
-              <a:buAutoNum type="arabicPeriod"/>
+            <a:pPr indent="0" lvl="0" marL="0" rtl="0" algn="l">
+              <a:lnSpc>
+                <a:spcPct val="90000"/>
+              </a:lnSpc>
+              <a:spcBef>
+                <a:spcPts val="1000"/>
+              </a:spcBef>
+              <a:spcAft>
+                <a:spcPts val="0"/>
+              </a:spcAft>
+              <a:buClr>
+                <a:schemeClr val="dk1"/>
+              </a:buClr>
+              <a:buSzPct val="100000"/>
+              <a:buNone/>
             </a:pPr>
             <a:r>
-              <a:rPr lang="en-US"/>
-              <a:t>conf.py – configuration information for the Sphinx project.</a:t>
+              <a:t/>
             </a:r>
             <a:endParaRPr/>
           </a:p>
           <a:p>
-            <a:pPr indent="-457200" lvl="1" marL="914400" rtl="0" algn="l">
-              <a:lnSpc>
-                <a:spcPct val="90000"/>
-              </a:lnSpc>
-              <a:spcBef>
-                <a:spcPts val="500"/>
-              </a:spcBef>
-              <a:spcAft>
-                <a:spcPts val="0"/>
-              </a:spcAft>
-              <a:buClr>
-                <a:schemeClr val="dk1"/>
-              </a:buClr>
-              <a:buSzPts val="2400"/>
-              <a:buFont typeface="Calibri"/>
-              <a:buAutoNum type="arabicPeriod"/>
+            <a:pPr indent="0" lvl="0" marL="0" rtl="0" algn="l">
+              <a:lnSpc>
+                <a:spcPct val="90000"/>
+              </a:lnSpc>
+              <a:spcBef>
+                <a:spcPts val="1000"/>
+              </a:spcBef>
+              <a:spcAft>
+                <a:spcPts val="0"/>
+              </a:spcAft>
+              <a:buClr>
+                <a:schemeClr val="dk1"/>
+              </a:buClr>
+              <a:buSzPct val="100000"/>
+              <a:buNone/>
             </a:pPr>
             <a:r>
               <a:rPr lang="en-US"/>
-              <a:t>index.rst – top level file with primary toctree.</a:t>
+              <a:t>It can combine any number of reST files into a single document set. Sphinx markup is a superset of reStructuredText, defining new </a:t>
+            </a:r>
+            <a:r>
+              <a:rPr b="1" lang="en-US"/>
+              <a:t>directives</a:t>
+            </a:r>
+            <a:r>
+              <a:rPr lang="en-US"/>
+              <a:t> and </a:t>
+            </a:r>
+            <a:r>
+              <a:rPr b="1" lang="en-US"/>
+              <a:t>roles</a:t>
+            </a:r>
+            <a:r>
+              <a:rPr lang="en-US"/>
+              <a:t>. </a:t>
             </a:r>
             <a:endParaRPr/>
           </a:p>
           <a:p>
-            <a:pPr indent="-457200" lvl="1" marL="914400" rtl="0" algn="l">
-              <a:lnSpc>
-                <a:spcPct val="90000"/>
-              </a:lnSpc>
-              <a:spcBef>
-                <a:spcPts val="500"/>
-              </a:spcBef>
-              <a:spcAft>
-                <a:spcPts val="0"/>
-              </a:spcAft>
-              <a:buClr>
-                <a:schemeClr val="dk1"/>
-              </a:buClr>
-              <a:buSzPts val="2400"/>
-              <a:buFont typeface="Calibri"/>
-              <a:buAutoNum type="arabicPeriod"/>
+            <a:pPr indent="0" lvl="0" marL="0" rtl="0" algn="l">
+              <a:lnSpc>
+                <a:spcPct val="90000"/>
+              </a:lnSpc>
+              <a:spcBef>
+                <a:spcPts val="1000"/>
+              </a:spcBef>
+              <a:spcAft>
+                <a:spcPts val="0"/>
+              </a:spcAft>
+              <a:buClr>
+                <a:schemeClr val="dk1"/>
+              </a:buClr>
+              <a:buSzPct val="100000"/>
+              <a:buNone/>
             </a:pPr>
             <a:r>
-              <a:rPr lang="en-US"/>
-              <a:t>Makefile/make.bat – are included to make building easier.</a:t>
+              <a:t/>
             </a:r>
             <a:endParaRPr/>
           </a:p>
           <a:p>
-            <a:pPr indent="-228600" lvl="0" marL="228600" rtl="0" algn="l">
+            <a:pPr indent="0" lvl="0" marL="0" rtl="0" algn="l">
               <a:lnSpc>
                 <a:spcPct val="90000"/>
               </a:lnSpc>
@@ -12453,58 +12664,34 @@
               <a:buClr>
                 <a:schemeClr val="dk1"/>
               </a:buClr>
-              <a:buSzPts val="2800"/>
-              <a:buChar char="•"/>
+              <a:buSzPct val="100000"/>
+              <a:buNone/>
             </a:pPr>
             <a:r>
               <a:rPr lang="en-US"/>
-              <a:t>Build the docs:</a:t>
+              <a:t>Sphinx makes it easy to customize the look and feel of the static HTML output.</a:t>
             </a:r>
             <a:endParaRPr/>
           </a:p>
           <a:p>
-            <a:pPr indent="-228600" lvl="1" marL="685800" rtl="0" algn="l">
-              <a:lnSpc>
-                <a:spcPct val="90000"/>
-              </a:lnSpc>
-              <a:spcBef>
-                <a:spcPts val="500"/>
-              </a:spcBef>
-              <a:spcAft>
-                <a:spcPts val="0"/>
-              </a:spcAft>
-              <a:buClr>
-                <a:schemeClr val="dk1"/>
-              </a:buClr>
-              <a:buSzPts val="2400"/>
-              <a:buChar char="•"/>
+            <a:pPr indent="0" lvl="0" marL="0" rtl="0" algn="l">
+              <a:lnSpc>
+                <a:spcPct val="90000"/>
+              </a:lnSpc>
+              <a:spcBef>
+                <a:spcPts val="1000"/>
+              </a:spcBef>
+              <a:spcAft>
+                <a:spcPts val="0"/>
+              </a:spcAft>
+              <a:buClr>
+                <a:schemeClr val="dk1"/>
+              </a:buClr>
+              <a:buSzPct val="100000"/>
+              <a:buNone/>
             </a:pPr>
             <a:r>
-              <a:rPr lang="en-US"/>
-              <a:t>Using make: make html</a:t>
-            </a:r>
-            <a:endParaRPr/>
-          </a:p>
-          <a:p>
-            <a:pPr indent="-228600" lvl="1" marL="685800" rtl="0" algn="l">
-              <a:lnSpc>
-                <a:spcPct val="90000"/>
-              </a:lnSpc>
-              <a:spcBef>
-                <a:spcPts val="500"/>
-              </a:spcBef>
-              <a:spcAft>
-                <a:spcPts val="0"/>
-              </a:spcAft>
-              <a:buClr>
-                <a:schemeClr val="dk1"/>
-              </a:buClr>
-              <a:buSzPts val="2400"/>
-              <a:buChar char="•"/>
-            </a:pPr>
-            <a:r>
-              <a:rPr lang="en-US"/>
-              <a:t>sphinx-build -b html . _build/html  </a:t>
+              <a:t/>
             </a:r>
             <a:endParaRPr/>
           </a:p>
@@ -12546,11 +12733,15 @@
         <p:spPr>
           <a:xfrm>
             <a:off x="838200" y="365125"/>
-            <a:ext cx="10515600" cy="1325700"/>
+            <a:ext cx="10515600" cy="1325563"/>
           </a:xfrm>
           <a:prstGeom prst="rect">
             <a:avLst/>
           </a:prstGeom>
+          <a:noFill/>
+          <a:ln>
+            <a:noFill/>
+          </a:ln>
         </p:spPr>
         <p:txBody>
           <a:bodyPr anchorCtr="0" anchor="ctr" bIns="45700" lIns="91425" spcFirstLastPara="1" rIns="91425" wrap="square" tIns="45700">
@@ -12559,17 +12750,25 @@
           <a:lstStyle/>
           <a:p>
             <a:pPr indent="0" lvl="0" marL="0" rtl="0" algn="l">
-              <a:spcBef>
-                <a:spcPts val="0"/>
-              </a:spcBef>
-              <a:spcAft>
-                <a:spcPts val="0"/>
-              </a:spcAft>
+              <a:lnSpc>
+                <a:spcPct val="90000"/>
+              </a:lnSpc>
+              <a:spcBef>
+                <a:spcPts val="0"/>
+              </a:spcBef>
+              <a:spcAft>
+                <a:spcPts val="0"/>
+              </a:spcAft>
+              <a:buClr>
+                <a:schemeClr val="dk1"/>
+              </a:buClr>
+              <a:buSzPts val="4400"/>
+              <a:buFont typeface="Calibri"/>
               <a:buNone/>
             </a:pPr>
             <a:r>
               <a:rPr lang="en-US"/>
-              <a:t>Some Sphinx conventions</a:t>
+              <a:t>Sphinx basics</a:t>
             </a:r>
             <a:endParaRPr/>
           </a:p>
@@ -12586,82 +12785,236 @@
         <p:spPr>
           <a:xfrm>
             <a:off x="838200" y="1825625"/>
-            <a:ext cx="10515600" cy="4351200"/>
+            <a:ext cx="10515600" cy="4351338"/>
           </a:xfrm>
           <a:prstGeom prst="rect">
             <a:avLst/>
           </a:prstGeom>
+          <a:noFill/>
+          <a:ln>
+            <a:noFill/>
+          </a:ln>
         </p:spPr>
         <p:txBody>
           <a:bodyPr anchorCtr="0" anchor="t" bIns="45700" lIns="91425" spcFirstLastPara="1" rIns="91425" wrap="square" tIns="45700">
-            <a:normAutofit/>
+            <a:normAutofit lnSpcReduction="10000"/>
           </a:bodyPr>
           <a:lstStyle/>
           <a:p>
-            <a:pPr indent="-342900" lvl="0" marL="457200" rtl="0" algn="l">
-              <a:spcBef>
-                <a:spcPts val="1000"/>
-              </a:spcBef>
-              <a:spcAft>
-                <a:spcPts val="0"/>
-              </a:spcAft>
-              <a:buSzPts val="1800"/>
-              <a:buChar char="●"/>
+            <a:pPr indent="-228600" lvl="0" marL="228600" rtl="0" algn="l">
+              <a:lnSpc>
+                <a:spcPct val="90000"/>
+              </a:lnSpc>
+              <a:spcBef>
+                <a:spcPts val="0"/>
+              </a:spcBef>
+              <a:spcAft>
+                <a:spcPts val="0"/>
+              </a:spcAft>
+              <a:buClr>
+                <a:schemeClr val="dk1"/>
+              </a:buClr>
+              <a:buSzPts val="2800"/>
+              <a:buChar char="•"/>
             </a:pPr>
             <a:r>
               <a:rPr lang="en-US"/>
-              <a:t>Start support directories with a “_”.</a:t>
+              <a:t>The .. toctree:: directive is the most important element of a Sphinx project. Every reST file must be referenced by a toctree.</a:t>
             </a:r>
             <a:endParaRPr/>
           </a:p>
           <a:p>
-            <a:pPr indent="-342900" lvl="0" marL="457200" rtl="0" algn="l">
-              <a:spcBef>
-                <a:spcPts val="0"/>
-              </a:spcBef>
-              <a:spcAft>
-                <a:spcPts val="0"/>
-              </a:spcAft>
-              <a:buSzPts val="1800"/>
-              <a:buChar char="●"/>
+            <a:pPr indent="-228600" lvl="0" marL="228600" rtl="0" algn="l">
+              <a:lnSpc>
+                <a:spcPct val="90000"/>
+              </a:lnSpc>
+              <a:spcBef>
+                <a:spcPts val="1000"/>
+              </a:spcBef>
+              <a:spcAft>
+                <a:spcPts val="0"/>
+              </a:spcAft>
+              <a:buClr>
+                <a:schemeClr val="dk1"/>
+              </a:buClr>
+              <a:buSzPts val="2800"/>
+              <a:buChar char="•"/>
             </a:pPr>
             <a:r>
               <a:rPr lang="en-US"/>
-              <a:t>Top level “_images” directory is easiest to manage and allows for reuse.</a:t>
+              <a:t>Link to any reference target using the :ref: role no matter what file it is in (this is why they should be unique).</a:t>
             </a:r>
             <a:endParaRPr/>
           </a:p>
           <a:p>
-            <a:pPr indent="-342900" lvl="0" marL="457200" rtl="0" algn="l">
-              <a:spcBef>
-                <a:spcPts val="0"/>
-              </a:spcBef>
-              <a:spcAft>
-                <a:spcPts val="0"/>
-              </a:spcAft>
-              <a:buSzPts val="1800"/>
-              <a:buChar char="●"/>
+            <a:pPr indent="-228600" lvl="0" marL="228600" rtl="0" algn="l">
+              <a:lnSpc>
+                <a:spcPct val="90000"/>
+              </a:lnSpc>
+              <a:spcBef>
+                <a:spcPts val="1000"/>
+              </a:spcBef>
+              <a:spcAft>
+                <a:spcPts val="0"/>
+              </a:spcAft>
+              <a:buClr>
+                <a:schemeClr val="dk1"/>
+              </a:buClr>
+              <a:buSzPts val="2800"/>
+              <a:buChar char="•"/>
             </a:pPr>
             <a:r>
               <a:rPr lang="en-US"/>
-              <a:t>Try not to use more than 3 header levels. These are the ones I use for 1-3: “#”, “=”, “-”</a:t>
+              <a:t>Only two files are required (the 3</a:t>
+            </a:r>
+            <a:r>
+              <a:rPr baseline="30000" lang="en-US"/>
+              <a:t>rd</a:t>
+            </a:r>
+            <a:r>
+              <a:rPr lang="en-US"/>
+              <a:t> is optional):</a:t>
             </a:r>
             <a:endParaRPr/>
           </a:p>
           <a:p>
-            <a:pPr indent="-342900" lvl="0" marL="457200" rtl="0" algn="l">
-              <a:spcBef>
-                <a:spcPts val="0"/>
-              </a:spcBef>
-              <a:spcAft>
-                <a:spcPts val="0"/>
-              </a:spcAft>
-              <a:buSzPts val="1800"/>
-              <a:buChar char="●"/>
+            <a:pPr indent="-457200" lvl="1" marL="914400" rtl="0" algn="l">
+              <a:lnSpc>
+                <a:spcPct val="90000"/>
+              </a:lnSpc>
+              <a:spcBef>
+                <a:spcPts val="500"/>
+              </a:spcBef>
+              <a:spcAft>
+                <a:spcPts val="0"/>
+              </a:spcAft>
+              <a:buClr>
+                <a:schemeClr val="dk1"/>
+              </a:buClr>
+              <a:buSzPts val="2400"/>
+              <a:buFont typeface="Calibri"/>
+              <a:buAutoNum type="arabicPeriod"/>
             </a:pPr>
             <a:r>
               <a:rPr lang="en-US"/>
-              <a:t>In long paragraphs, add a carriage return at around 80 characters to make it easier to debug in Git etc. This won’t affect how it renders. </a:t>
+              <a:t>conf.py – configuration information for the Sphinx project.</a:t>
+            </a:r>
+            <a:endParaRPr/>
+          </a:p>
+          <a:p>
+            <a:pPr indent="-457200" lvl="1" marL="914400" rtl="0" algn="l">
+              <a:lnSpc>
+                <a:spcPct val="90000"/>
+              </a:lnSpc>
+              <a:spcBef>
+                <a:spcPts val="500"/>
+              </a:spcBef>
+              <a:spcAft>
+                <a:spcPts val="0"/>
+              </a:spcAft>
+              <a:buClr>
+                <a:schemeClr val="dk1"/>
+              </a:buClr>
+              <a:buSzPts val="2400"/>
+              <a:buFont typeface="Calibri"/>
+              <a:buAutoNum type="arabicPeriod"/>
+            </a:pPr>
+            <a:r>
+              <a:rPr lang="en-US"/>
+              <a:t>index.rst – top level file with primary toctree.</a:t>
+            </a:r>
+            <a:endParaRPr/>
+          </a:p>
+          <a:p>
+            <a:pPr indent="-457200" lvl="1" marL="914400" rtl="0" algn="l">
+              <a:lnSpc>
+                <a:spcPct val="90000"/>
+              </a:lnSpc>
+              <a:spcBef>
+                <a:spcPts val="500"/>
+              </a:spcBef>
+              <a:spcAft>
+                <a:spcPts val="0"/>
+              </a:spcAft>
+              <a:buClr>
+                <a:schemeClr val="dk1"/>
+              </a:buClr>
+              <a:buSzPts val="2400"/>
+              <a:buFont typeface="Calibri"/>
+              <a:buAutoNum type="arabicPeriod"/>
+            </a:pPr>
+            <a:r>
+              <a:rPr lang="en-US"/>
+              <a:t>Makefile/make.bat – are included to make building easier.</a:t>
+            </a:r>
+            <a:endParaRPr/>
+          </a:p>
+          <a:p>
+            <a:pPr indent="-228600" lvl="0" marL="228600" rtl="0" algn="l">
+              <a:lnSpc>
+                <a:spcPct val="90000"/>
+              </a:lnSpc>
+              <a:spcBef>
+                <a:spcPts val="1000"/>
+              </a:spcBef>
+              <a:spcAft>
+                <a:spcPts val="0"/>
+              </a:spcAft>
+              <a:buClr>
+                <a:schemeClr val="dk1"/>
+              </a:buClr>
+              <a:buSzPts val="2800"/>
+              <a:buChar char="•"/>
+            </a:pPr>
+            <a:r>
+              <a:rPr lang="en-US"/>
+              <a:t>Build the docs:</a:t>
+            </a:r>
+            <a:endParaRPr/>
+          </a:p>
+          <a:p>
+            <a:pPr indent="-228600" lvl="1" marL="685800" rtl="0" algn="l">
+              <a:lnSpc>
+                <a:spcPct val="90000"/>
+              </a:lnSpc>
+              <a:spcBef>
+                <a:spcPts val="500"/>
+              </a:spcBef>
+              <a:spcAft>
+                <a:spcPts val="0"/>
+              </a:spcAft>
+              <a:buClr>
+                <a:schemeClr val="dk1"/>
+              </a:buClr>
+              <a:buSzPts val="2400"/>
+              <a:buChar char="•"/>
+            </a:pPr>
+            <a:r>
+              <a:rPr lang="en-US"/>
+              <a:t>Using make: make html</a:t>
+            </a:r>
+            <a:endParaRPr/>
+          </a:p>
+          <a:p>
+            <a:pPr indent="-228600" lvl="1" marL="685800" rtl="0" algn="l">
+              <a:lnSpc>
+                <a:spcPct val="90000"/>
+              </a:lnSpc>
+              <a:spcBef>
+                <a:spcPts val="500"/>
+              </a:spcBef>
+              <a:spcAft>
+                <a:spcPts val="0"/>
+              </a:spcAft>
+              <a:buClr>
+                <a:schemeClr val="dk1"/>
+              </a:buClr>
+              <a:buSzPts val="2400"/>
+              <a:buChar char="•"/>
+            </a:pPr>
+            <a:r>
+              <a:rPr lang="en-US"/>
+              <a:t>sphinx-build -b html . _build/html  </a:t>
             </a:r>
             <a:endParaRPr/>
           </a:p>
@@ -12703,15 +13056,11 @@
         <p:spPr>
           <a:xfrm>
             <a:off x="838200" y="365125"/>
-            <a:ext cx="10515600" cy="1325563"/>
+            <a:ext cx="10515600" cy="1325700"/>
           </a:xfrm>
           <a:prstGeom prst="rect">
             <a:avLst/>
           </a:prstGeom>
-          <a:noFill/>
-          <a:ln>
-            <a:noFill/>
-          </a:ln>
         </p:spPr>
         <p:txBody>
           <a:bodyPr anchorCtr="0" anchor="ctr" bIns="45700" lIns="91425" spcFirstLastPara="1" rIns="91425" wrap="square" tIns="45700">
@@ -12720,25 +13069,17 @@
           <a:lstStyle/>
           <a:p>
             <a:pPr indent="0" lvl="0" marL="0" rtl="0" algn="l">
-              <a:lnSpc>
-                <a:spcPct val="90000"/>
-              </a:lnSpc>
-              <a:spcBef>
-                <a:spcPts val="0"/>
-              </a:spcBef>
-              <a:spcAft>
-                <a:spcPts val="0"/>
-              </a:spcAft>
-              <a:buClr>
-                <a:schemeClr val="dk1"/>
-              </a:buClr>
-              <a:buSzPts val="4400"/>
-              <a:buFont typeface="Calibri"/>
+              <a:spcBef>
+                <a:spcPts val="0"/>
+              </a:spcBef>
+              <a:spcAft>
+                <a:spcPts val="0"/>
+              </a:spcAft>
               <a:buNone/>
             </a:pPr>
             <a:r>
               <a:rPr lang="en-US"/>
-              <a:t>Takeaways</a:t>
+              <a:t>Some Sphinx conventions</a:t>
             </a:r>
             <a:endParaRPr/>
           </a:p>
@@ -12755,15 +13096,11 @@
         <p:spPr>
           <a:xfrm>
             <a:off x="838200" y="1825625"/>
-            <a:ext cx="10515600" cy="4351338"/>
+            <a:ext cx="10515600" cy="4351200"/>
           </a:xfrm>
           <a:prstGeom prst="rect">
             <a:avLst/>
           </a:prstGeom>
-          <a:noFill/>
-          <a:ln>
-            <a:noFill/>
-          </a:ln>
         </p:spPr>
         <p:txBody>
           <a:bodyPr anchorCtr="0" anchor="t" bIns="45700" lIns="91425" spcFirstLastPara="1" rIns="91425" wrap="square" tIns="45700">
@@ -12771,163 +13108,70 @@
           </a:bodyPr>
           <a:lstStyle/>
           <a:p>
-            <a:pPr indent="-406400" lvl="0" marL="457200" rtl="0" algn="l">
-              <a:lnSpc>
-                <a:spcPct val="90000"/>
-              </a:lnSpc>
-              <a:spcBef>
-                <a:spcPts val="0"/>
-              </a:spcBef>
-              <a:spcAft>
-                <a:spcPts val="0"/>
-              </a:spcAft>
-              <a:buSzPts val="2800"/>
-              <a:buChar char="•"/>
+            <a:pPr indent="-342900" lvl="0" marL="457200" rtl="0" algn="l">
+              <a:spcBef>
+                <a:spcPts val="1000"/>
+              </a:spcBef>
+              <a:spcAft>
+                <a:spcPts val="0"/>
+              </a:spcAft>
+              <a:buSzPts val="1800"/>
+              <a:buChar char="●"/>
             </a:pPr>
             <a:r>
               <a:rPr lang="en-US"/>
-              <a:t>Most of reST is defined in </a:t>
-            </a:r>
-            <a:r>
-              <a:rPr lang="en-US" u="sng">
-                <a:solidFill>
-                  <a:schemeClr val="hlink"/>
-                </a:solidFill>
-                <a:hlinkClick r:id="rId3"/>
-              </a:rPr>
-              <a:t>Docutils</a:t>
-            </a:r>
-            <a:r>
-              <a:rPr lang="en-US"/>
-              <a:t>.</a:t>
+              <a:t>Start support directories with a “_”.</a:t>
             </a:r>
             <a:endParaRPr/>
           </a:p>
           <a:p>
-            <a:pPr indent="-406400" lvl="0" marL="457200" rtl="0" algn="l">
-              <a:lnSpc>
-                <a:spcPct val="90000"/>
-              </a:lnSpc>
-              <a:spcBef>
-                <a:spcPts val="0"/>
-              </a:spcBef>
-              <a:spcAft>
-                <a:spcPts val="0"/>
-              </a:spcAft>
-              <a:buSzPts val="2800"/>
-              <a:buChar char="•"/>
+            <a:pPr indent="-342900" lvl="0" marL="457200" rtl="0" algn="l">
+              <a:spcBef>
+                <a:spcPts val="0"/>
+              </a:spcBef>
+              <a:spcAft>
+                <a:spcPts val="0"/>
+              </a:spcAft>
+              <a:buSzPts val="1800"/>
+              <a:buChar char="●"/>
             </a:pPr>
             <a:r>
               <a:rPr lang="en-US"/>
-              <a:t>Sphinx combines reST files to create a hierarchical document.</a:t>
+              <a:t>Top level “_images” directory is easiest to manage and allows for reuse.</a:t>
             </a:r>
             <a:endParaRPr/>
           </a:p>
           <a:p>
-            <a:pPr indent="-406400" lvl="0" marL="457200" rtl="0" algn="l">
-              <a:lnSpc>
-                <a:spcPct val="90000"/>
-              </a:lnSpc>
-              <a:spcBef>
-                <a:spcPts val="0"/>
-              </a:spcBef>
-              <a:spcAft>
-                <a:spcPts val="0"/>
-              </a:spcAft>
-              <a:buSzPts val="2800"/>
-              <a:buChar char="•"/>
+            <a:pPr indent="-342900" lvl="0" marL="457200" rtl="0" algn="l">
+              <a:spcBef>
+                <a:spcPts val="0"/>
+              </a:spcBef>
+              <a:spcAft>
+                <a:spcPts val="0"/>
+              </a:spcAft>
+              <a:buSzPts val="1800"/>
+              <a:buChar char="●"/>
             </a:pPr>
             <a:r>
               <a:rPr lang="en-US"/>
-              <a:t>Sphinx also defines a </a:t>
-            </a:r>
-            <a:r>
-              <a:rPr lang="en-US" u="sng">
-                <a:solidFill>
-                  <a:schemeClr val="hlink"/>
-                </a:solidFill>
-                <a:hlinkClick r:id="rId4"/>
-              </a:rPr>
-              <a:t>superset of reST</a:t>
-            </a:r>
-            <a:r>
-              <a:rPr lang="en-US"/>
-              <a:t>.</a:t>
+              <a:t>Try not to use more than 3 header levels. These are the ones I use for 1-3: “#”, “=”, “-”</a:t>
             </a:r>
             <a:endParaRPr/>
           </a:p>
           <a:p>
-            <a:pPr indent="-406400" lvl="0" marL="457200" rtl="0" algn="l">
-              <a:lnSpc>
-                <a:spcPct val="90000"/>
-              </a:lnSpc>
-              <a:spcBef>
-                <a:spcPts val="0"/>
-              </a:spcBef>
-              <a:spcAft>
-                <a:spcPts val="0"/>
-              </a:spcAft>
-              <a:buSzPts val="2800"/>
-              <a:buChar char="•"/>
+            <a:pPr indent="-342900" lvl="0" marL="457200" rtl="0" algn="l">
+              <a:spcBef>
+                <a:spcPts val="0"/>
+              </a:spcBef>
+              <a:spcAft>
+                <a:spcPts val="0"/>
+              </a:spcAft>
+              <a:buSzPts val="1800"/>
+              <a:buChar char="●"/>
             </a:pPr>
             <a:r>
               <a:rPr lang="en-US"/>
-              <a:t>Configure your Sphinx project in the </a:t>
-            </a:r>
-            <a:r>
-              <a:rPr lang="en-US" u="sng">
-                <a:solidFill>
-                  <a:schemeClr val="hlink"/>
-                </a:solidFill>
-                <a:hlinkClick r:id="rId5"/>
-              </a:rPr>
-              <a:t>conf.py</a:t>
-            </a:r>
-            <a:r>
-              <a:rPr lang="en-US"/>
-              <a:t>.</a:t>
-            </a:r>
-            <a:endParaRPr/>
-          </a:p>
-          <a:p>
-            <a:pPr indent="-406400" lvl="0" marL="457200" rtl="0" algn="l">
-              <a:lnSpc>
-                <a:spcPct val="90000"/>
-              </a:lnSpc>
-              <a:spcBef>
-                <a:spcPts val="0"/>
-              </a:spcBef>
-              <a:spcAft>
-                <a:spcPts val="0"/>
-              </a:spcAft>
-              <a:buSzPts val="2800"/>
-              <a:buChar char="•"/>
-            </a:pPr>
-            <a:r>
-              <a:rPr lang="en-US"/>
-              <a:t>Source code is your friend. If you see something you like, go see the source and learn how to do it yourself.</a:t>
-            </a:r>
-            <a:endParaRPr/>
-          </a:p>
-          <a:p>
-            <a:pPr indent="-50800" lvl="0" marL="228600" rtl="0" algn="l">
-              <a:lnSpc>
-                <a:spcPct val="90000"/>
-              </a:lnSpc>
-              <a:spcBef>
-                <a:spcPts val="1000"/>
-              </a:spcBef>
-              <a:spcAft>
-                <a:spcPts val="0"/>
-              </a:spcAft>
-              <a:buClr>
-                <a:schemeClr val="dk1"/>
-              </a:buClr>
-              <a:buSzPts val="2800"/>
-              <a:buNone/>
-            </a:pPr>
-            <a:r>
-              <a:t/>
+              <a:t>In long paragraphs, add a carriage return at around 80 characters to make it easier to debug in Git etc. This won’t affect how it renders. </a:t>
             </a:r>
             <a:endParaRPr/>
           </a:p>
@@ -12991,8 +13235,17 @@
               <a:buNone/>
             </a:pPr>
             <a:r>
+              <a:rPr b="1" lang="en-US">
+                <a:latin typeface="Courier New"/>
+                <a:ea typeface="Courier New"/>
+                <a:cs typeface="Courier New"/>
+                <a:sym typeface="Courier New"/>
+              </a:rPr>
+              <a:t>conf.py </a:t>
+            </a:r>
+            <a:r>
               <a:rPr lang="en-US"/>
-              <a:t>Backup</a:t>
+              <a:t>basics</a:t>
             </a:r>
             <a:endParaRPr/>
           </a:p>
@@ -13031,9 +13284,120 @@
               <a:buNone/>
             </a:pPr>
             <a:r>
-              <a:t/>
+              <a:rPr lang="en-US"/>
+              <a:t>D</a:t>
+            </a:r>
+            <a:r>
+              <a:rPr lang="en-US"/>
+              <a:t>efault separator for themes and extensions is _ , but use - when installing with </a:t>
+            </a:r>
+            <a:r>
+              <a:rPr b="1" lang="en-US" sz="1800">
+                <a:latin typeface="Courier New"/>
+                <a:ea typeface="Courier New"/>
+                <a:cs typeface="Courier New"/>
+                <a:sym typeface="Courier New"/>
+              </a:rPr>
+              <a:t>pip</a:t>
+            </a:r>
+            <a:r>
+              <a:rPr lang="en-US"/>
+              <a:t>.</a:t>
             </a:r>
             <a:endParaRPr/>
+          </a:p>
+          <a:p>
+            <a:pPr indent="-342900" lvl="0" marL="457200" rtl="0" algn="l">
+              <a:spcBef>
+                <a:spcPts val="1000"/>
+              </a:spcBef>
+              <a:spcAft>
+                <a:spcPts val="0"/>
+              </a:spcAft>
+              <a:buSzPts val="1800"/>
+              <a:buFont typeface="Courier New"/>
+              <a:buChar char="●"/>
+            </a:pPr>
+            <a:r>
+              <a:rPr b="1" lang="en-US" sz="1800">
+                <a:latin typeface="Courier New"/>
+                <a:ea typeface="Courier New"/>
+                <a:cs typeface="Courier New"/>
+                <a:sym typeface="Courier New"/>
+              </a:rPr>
+              <a:t>project = '</a:t>
+            </a:r>
+            <a:r>
+              <a:rPr b="1" lang="en-US" sz="1800">
+                <a:latin typeface="Courier New"/>
+                <a:ea typeface="Courier New"/>
+                <a:cs typeface="Courier New"/>
+                <a:sym typeface="Courier New"/>
+              </a:rPr>
+              <a:t>Tech Writing School'</a:t>
+            </a:r>
+            <a:endParaRPr b="1" sz="1800">
+              <a:latin typeface="Courier New"/>
+              <a:ea typeface="Courier New"/>
+              <a:cs typeface="Courier New"/>
+              <a:sym typeface="Courier New"/>
+            </a:endParaRPr>
+          </a:p>
+          <a:p>
+            <a:pPr indent="-342900" lvl="0" marL="457200" rtl="0" algn="l">
+              <a:spcBef>
+                <a:spcPts val="0"/>
+              </a:spcBef>
+              <a:spcAft>
+                <a:spcPts val="0"/>
+              </a:spcAft>
+              <a:buSzPts val="1800"/>
+              <a:buFont typeface="Courier New"/>
+              <a:buChar char="●"/>
+            </a:pPr>
+            <a:r>
+              <a:rPr b="1" lang="en-US" sz="1800">
+                <a:latin typeface="Courier New"/>
+                <a:ea typeface="Courier New"/>
+                <a:cs typeface="Courier New"/>
+                <a:sym typeface="Courier New"/>
+              </a:rPr>
+              <a:t>extensions = ["",""]</a:t>
+            </a:r>
+            <a:endParaRPr b="1" sz="1800">
+              <a:latin typeface="Courier New"/>
+              <a:ea typeface="Courier New"/>
+              <a:cs typeface="Courier New"/>
+              <a:sym typeface="Courier New"/>
+            </a:endParaRPr>
+          </a:p>
+          <a:p>
+            <a:pPr indent="-342900" lvl="0" marL="457200" rtl="0" algn="l">
+              <a:spcBef>
+                <a:spcPts val="0"/>
+              </a:spcBef>
+              <a:spcAft>
+                <a:spcPts val="0"/>
+              </a:spcAft>
+              <a:buSzPts val="1800"/>
+              <a:buFont typeface="Courier New"/>
+              <a:buChar char="●"/>
+            </a:pPr>
+            <a:r>
+              <a:rPr b="1" lang="en-US" sz="1800">
+                <a:latin typeface="Courier New"/>
+                <a:ea typeface="Courier New"/>
+                <a:cs typeface="Courier New"/>
+                <a:sym typeface="Courier New"/>
+              </a:rPr>
+              <a:t>html_theme = 'name_of_theme'</a:t>
+            </a:r>
+            <a:endParaRPr b="1" sz="1800">
+              <a:latin typeface="Courier New"/>
+              <a:ea typeface="Courier New"/>
+              <a:cs typeface="Courier New"/>
+              <a:sym typeface="Courier New"/>
+            </a:endParaRPr>
           </a:p>
         </p:txBody>
       </p:sp>
@@ -13108,7 +13472,7 @@
             </a:pPr>
             <a:r>
               <a:rPr lang="en-US"/>
-              <a:t>Installing the reStructuredText extension for VS Code</a:t>
+              <a:t>Takeaways</a:t>
             </a:r>
             <a:endParaRPr/>
           </a:p>
@@ -13117,6 +13481,376 @@
       <p:sp>
         <p:nvSpPr>
           <p:cNvPr id="188" name="Google Shape;188;p26"/>
+          <p:cNvSpPr txBox="1"/>
+          <p:nvPr>
+            <p:ph idx="1" type="body"/>
+          </p:nvPr>
+        </p:nvSpPr>
+        <p:spPr>
+          <a:xfrm>
+            <a:off x="838200" y="1825625"/>
+            <a:ext cx="10515600" cy="4351338"/>
+          </a:xfrm>
+          <a:prstGeom prst="rect">
+            <a:avLst/>
+          </a:prstGeom>
+          <a:noFill/>
+          <a:ln>
+            <a:noFill/>
+          </a:ln>
+        </p:spPr>
+        <p:txBody>
+          <a:bodyPr anchorCtr="0" anchor="t" bIns="45700" lIns="91425" spcFirstLastPara="1" rIns="91425" wrap="square" tIns="45700">
+            <a:normAutofit/>
+          </a:bodyPr>
+          <a:lstStyle/>
+          <a:p>
+            <a:pPr indent="-406400" lvl="0" marL="457200" rtl="0" algn="l">
+              <a:lnSpc>
+                <a:spcPct val="90000"/>
+              </a:lnSpc>
+              <a:spcBef>
+                <a:spcPts val="0"/>
+              </a:spcBef>
+              <a:spcAft>
+                <a:spcPts val="0"/>
+              </a:spcAft>
+              <a:buSzPts val="2800"/>
+              <a:buChar char="•"/>
+            </a:pPr>
+            <a:r>
+              <a:rPr lang="en-US"/>
+              <a:t>Most of reST is defined in </a:t>
+            </a:r>
+            <a:r>
+              <a:rPr lang="en-US" u="sng">
+                <a:solidFill>
+                  <a:schemeClr val="hlink"/>
+                </a:solidFill>
+                <a:hlinkClick r:id="rId3"/>
+              </a:rPr>
+              <a:t>Docutils</a:t>
+            </a:r>
+            <a:r>
+              <a:rPr lang="en-US"/>
+              <a:t>.</a:t>
+            </a:r>
+            <a:endParaRPr/>
+          </a:p>
+          <a:p>
+            <a:pPr indent="-406400" lvl="0" marL="457200" rtl="0" algn="l">
+              <a:lnSpc>
+                <a:spcPct val="90000"/>
+              </a:lnSpc>
+              <a:spcBef>
+                <a:spcPts val="0"/>
+              </a:spcBef>
+              <a:spcAft>
+                <a:spcPts val="0"/>
+              </a:spcAft>
+              <a:buSzPts val="2800"/>
+              <a:buChar char="•"/>
+            </a:pPr>
+            <a:r>
+              <a:rPr lang="en-US"/>
+              <a:t>Sphinx combines reST files to create a hierarchical document.</a:t>
+            </a:r>
+            <a:endParaRPr/>
+          </a:p>
+          <a:p>
+            <a:pPr indent="-406400" lvl="0" marL="457200" rtl="0" algn="l">
+              <a:lnSpc>
+                <a:spcPct val="90000"/>
+              </a:lnSpc>
+              <a:spcBef>
+                <a:spcPts val="0"/>
+              </a:spcBef>
+              <a:spcAft>
+                <a:spcPts val="0"/>
+              </a:spcAft>
+              <a:buSzPts val="2800"/>
+              <a:buChar char="•"/>
+            </a:pPr>
+            <a:r>
+              <a:rPr lang="en-US"/>
+              <a:t>Sphinx also defines a </a:t>
+            </a:r>
+            <a:r>
+              <a:rPr lang="en-US" u="sng">
+                <a:solidFill>
+                  <a:schemeClr val="hlink"/>
+                </a:solidFill>
+                <a:hlinkClick r:id="rId4"/>
+              </a:rPr>
+              <a:t>superset of reST</a:t>
+            </a:r>
+            <a:r>
+              <a:rPr lang="en-US"/>
+              <a:t>.</a:t>
+            </a:r>
+            <a:endParaRPr/>
+          </a:p>
+          <a:p>
+            <a:pPr indent="-406400" lvl="0" marL="457200" rtl="0" algn="l">
+              <a:lnSpc>
+                <a:spcPct val="90000"/>
+              </a:lnSpc>
+              <a:spcBef>
+                <a:spcPts val="0"/>
+              </a:spcBef>
+              <a:spcAft>
+                <a:spcPts val="0"/>
+              </a:spcAft>
+              <a:buSzPts val="2800"/>
+              <a:buChar char="•"/>
+            </a:pPr>
+            <a:r>
+              <a:rPr lang="en-US"/>
+              <a:t>Configure your Sphinx project in the </a:t>
+            </a:r>
+            <a:r>
+              <a:rPr lang="en-US" u="sng">
+                <a:solidFill>
+                  <a:schemeClr val="hlink"/>
+                </a:solidFill>
+                <a:hlinkClick r:id="rId5"/>
+              </a:rPr>
+              <a:t>conf.py</a:t>
+            </a:r>
+            <a:r>
+              <a:rPr lang="en-US"/>
+              <a:t>.</a:t>
+            </a:r>
+            <a:endParaRPr/>
+          </a:p>
+          <a:p>
+            <a:pPr indent="-406400" lvl="0" marL="457200" rtl="0" algn="l">
+              <a:lnSpc>
+                <a:spcPct val="90000"/>
+              </a:lnSpc>
+              <a:spcBef>
+                <a:spcPts val="0"/>
+              </a:spcBef>
+              <a:spcAft>
+                <a:spcPts val="0"/>
+              </a:spcAft>
+              <a:buSzPts val="2800"/>
+              <a:buChar char="•"/>
+            </a:pPr>
+            <a:r>
+              <a:rPr lang="en-US"/>
+              <a:t>Source code is your friend. If you see something you like, go see the source and learn how to do it yourself.</a:t>
+            </a:r>
+            <a:endParaRPr/>
+          </a:p>
+          <a:p>
+            <a:pPr indent="-50800" lvl="0" marL="228600" rtl="0" algn="l">
+              <a:lnSpc>
+                <a:spcPct val="90000"/>
+              </a:lnSpc>
+              <a:spcBef>
+                <a:spcPts val="1000"/>
+              </a:spcBef>
+              <a:spcAft>
+                <a:spcPts val="0"/>
+              </a:spcAft>
+              <a:buClr>
+                <a:schemeClr val="dk1"/>
+              </a:buClr>
+              <a:buSzPts val="2800"/>
+              <a:buNone/>
+            </a:pPr>
+            <a:r>
+              <a:t/>
+            </a:r>
+            <a:endParaRPr/>
+          </a:p>
+        </p:txBody>
+      </p:sp>
+    </p:spTree>
+  </p:cSld>
+  <p:clrMapOvr>
+    <a:masterClrMapping/>
+  </p:clrMapOvr>
+</p:sld>
+</file>
+
+<file path=ppt/slides/slide15.xml><?xml version="1.0" encoding="utf-8"?>
+<p:sld xmlns:a="http://schemas.openxmlformats.org/drawingml/2006/main" xmlns:r="http://schemas.openxmlformats.org/officeDocument/2006/relationships" xmlns:mc="http://schemas.openxmlformats.org/markup-compatibility/2006" xmlns:mv="urn:schemas-microsoft-com:mac:vml" xmlns:p="http://schemas.openxmlformats.org/presentationml/2006/main" xmlns:c="http://schemas.openxmlformats.org/drawingml/2006/chart" xmlns:dgm="http://schemas.openxmlformats.org/drawingml/2006/diagram" xmlns:o="urn:schemas-microsoft-com:office:office" xmlns:v="urn:schemas-microsoft-com:vml" xmlns:pvml="urn:schemas-microsoft-com:office:powerpoint" xmlns:com="http://schemas.openxmlformats.org/drawingml/2006/compatibility" xmlns:p14="http://schemas.microsoft.com/office/powerpoint/2010/main" xmlns:p15="http://schemas.microsoft.com/office/powerpoint/2012/main" xmlns:ahyp="http://schemas.microsoft.com/office/drawing/2018/hyperlinkcolor">
+  <p:cSld>
+    <p:spTree>
+      <p:nvGrpSpPr>
+        <p:cNvPr id="192" name="Shape 192"/>
+        <p:cNvGrpSpPr/>
+        <p:nvPr/>
+      </p:nvGrpSpPr>
+      <p:grpSpPr>
+        <a:xfrm>
+          <a:off x="0" y="0"/>
+          <a:ext cx="0" cy="0"/>
+          <a:chOff x="0" y="0"/>
+          <a:chExt cx="0" cy="0"/>
+        </a:xfrm>
+      </p:grpSpPr>
+      <p:sp>
+        <p:nvSpPr>
+          <p:cNvPr id="193" name="Google Shape;193;p27"/>
+          <p:cNvSpPr txBox="1"/>
+          <p:nvPr>
+            <p:ph type="title"/>
+          </p:nvPr>
+        </p:nvSpPr>
+        <p:spPr>
+          <a:xfrm>
+            <a:off x="838200" y="365125"/>
+            <a:ext cx="10515600" cy="1325700"/>
+          </a:xfrm>
+          <a:prstGeom prst="rect">
+            <a:avLst/>
+          </a:prstGeom>
+        </p:spPr>
+        <p:txBody>
+          <a:bodyPr anchorCtr="0" anchor="ctr" bIns="45700" lIns="91425" spcFirstLastPara="1" rIns="91425" wrap="square" tIns="45700">
+            <a:normAutofit/>
+          </a:bodyPr>
+          <a:lstStyle/>
+          <a:p>
+            <a:pPr indent="0" lvl="0" marL="0" rtl="0" algn="l">
+              <a:spcBef>
+                <a:spcPts val="0"/>
+              </a:spcBef>
+              <a:spcAft>
+                <a:spcPts val="0"/>
+              </a:spcAft>
+              <a:buNone/>
+            </a:pPr>
+            <a:r>
+              <a:rPr lang="en-US"/>
+              <a:t>Backup</a:t>
+            </a:r>
+            <a:endParaRPr/>
+          </a:p>
+        </p:txBody>
+      </p:sp>
+      <p:sp>
+        <p:nvSpPr>
+          <p:cNvPr id="194" name="Google Shape;194;p27"/>
+          <p:cNvSpPr txBox="1"/>
+          <p:nvPr>
+            <p:ph idx="1" type="body"/>
+          </p:nvPr>
+        </p:nvSpPr>
+        <p:spPr>
+          <a:xfrm>
+            <a:off x="838200" y="1825625"/>
+            <a:ext cx="10515600" cy="4351200"/>
+          </a:xfrm>
+          <a:prstGeom prst="rect">
+            <a:avLst/>
+          </a:prstGeom>
+        </p:spPr>
+        <p:txBody>
+          <a:bodyPr anchorCtr="0" anchor="t" bIns="45700" lIns="91425" spcFirstLastPara="1" rIns="91425" wrap="square" tIns="45700">
+            <a:normAutofit/>
+          </a:bodyPr>
+          <a:lstStyle/>
+          <a:p>
+            <a:pPr indent="0" lvl="0" marL="0" rtl="0" algn="l">
+              <a:spcBef>
+                <a:spcPts val="1000"/>
+              </a:spcBef>
+              <a:spcAft>
+                <a:spcPts val="0"/>
+              </a:spcAft>
+              <a:buNone/>
+            </a:pPr>
+            <a:r>
+              <a:t/>
+            </a:r>
+            <a:endParaRPr/>
+          </a:p>
+        </p:txBody>
+      </p:sp>
+    </p:spTree>
+  </p:cSld>
+  <p:clrMapOvr>
+    <a:masterClrMapping/>
+  </p:clrMapOvr>
+</p:sld>
+</file>
+
+<file path=ppt/slides/slide16.xml><?xml version="1.0" encoding="utf-8"?>
+<p:sld xmlns:a="http://schemas.openxmlformats.org/drawingml/2006/main" xmlns:r="http://schemas.openxmlformats.org/officeDocument/2006/relationships" xmlns:mc="http://schemas.openxmlformats.org/markup-compatibility/2006" xmlns:mv="urn:schemas-microsoft-com:mac:vml" xmlns:p="http://schemas.openxmlformats.org/presentationml/2006/main" xmlns:c="http://schemas.openxmlformats.org/drawingml/2006/chart" xmlns:dgm="http://schemas.openxmlformats.org/drawingml/2006/diagram" xmlns:o="urn:schemas-microsoft-com:office:office" xmlns:v="urn:schemas-microsoft-com:vml" xmlns:pvml="urn:schemas-microsoft-com:office:powerpoint" xmlns:com="http://schemas.openxmlformats.org/drawingml/2006/compatibility" xmlns:p14="http://schemas.microsoft.com/office/powerpoint/2010/main" xmlns:p15="http://schemas.microsoft.com/office/powerpoint/2012/main" xmlns:ahyp="http://schemas.microsoft.com/office/drawing/2018/hyperlinkcolor">
+  <p:cSld>
+    <p:spTree>
+      <p:nvGrpSpPr>
+        <p:cNvPr id="198" name="Shape 198"/>
+        <p:cNvGrpSpPr/>
+        <p:nvPr/>
+      </p:nvGrpSpPr>
+      <p:grpSpPr>
+        <a:xfrm>
+          <a:off x="0" y="0"/>
+          <a:ext cx="0" cy="0"/>
+          <a:chOff x="0" y="0"/>
+          <a:chExt cx="0" cy="0"/>
+        </a:xfrm>
+      </p:grpSpPr>
+      <p:sp>
+        <p:nvSpPr>
+          <p:cNvPr id="199" name="Google Shape;199;p28"/>
+          <p:cNvSpPr txBox="1"/>
+          <p:nvPr>
+            <p:ph type="title"/>
+          </p:nvPr>
+        </p:nvSpPr>
+        <p:spPr>
+          <a:xfrm>
+            <a:off x="838200" y="365125"/>
+            <a:ext cx="10515600" cy="1325563"/>
+          </a:xfrm>
+          <a:prstGeom prst="rect">
+            <a:avLst/>
+          </a:prstGeom>
+          <a:noFill/>
+          <a:ln>
+            <a:noFill/>
+          </a:ln>
+        </p:spPr>
+        <p:txBody>
+          <a:bodyPr anchorCtr="0" anchor="ctr" bIns="45700" lIns="91425" spcFirstLastPara="1" rIns="91425" wrap="square" tIns="45700">
+            <a:normAutofit/>
+          </a:bodyPr>
+          <a:lstStyle/>
+          <a:p>
+            <a:pPr indent="0" lvl="0" marL="0" rtl="0" algn="l">
+              <a:lnSpc>
+                <a:spcPct val="90000"/>
+              </a:lnSpc>
+              <a:spcBef>
+                <a:spcPts val="0"/>
+              </a:spcBef>
+              <a:spcAft>
+                <a:spcPts val="0"/>
+              </a:spcAft>
+              <a:buClr>
+                <a:schemeClr val="dk1"/>
+              </a:buClr>
+              <a:buSzPts val="4400"/>
+              <a:buFont typeface="Calibri"/>
+              <a:buNone/>
+            </a:pPr>
+            <a:r>
+              <a:rPr lang="en-US"/>
+              <a:t>Installing the reStructuredText extension for VS Code</a:t>
+            </a:r>
+            <a:endParaRPr/>
+          </a:p>
+        </p:txBody>
+      </p:sp>
+      <p:sp>
+        <p:nvSpPr>
+          <p:cNvPr id="200" name="Google Shape;200;p28"/>
           <p:cNvSpPr txBox="1"/>
           <p:nvPr>
             <p:ph idx="1" type="body"/>
@@ -13360,7 +14094,7 @@
         </p:spPr>
         <p:txBody>
           <a:bodyPr anchorCtr="0" anchor="t" bIns="45700" lIns="91425" spcFirstLastPara="1" rIns="91425" wrap="square" tIns="45700">
-            <a:normAutofit fontScale="92500" lnSpcReduction="20000"/>
+            <a:normAutofit fontScale="85000" lnSpcReduction="20000"/>
           </a:bodyPr>
           <a:lstStyle/>
           <a:p>
@@ -13387,7 +14121,7 @@
             <a:endParaRPr/>
           </a:p>
           <a:p>
-            <a:pPr indent="-302260" lvl="0" marL="228600" rtl="0" algn="l">
+            <a:pPr indent="-287020" lvl="0" marL="228600" rtl="0" algn="l">
               <a:spcBef>
                 <a:spcPts val="1000"/>
               </a:spcBef>
@@ -13404,7 +14138,7 @@
             <a:endParaRPr/>
           </a:p>
           <a:p>
-            <a:pPr indent="-302260" lvl="0" marL="228600" rtl="0" algn="l">
+            <a:pPr indent="-287020" lvl="0" marL="228600" rtl="0" algn="l">
               <a:spcBef>
                 <a:spcPts val="1000"/>
               </a:spcBef>
@@ -13416,7 +14150,24 @@
             </a:pPr>
             <a:r>
               <a:rPr lang="en-US"/>
-              <a:t>Sphinx - version doesn’t matter much for today, though 8.X will make things easier.</a:t>
+              <a:t>Sphinx. The version doesn’t matter much for today, though 8.X will make things easier.</a:t>
+            </a:r>
+            <a:endParaRPr/>
+          </a:p>
+          <a:p>
+            <a:pPr indent="-287020" lvl="0" marL="228600" rtl="0" algn="l">
+              <a:spcBef>
+                <a:spcPts val="1000"/>
+              </a:spcBef>
+              <a:spcAft>
+                <a:spcPts val="0"/>
+              </a:spcAft>
+              <a:buSzPct val="114285"/>
+              <a:buChar char="•"/>
+            </a:pPr>
+            <a:r>
+              <a:rPr lang="en-US"/>
+              <a:t>Using the command line.</a:t>
             </a:r>
             <a:endParaRPr/>
           </a:p>
@@ -13444,7 +14195,7 @@
             <a:endParaRPr/>
           </a:p>
           <a:p>
-            <a:pPr indent="-302260" lvl="0" marL="228600" rtl="0" algn="l">
+            <a:pPr indent="-287020" lvl="0" marL="228600" rtl="0" algn="l">
               <a:spcBef>
                 <a:spcPts val="1000"/>
               </a:spcBef>
@@ -13461,7 +14212,7 @@
             <a:endParaRPr/>
           </a:p>
           <a:p>
-            <a:pPr indent="-302260" lvl="0" marL="228600" rtl="0" algn="l">
+            <a:pPr indent="-287020" lvl="0" marL="228600" rtl="0" algn="l">
               <a:spcBef>
                 <a:spcPts val="1000"/>
               </a:spcBef>
@@ -13478,7 +14229,7 @@
             <a:endParaRPr/>
           </a:p>
           <a:p>
-            <a:pPr indent="-238759" lvl="0" marL="228600" rtl="0" algn="l">
+            <a:pPr indent="-223520" lvl="0" marL="228600" rtl="0" algn="l">
               <a:lnSpc>
                 <a:spcPct val="90000"/>
               </a:lnSpc>
@@ -13496,7 +14247,59 @@
             </a:pPr>
             <a:r>
               <a:rPr lang="en-US"/>
-              <a:t>Pandoc </a:t>
+              <a:t>Pandoc - Install: </a:t>
+            </a:r>
+            <a:r>
+              <a:rPr lang="en-US" u="sng">
+                <a:solidFill>
+                  <a:schemeClr val="hlink"/>
+                </a:solidFill>
+                <a:hlinkClick r:id="rId3"/>
+              </a:rPr>
+              <a:t>https://pandoc.org/installing.html</a:t>
+            </a:r>
+            <a:r>
+              <a:rPr lang="en-US"/>
+              <a:t> (Windows), </a:t>
+            </a:r>
+            <a:r>
+              <a:rPr b="1" lang="en-US" sz="2100">
+                <a:latin typeface="Courier New"/>
+                <a:ea typeface="Courier New"/>
+                <a:cs typeface="Courier New"/>
+                <a:sym typeface="Courier New"/>
+              </a:rPr>
+              <a:t>apt-get install pandoc</a:t>
+            </a:r>
+            <a:r>
+              <a:rPr lang="en-US"/>
+              <a:t> (Ubuntu), or </a:t>
+            </a:r>
+            <a:r>
+              <a:rPr b="1" lang="en-US" sz="2100">
+                <a:latin typeface="Courier New"/>
+                <a:ea typeface="Courier New"/>
+                <a:cs typeface="Courier New"/>
+                <a:sym typeface="Courier New"/>
+              </a:rPr>
+              <a:t>brew install pandoc</a:t>
+            </a:r>
+            <a:r>
+              <a:rPr lang="en-US" sz="2100">
+                <a:latin typeface="Courier New"/>
+                <a:ea typeface="Courier New"/>
+                <a:cs typeface="Courier New"/>
+                <a:sym typeface="Courier New"/>
+              </a:rPr>
+              <a:t> </a:t>
+            </a:r>
+            <a:r>
+              <a:rPr lang="en-US"/>
+              <a:t>(MacOS</a:t>
+            </a:r>
+            <a:r>
+              <a:rPr lang="en-US"/>
+              <a:t>)</a:t>
             </a:r>
             <a:endParaRPr/>
           </a:p>
@@ -13538,15 +14341,11 @@
         <p:spPr>
           <a:xfrm>
             <a:off x="838200" y="365125"/>
-            <a:ext cx="10515600" cy="1325563"/>
+            <a:ext cx="10515600" cy="1325700"/>
           </a:xfrm>
           <a:prstGeom prst="rect">
             <a:avLst/>
           </a:prstGeom>
-          <a:noFill/>
-          <a:ln>
-            <a:noFill/>
-          </a:ln>
         </p:spPr>
         <p:txBody>
           <a:bodyPr anchorCtr="0" anchor="ctr" bIns="45700" lIns="91425" spcFirstLastPara="1" rIns="91425" wrap="square" tIns="45700">
@@ -13555,25 +14354,17 @@
           <a:lstStyle/>
           <a:p>
             <a:pPr indent="0" lvl="0" marL="0" rtl="0" algn="l">
-              <a:lnSpc>
-                <a:spcPct val="90000"/>
-              </a:lnSpc>
-              <a:spcBef>
-                <a:spcPts val="0"/>
-              </a:spcBef>
-              <a:spcAft>
-                <a:spcPts val="0"/>
-              </a:spcAft>
-              <a:buClr>
-                <a:schemeClr val="dk1"/>
-              </a:buClr>
-              <a:buSzPts val="4400"/>
-              <a:buFont typeface="Calibri"/>
+              <a:spcBef>
+                <a:spcPts val="0"/>
+              </a:spcBef>
+              <a:spcAft>
+                <a:spcPts val="0"/>
+              </a:spcAft>
               <a:buNone/>
             </a:pPr>
             <a:r>
               <a:rPr lang="en-US"/>
-              <a:t>reStructuredText</a:t>
+              <a:t>Installation</a:t>
             </a:r>
             <a:endParaRPr/>
           </a:p>
@@ -13590,162 +14381,217 @@
         <p:spPr>
           <a:xfrm>
             <a:off x="838200" y="1825625"/>
-            <a:ext cx="10515600" cy="4351338"/>
+            <a:ext cx="10515600" cy="4351200"/>
           </a:xfrm>
           <a:prstGeom prst="rect">
             <a:avLst/>
           </a:prstGeom>
-          <a:noFill/>
-          <a:ln>
-            <a:noFill/>
-          </a:ln>
         </p:spPr>
         <p:txBody>
           <a:bodyPr anchorCtr="0" anchor="t" bIns="45700" lIns="91425" spcFirstLastPara="1" rIns="91425" wrap="square" tIns="45700">
-            <a:normAutofit/>
+            <a:normAutofit lnSpcReduction="10000"/>
           </a:bodyPr>
           <a:lstStyle/>
           <a:p>
             <a:pPr indent="0" lvl="0" marL="0" rtl="0" algn="l">
-              <a:lnSpc>
-                <a:spcPct val="90000"/>
-              </a:lnSpc>
-              <a:spcBef>
-                <a:spcPts val="0"/>
-              </a:spcBef>
-              <a:spcAft>
-                <a:spcPts val="0"/>
-              </a:spcAft>
-              <a:buClr>
-                <a:schemeClr val="dk1"/>
-              </a:buClr>
-              <a:buSzPts val="2800"/>
+              <a:spcBef>
+                <a:spcPts val="1000"/>
+              </a:spcBef>
+              <a:spcAft>
+                <a:spcPts val="0"/>
+              </a:spcAft>
               <a:buNone/>
             </a:pPr>
             <a:r>
               <a:rPr lang="en-US"/>
-              <a:t>reST is a simple and extensible open-source markup language that is easy for humans to read.</a:t>
+              <a:t>Prerequisites: Python and venv</a:t>
             </a:r>
             <a:endParaRPr/>
           </a:p>
           <a:p>
-            <a:pPr indent="0" lvl="0" marL="0" rtl="0" algn="l">
-              <a:lnSpc>
-                <a:spcPct val="90000"/>
-              </a:lnSpc>
+            <a:pPr indent="-342900" lvl="0" marL="457200" rtl="0" algn="l">
               <a:spcBef>
                 <a:spcPts val="1000"/>
               </a:spcBef>
               <a:spcAft>
                 <a:spcPts val="0"/>
               </a:spcAft>
-              <a:buClr>
-                <a:schemeClr val="dk1"/>
-              </a:buClr>
-              <a:buSzPts val="2800"/>
-              <a:buNone/>
+              <a:buSzPts val="1800"/>
+              <a:buAutoNum type="arabicPeriod"/>
             </a:pPr>
             <a:r>
-              <a:t/>
+              <a:rPr lang="en-US"/>
+              <a:t>Install venv (Ubuntu)</a:t>
             </a:r>
             <a:endParaRPr/>
           </a:p>
           <a:p>
-            <a:pPr indent="0" lvl="0" marL="0" rtl="0" algn="l">
-              <a:lnSpc>
-                <a:spcPct val="90000"/>
-              </a:lnSpc>
+            <a:pPr indent="0" lvl="0" marL="914400" rtl="0" algn="l">
               <a:spcBef>
                 <a:spcPts val="1000"/>
               </a:spcBef>
               <a:spcAft>
                 <a:spcPts val="0"/>
               </a:spcAft>
-              <a:buClr>
-                <a:schemeClr val="dk1"/>
-              </a:buClr>
-              <a:buSzPts val="2800"/>
               <a:buNone/>
             </a:pPr>
             <a:r>
+              <a:rPr b="1" lang="en-US" sz="1800">
+                <a:latin typeface="Courier New"/>
+                <a:ea typeface="Courier New"/>
+                <a:cs typeface="Courier New"/>
+                <a:sym typeface="Courier New"/>
+              </a:rPr>
+              <a:t>sudo apt install python3-venv</a:t>
+            </a:r>
+            <a:endParaRPr b="1" sz="1800">
+              <a:latin typeface="Courier New"/>
+              <a:ea typeface="Courier New"/>
+              <a:cs typeface="Courier New"/>
+              <a:sym typeface="Courier New"/>
+            </a:endParaRPr>
+          </a:p>
+          <a:p>
+            <a:pPr indent="-342900" lvl="0" marL="457200" rtl="0" algn="l">
+              <a:spcBef>
+                <a:spcPts val="1000"/>
+              </a:spcBef>
+              <a:spcAft>
+                <a:spcPts val="0"/>
+              </a:spcAft>
+              <a:buSzPts val="1800"/>
+              <a:buAutoNum type="arabicPeriod"/>
+            </a:pPr>
+            <a:r>
               <a:rPr lang="en-US"/>
-              <a:t>It is intended to be converted into other formats including HTML.</a:t>
+              <a:t>Create virtual environment</a:t>
             </a:r>
             <a:endParaRPr/>
           </a:p>
           <a:p>
-            <a:pPr indent="0" lvl="0" marL="0" rtl="0" algn="l">
-              <a:lnSpc>
-                <a:spcPct val="90000"/>
-              </a:lnSpc>
+            <a:pPr indent="0" lvl="0" marL="914400" rtl="0" algn="l">
               <a:spcBef>
                 <a:spcPts val="1000"/>
               </a:spcBef>
               <a:spcAft>
                 <a:spcPts val="0"/>
               </a:spcAft>
-              <a:buClr>
-                <a:schemeClr val="dk1"/>
-              </a:buClr>
-              <a:buSzPts val="2800"/>
               <a:buNone/>
             </a:pPr>
             <a:r>
-              <a:t/>
+              <a:rPr lang="en-US"/>
+              <a:t> </a:t>
+            </a:r>
+            <a:r>
+              <a:rPr b="1" lang="en-US" sz="1800">
+                <a:latin typeface="Courier New"/>
+                <a:ea typeface="Courier New"/>
+                <a:cs typeface="Courier New"/>
+                <a:sym typeface="Courier New"/>
+              </a:rPr>
+              <a:t>python3 -m venv &lt;target directory for virtual environment files&gt;</a:t>
+            </a:r>
+            <a:endParaRPr b="1" sz="1800">
+              <a:latin typeface="Courier New"/>
+              <a:ea typeface="Courier New"/>
+              <a:cs typeface="Courier New"/>
+              <a:sym typeface="Courier New"/>
+            </a:endParaRPr>
+          </a:p>
+          <a:p>
+            <a:pPr indent="-342900" lvl="0" marL="457200" rtl="0" algn="l">
+              <a:spcBef>
+                <a:spcPts val="1000"/>
+              </a:spcBef>
+              <a:spcAft>
+                <a:spcPts val="0"/>
+              </a:spcAft>
+              <a:buSzPts val="1800"/>
+              <a:buAutoNum type="arabicPeriod"/>
+            </a:pPr>
+            <a:r>
+              <a:rPr lang="en-US"/>
+              <a:t>Start virtual environment </a:t>
             </a:r>
             <a:endParaRPr/>
           </a:p>
           <a:p>
-            <a:pPr indent="0" lvl="0" marL="0" rtl="0" algn="l">
-              <a:lnSpc>
-                <a:spcPct val="90000"/>
-              </a:lnSpc>
+            <a:pPr indent="0" lvl="0" marL="914400" rtl="0" algn="l">
               <a:spcBef>
                 <a:spcPts val="1000"/>
               </a:spcBef>
               <a:spcAft>
                 <a:spcPts val="0"/>
               </a:spcAft>
-              <a:buClr>
-                <a:schemeClr val="dk1"/>
-              </a:buClr>
-              <a:buSzPts val="2800"/>
               <a:buNone/>
             </a:pPr>
             <a:r>
+              <a:rPr b="1" lang="en-US" sz="1800">
+                <a:latin typeface="Courier New"/>
+                <a:ea typeface="Courier New"/>
+                <a:cs typeface="Courier New"/>
+                <a:sym typeface="Courier New"/>
+              </a:rPr>
+              <a:t>source ~/path/to/virtual/environment</a:t>
+            </a:r>
+            <a:endParaRPr b="1" sz="1800">
+              <a:latin typeface="Courier New"/>
+              <a:ea typeface="Courier New"/>
+              <a:cs typeface="Courier New"/>
+              <a:sym typeface="Courier New"/>
+            </a:endParaRPr>
+          </a:p>
+          <a:p>
+            <a:pPr indent="-342900" lvl="0" marL="457200" rtl="0" algn="l">
+              <a:spcBef>
+                <a:spcPts val="1000"/>
+              </a:spcBef>
+              <a:spcAft>
+                <a:spcPts val="0"/>
+              </a:spcAft>
+              <a:buSzPts val="1800"/>
+              <a:buAutoNum type="arabicPeriod"/>
+            </a:pPr>
+            <a:r>
               <a:rPr lang="en-US"/>
-              <a:t>The reStructuredText specification is defined in </a:t>
-            </a:r>
-            <a:r>
-              <a:rPr lang="en-US" u="sng">
-                <a:solidFill>
-                  <a:schemeClr val="hlink"/>
-                </a:solidFill>
-                <a:hlinkClick r:id="rId3"/>
-              </a:rPr>
-              <a:t>Docutils</a:t>
-            </a:r>
-            <a:r>
-              <a:rPr lang="en-US"/>
-              <a:t>. </a:t>
+              <a:t>Install sphinx etc</a:t>
             </a:r>
             <a:endParaRPr/>
           </a:p>
           <a:p>
+            <a:pPr indent="0" lvl="0" marL="914400" rtl="0" algn="l">
+              <a:spcBef>
+                <a:spcPts val="1000"/>
+              </a:spcBef>
+              <a:spcAft>
+                <a:spcPts val="0"/>
+              </a:spcAft>
+              <a:buNone/>
+            </a:pPr>
+            <a:r>
+              <a:rPr b="1" lang="en-US" sz="1800">
+                <a:latin typeface="Courier New"/>
+                <a:ea typeface="Courier New"/>
+                <a:cs typeface="Courier New"/>
+                <a:sym typeface="Courier New"/>
+              </a:rPr>
+              <a:t>pip3 install sphinx pydata-sphinx-theme sphinx-design myst-parser</a:t>
+            </a:r>
+            <a:endParaRPr b="1" sz="1800">
+              <a:latin typeface="Courier New"/>
+              <a:ea typeface="Courier New"/>
+              <a:cs typeface="Courier New"/>
+              <a:sym typeface="Courier New"/>
+            </a:endParaRPr>
+          </a:p>
+          <a:p>
             <a:pPr indent="0" lvl="0" marL="0" rtl="0" algn="l">
-              <a:lnSpc>
-                <a:spcPct val="90000"/>
-              </a:lnSpc>
               <a:spcBef>
                 <a:spcPts val="1000"/>
               </a:spcBef>
               <a:spcAft>
                 <a:spcPts val="0"/>
               </a:spcAft>
-              <a:buClr>
-                <a:schemeClr val="dk1"/>
-              </a:buClr>
-              <a:buSzPts val="2800"/>
               <a:buNone/>
             </a:pPr>
             <a:r>
@@ -13826,7 +14672,7 @@
             </a:pPr>
             <a:r>
               <a:rPr lang="en-US"/>
-              <a:t>Getting started with reStructuredText</a:t>
+              <a:t>reStructuredText</a:t>
             </a:r>
             <a:endParaRPr/>
           </a:p>
@@ -13855,11 +14701,11 @@
         </p:spPr>
         <p:txBody>
           <a:bodyPr anchorCtr="0" anchor="t" bIns="45700" lIns="91425" spcFirstLastPara="1" rIns="91425" wrap="square" tIns="45700">
-            <a:normAutofit lnSpcReduction="10000"/>
+            <a:normAutofit/>
           </a:bodyPr>
           <a:lstStyle/>
           <a:p>
-            <a:pPr indent="-228600" lvl="0" marL="228600" rtl="0" algn="l">
+            <a:pPr indent="0" lvl="0" marL="0" rtl="0" algn="l">
               <a:lnSpc>
                 <a:spcPct val="90000"/>
               </a:lnSpc>
@@ -13873,112 +14719,119 @@
                 <a:schemeClr val="dk1"/>
               </a:buClr>
               <a:buSzPts val="2800"/>
-              <a:buChar char="•"/>
+              <a:buNone/>
             </a:pPr>
             <a:r>
               <a:rPr lang="en-US"/>
-              <a:t>Key concepts:</a:t>
+              <a:t>reST is a simple and extensible open-source markup language that is easy for humans to read.</a:t>
             </a:r>
             <a:endParaRPr/>
           </a:p>
           <a:p>
-            <a:pPr indent="-457200" lvl="1" marL="914400" rtl="0" algn="l">
-              <a:lnSpc>
-                <a:spcPct val="90000"/>
-              </a:lnSpc>
-              <a:spcBef>
-                <a:spcPts val="500"/>
-              </a:spcBef>
-              <a:spcAft>
-                <a:spcPts val="0"/>
-              </a:spcAft>
-              <a:buClr>
-                <a:schemeClr val="dk1"/>
-              </a:buClr>
-              <a:buSzPts val="2400"/>
-              <a:buFont typeface="Calibri"/>
-              <a:buAutoNum type="arabicPeriod"/>
+            <a:pPr indent="0" lvl="0" marL="0" rtl="0" algn="l">
+              <a:lnSpc>
+                <a:spcPct val="90000"/>
+              </a:lnSpc>
+              <a:spcBef>
+                <a:spcPts val="1000"/>
+              </a:spcBef>
+              <a:spcAft>
+                <a:spcPts val="0"/>
+              </a:spcAft>
+              <a:buClr>
+                <a:schemeClr val="dk1"/>
+              </a:buClr>
+              <a:buSzPts val="2800"/>
+              <a:buNone/>
             </a:pPr>
             <a:r>
-              <a:rPr lang="en-US"/>
-              <a:t>Built-in markup – headers, bullets, definition lists, etc.</a:t>
+              <a:t/>
             </a:r>
             <a:endParaRPr/>
           </a:p>
           <a:p>
-            <a:pPr indent="-457200" lvl="1" marL="914400" rtl="0" algn="l">
-              <a:lnSpc>
-                <a:spcPct val="90000"/>
-              </a:lnSpc>
-              <a:spcBef>
-                <a:spcPts val="500"/>
-              </a:spcBef>
-              <a:spcAft>
-                <a:spcPts val="0"/>
-              </a:spcAft>
-              <a:buClr>
-                <a:schemeClr val="dk1"/>
-              </a:buClr>
-              <a:buSzPts val="2400"/>
-              <a:buFont typeface="Calibri"/>
-              <a:buAutoNum type="arabicPeriod"/>
+            <a:pPr indent="0" lvl="0" marL="0" rtl="0" algn="l">
+              <a:lnSpc>
+                <a:spcPct val="90000"/>
+              </a:lnSpc>
+              <a:spcBef>
+                <a:spcPts val="1000"/>
+              </a:spcBef>
+              <a:spcAft>
+                <a:spcPts val="0"/>
+              </a:spcAft>
+              <a:buClr>
+                <a:schemeClr val="dk1"/>
+              </a:buClr>
+              <a:buSzPts val="2800"/>
+              <a:buNone/>
             </a:pPr>
             <a:r>
               <a:rPr lang="en-US"/>
-              <a:t>Directives – adds new kinds of blocks and can sometimes be nested.</a:t>
+              <a:t>It is intended to be converted into other formats including HTML.</a:t>
             </a:r>
             <a:endParaRPr/>
           </a:p>
           <a:p>
-            <a:pPr indent="-457200" lvl="1" marL="914400" rtl="0" algn="l">
-              <a:lnSpc>
-                <a:spcPct val="90000"/>
-              </a:lnSpc>
-              <a:spcBef>
-                <a:spcPts val="500"/>
-              </a:spcBef>
-              <a:spcAft>
-                <a:spcPts val="0"/>
-              </a:spcAft>
-              <a:buClr>
-                <a:schemeClr val="dk1"/>
-              </a:buClr>
-              <a:buSzPts val="2400"/>
-              <a:buFont typeface="Calibri"/>
-              <a:buAutoNum type="arabicPeriod"/>
+            <a:pPr indent="0" lvl="0" marL="0" rtl="0" algn="l">
+              <a:lnSpc>
+                <a:spcPct val="90000"/>
+              </a:lnSpc>
+              <a:spcBef>
+                <a:spcPts val="1000"/>
+              </a:spcBef>
+              <a:spcAft>
+                <a:spcPts val="0"/>
+              </a:spcAft>
+              <a:buClr>
+                <a:schemeClr val="dk1"/>
+              </a:buClr>
+              <a:buSzPts val="2800"/>
+              <a:buNone/>
             </a:pPr>
             <a:r>
-              <a:rPr lang="en-US"/>
-              <a:t>Roles – adds inline snippets.</a:t>
+              <a:t/>
             </a:r>
             <a:endParaRPr/>
           </a:p>
           <a:p>
-            <a:pPr indent="-457200" lvl="1" marL="914400" rtl="0" algn="l">
-              <a:lnSpc>
-                <a:spcPct val="90000"/>
-              </a:lnSpc>
-              <a:spcBef>
-                <a:spcPts val="500"/>
-              </a:spcBef>
-              <a:spcAft>
-                <a:spcPts val="0"/>
-              </a:spcAft>
-              <a:buClr>
-                <a:schemeClr val="dk1"/>
-              </a:buClr>
-              <a:buSzPts val="2400"/>
-              <a:buFont typeface="Calibri"/>
-              <a:buAutoNum type="arabicPeriod"/>
+            <a:pPr indent="0" lvl="0" marL="0" rtl="0" algn="l">
+              <a:lnSpc>
+                <a:spcPct val="90000"/>
+              </a:lnSpc>
+              <a:spcBef>
+                <a:spcPts val="1000"/>
+              </a:spcBef>
+              <a:spcAft>
+                <a:spcPts val="0"/>
+              </a:spcAft>
+              <a:buClr>
+                <a:schemeClr val="dk1"/>
+              </a:buClr>
+              <a:buSzPts val="2800"/>
+              <a:buNone/>
             </a:pPr>
             <a:r>
               <a:rPr lang="en-US"/>
-              <a:t>Indentation – like Python it helps define blocks and the depth must match exactly.</a:t>
+              <a:t>The reStructuredText specification is defined in </a:t>
+            </a:r>
+            <a:r>
+              <a:rPr lang="en-US" u="sng">
+                <a:solidFill>
+                  <a:schemeClr val="hlink"/>
+                </a:solidFill>
+                <a:hlinkClick r:id="rId3"/>
+              </a:rPr>
+              <a:t>Docutils</a:t>
+            </a:r>
+            <a:r>
+              <a:rPr lang="en-US"/>
+              <a:t>. </a:t>
             </a:r>
             <a:endParaRPr/>
           </a:p>
           <a:p>
-            <a:pPr indent="-228600" lvl="0" marL="228600" rtl="0" algn="l">
+            <a:pPr indent="0" lvl="0" marL="0" rtl="0" algn="l">
               <a:lnSpc>
                 <a:spcPct val="90000"/>
               </a:lnSpc>
@@ -13992,107 +14845,87 @@
                 <a:schemeClr val="dk1"/>
               </a:buClr>
               <a:buSzPts val="2800"/>
-              <a:buChar char="•"/>
+              <a:buNone/>
             </a:pPr>
             <a:r>
-              <a:rPr lang="en-US"/>
-              <a:t>Ways to convert reStructuredText to HTML:</a:t>
+              <a:t/>
             </a:r>
             <a:endParaRPr/>
           </a:p>
+        </p:txBody>
+      </p:sp>
+    </p:spTree>
+  </p:cSld>
+  <p:clrMapOvr>
+    <a:masterClrMapping/>
+  </p:clrMapOvr>
+</p:sld>
+</file>
+
+<file path=ppt/slides/slide5.xml><?xml version="1.0" encoding="utf-8"?>
+<p:sld xmlns:a="http://schemas.openxmlformats.org/drawingml/2006/main" xmlns:r="http://schemas.openxmlformats.org/officeDocument/2006/relationships" xmlns:mc="http://schemas.openxmlformats.org/markup-compatibility/2006" xmlns:mv="urn:schemas-microsoft-com:mac:vml" xmlns:p="http://schemas.openxmlformats.org/presentationml/2006/main" xmlns:c="http://schemas.openxmlformats.org/drawingml/2006/chart" xmlns:dgm="http://schemas.openxmlformats.org/drawingml/2006/diagram" xmlns:o="urn:schemas-microsoft-com:office:office" xmlns:v="urn:schemas-microsoft-com:vml" xmlns:pvml="urn:schemas-microsoft-com:office:powerpoint" xmlns:com="http://schemas.openxmlformats.org/drawingml/2006/compatibility" xmlns:p14="http://schemas.microsoft.com/office/powerpoint/2010/main" xmlns:p15="http://schemas.microsoft.com/office/powerpoint/2012/main" xmlns:ahyp="http://schemas.microsoft.com/office/drawing/2018/hyperlinkcolor">
+  <p:cSld>
+    <p:spTree>
+      <p:nvGrpSpPr>
+        <p:cNvPr id="107" name="Shape 107"/>
+        <p:cNvGrpSpPr/>
+        <p:nvPr/>
+      </p:nvGrpSpPr>
+      <p:grpSpPr>
+        <a:xfrm>
+          <a:off x="0" y="0"/>
+          <a:ext cx="0" cy="0"/>
+          <a:chOff x="0" y="0"/>
+          <a:chExt cx="0" cy="0"/>
+        </a:xfrm>
+      </p:grpSpPr>
+      <p:sp>
+        <p:nvSpPr>
+          <p:cNvPr id="108" name="Google Shape;108;p17"/>
+          <p:cNvSpPr txBox="1"/>
+          <p:nvPr>
+            <p:ph type="title"/>
+          </p:nvPr>
+        </p:nvSpPr>
+        <p:spPr>
+          <a:xfrm>
+            <a:off x="838200" y="365125"/>
+            <a:ext cx="10515600" cy="1325563"/>
+          </a:xfrm>
+          <a:prstGeom prst="rect">
+            <a:avLst/>
+          </a:prstGeom>
+          <a:noFill/>
+          <a:ln>
+            <a:noFill/>
+          </a:ln>
+        </p:spPr>
+        <p:txBody>
+          <a:bodyPr anchorCtr="0" anchor="ctr" bIns="45700" lIns="91425" spcFirstLastPara="1" rIns="91425" wrap="square" tIns="45700">
+            <a:normAutofit/>
+          </a:bodyPr>
+          <a:lstStyle/>
           <a:p>
-            <a:pPr indent="-457200" lvl="1" marL="914400" rtl="0" algn="l">
-              <a:lnSpc>
-                <a:spcPct val="90000"/>
-              </a:lnSpc>
-              <a:spcBef>
-                <a:spcPts val="500"/>
-              </a:spcBef>
-              <a:spcAft>
-                <a:spcPts val="0"/>
-              </a:spcAft>
-              <a:buClr>
-                <a:schemeClr val="dk1"/>
-              </a:buClr>
-              <a:buSzPts val="2400"/>
+            <a:pPr indent="0" lvl="0" marL="0" rtl="0" algn="l">
+              <a:lnSpc>
+                <a:spcPct val="90000"/>
+              </a:lnSpc>
+              <a:spcBef>
+                <a:spcPts val="0"/>
+              </a:spcBef>
+              <a:spcAft>
+                <a:spcPts val="0"/>
+              </a:spcAft>
+              <a:buClr>
+                <a:schemeClr val="dk1"/>
+              </a:buClr>
+              <a:buSzPts val="4400"/>
               <a:buFont typeface="Calibri"/>
-              <a:buAutoNum type="arabicPeriod"/>
+              <a:buNone/>
             </a:pPr>
             <a:r>
               <a:rPr lang="en-US"/>
-              <a:t>Docutils: rst2html.py input.rst output.html</a:t>
-            </a:r>
-            <a:endParaRPr/>
-          </a:p>
-          <a:p>
-            <a:pPr indent="-457200" lvl="1" marL="914400" rtl="0" algn="l">
-              <a:lnSpc>
-                <a:spcPct val="90000"/>
-              </a:lnSpc>
-              <a:spcBef>
-                <a:spcPts val="500"/>
-              </a:spcBef>
-              <a:spcAft>
-                <a:spcPts val="0"/>
-              </a:spcAft>
-              <a:buClr>
-                <a:schemeClr val="dk1"/>
-              </a:buClr>
-              <a:buSzPts val="2400"/>
-              <a:buFont typeface="Calibri"/>
-              <a:buAutoNum type="arabicPeriod"/>
-            </a:pPr>
-            <a:r>
-              <a:rPr lang="en-US"/>
-              <a:t>Pandoc: pandoc -f rst -t html input.rst &gt; output.html</a:t>
-            </a:r>
-            <a:endParaRPr/>
-          </a:p>
-          <a:p>
-            <a:pPr indent="-457200" lvl="1" marL="914400" rtl="0" algn="l">
-              <a:lnSpc>
-                <a:spcPct val="90000"/>
-              </a:lnSpc>
-              <a:spcBef>
-                <a:spcPts val="500"/>
-              </a:spcBef>
-              <a:spcAft>
-                <a:spcPts val="0"/>
-              </a:spcAft>
-              <a:buClr>
-                <a:schemeClr val="dk1"/>
-              </a:buClr>
-              <a:buSzPts val="2400"/>
-              <a:buFont typeface="Calibri"/>
-              <a:buAutoNum type="arabicPeriod"/>
-            </a:pPr>
-            <a:r>
-              <a:rPr lang="en-US"/>
-              <a:t>Sphinx: to be covered later in the presentation.</a:t>
-            </a:r>
-            <a:endParaRPr/>
-          </a:p>
-          <a:p>
-            <a:pPr indent="-457200" lvl="1" marL="914400" rtl="0" algn="l">
-              <a:lnSpc>
-                <a:spcPct val="90000"/>
-              </a:lnSpc>
-              <a:spcBef>
-                <a:spcPts val="500"/>
-              </a:spcBef>
-              <a:spcAft>
-                <a:spcPts val="0"/>
-              </a:spcAft>
-              <a:buClr>
-                <a:schemeClr val="dk1"/>
-              </a:buClr>
-              <a:buSzPts val="2400"/>
-              <a:buFont typeface="Calibri"/>
-              <a:buAutoNum type="arabicPeriod"/>
-            </a:pPr>
-            <a:r>
-              <a:rPr lang="en-US"/>
-              <a:t>Automatically in GitHub and GitLab</a:t>
+              <a:t>Getting started with reStructuredText</a:t>
             </a:r>
             <a:endParaRPr/>
           </a:p>
@@ -14100,7 +14933,301 @@
       </p:sp>
       <p:sp>
         <p:nvSpPr>
-          <p:cNvPr id="104" name="Google Shape;104;p16"/>
+          <p:cNvPr id="109" name="Google Shape;109;p17"/>
+          <p:cNvSpPr txBox="1"/>
+          <p:nvPr>
+            <p:ph idx="1" type="body"/>
+          </p:nvPr>
+        </p:nvSpPr>
+        <p:spPr>
+          <a:xfrm>
+            <a:off x="838200" y="1825625"/>
+            <a:ext cx="10515600" cy="4351338"/>
+          </a:xfrm>
+          <a:prstGeom prst="rect">
+            <a:avLst/>
+          </a:prstGeom>
+          <a:noFill/>
+          <a:ln>
+            <a:noFill/>
+          </a:ln>
+        </p:spPr>
+        <p:txBody>
+          <a:bodyPr anchorCtr="0" anchor="t" bIns="45700" lIns="91425" spcFirstLastPara="1" rIns="91425" wrap="square" tIns="45700">
+            <a:normAutofit lnSpcReduction="10000"/>
+          </a:bodyPr>
+          <a:lstStyle/>
+          <a:p>
+            <a:pPr indent="-228600" lvl="0" marL="228600" rtl="0" algn="l">
+              <a:lnSpc>
+                <a:spcPct val="90000"/>
+              </a:lnSpc>
+              <a:spcBef>
+                <a:spcPts val="0"/>
+              </a:spcBef>
+              <a:spcAft>
+                <a:spcPts val="0"/>
+              </a:spcAft>
+              <a:buClr>
+                <a:schemeClr val="dk1"/>
+              </a:buClr>
+              <a:buSzPts val="2800"/>
+              <a:buChar char="•"/>
+            </a:pPr>
+            <a:r>
+              <a:rPr lang="en-US"/>
+              <a:t>Key concepts:</a:t>
+            </a:r>
+            <a:endParaRPr/>
+          </a:p>
+          <a:p>
+            <a:pPr indent="-457200" lvl="1" marL="914400" rtl="0" algn="l">
+              <a:lnSpc>
+                <a:spcPct val="90000"/>
+              </a:lnSpc>
+              <a:spcBef>
+                <a:spcPts val="500"/>
+              </a:spcBef>
+              <a:spcAft>
+                <a:spcPts val="0"/>
+              </a:spcAft>
+              <a:buClr>
+                <a:schemeClr val="dk1"/>
+              </a:buClr>
+              <a:buSzPts val="2400"/>
+              <a:buFont typeface="Calibri"/>
+              <a:buAutoNum type="arabicPeriod"/>
+            </a:pPr>
+            <a:r>
+              <a:rPr lang="en-US"/>
+              <a:t>Built-in markup – headers, bullets, definition lists, etc.</a:t>
+            </a:r>
+            <a:endParaRPr/>
+          </a:p>
+          <a:p>
+            <a:pPr indent="-457200" lvl="1" marL="914400" rtl="0" algn="l">
+              <a:lnSpc>
+                <a:spcPct val="90000"/>
+              </a:lnSpc>
+              <a:spcBef>
+                <a:spcPts val="500"/>
+              </a:spcBef>
+              <a:spcAft>
+                <a:spcPts val="0"/>
+              </a:spcAft>
+              <a:buClr>
+                <a:schemeClr val="dk1"/>
+              </a:buClr>
+              <a:buSzPts val="2400"/>
+              <a:buFont typeface="Calibri"/>
+              <a:buAutoNum type="arabicPeriod"/>
+            </a:pPr>
+            <a:r>
+              <a:rPr lang="en-US"/>
+              <a:t>Directives – adds new kinds of blocks and can sometimes be nested.</a:t>
+            </a:r>
+            <a:endParaRPr/>
+          </a:p>
+          <a:p>
+            <a:pPr indent="-457200" lvl="1" marL="914400" rtl="0" algn="l">
+              <a:lnSpc>
+                <a:spcPct val="90000"/>
+              </a:lnSpc>
+              <a:spcBef>
+                <a:spcPts val="500"/>
+              </a:spcBef>
+              <a:spcAft>
+                <a:spcPts val="0"/>
+              </a:spcAft>
+              <a:buClr>
+                <a:schemeClr val="dk1"/>
+              </a:buClr>
+              <a:buSzPts val="2400"/>
+              <a:buFont typeface="Calibri"/>
+              <a:buAutoNum type="arabicPeriod"/>
+            </a:pPr>
+            <a:r>
+              <a:rPr lang="en-US"/>
+              <a:t>Roles – adds inline snippets.</a:t>
+            </a:r>
+            <a:endParaRPr/>
+          </a:p>
+          <a:p>
+            <a:pPr indent="-457200" lvl="1" marL="914400" rtl="0" algn="l">
+              <a:lnSpc>
+                <a:spcPct val="90000"/>
+              </a:lnSpc>
+              <a:spcBef>
+                <a:spcPts val="500"/>
+              </a:spcBef>
+              <a:spcAft>
+                <a:spcPts val="0"/>
+              </a:spcAft>
+              <a:buClr>
+                <a:schemeClr val="dk1"/>
+              </a:buClr>
+              <a:buSzPts val="2400"/>
+              <a:buFont typeface="Calibri"/>
+              <a:buAutoNum type="arabicPeriod"/>
+            </a:pPr>
+            <a:r>
+              <a:rPr lang="en-US"/>
+              <a:t>Indentation – like Python it helps define blocks and the depth must match exactly.</a:t>
+            </a:r>
+            <a:endParaRPr/>
+          </a:p>
+          <a:p>
+            <a:pPr indent="-228600" lvl="0" marL="228600" rtl="0" algn="l">
+              <a:lnSpc>
+                <a:spcPct val="90000"/>
+              </a:lnSpc>
+              <a:spcBef>
+                <a:spcPts val="1000"/>
+              </a:spcBef>
+              <a:spcAft>
+                <a:spcPts val="0"/>
+              </a:spcAft>
+              <a:buClr>
+                <a:schemeClr val="dk1"/>
+              </a:buClr>
+              <a:buSzPts val="2800"/>
+              <a:buChar char="•"/>
+            </a:pPr>
+            <a:r>
+              <a:rPr lang="en-US"/>
+              <a:t>Ways to convert reStructuredText to HTML:</a:t>
+            </a:r>
+            <a:endParaRPr/>
+          </a:p>
+          <a:p>
+            <a:pPr indent="-457200" lvl="1" marL="914400" rtl="0" algn="l">
+              <a:lnSpc>
+                <a:spcPct val="90000"/>
+              </a:lnSpc>
+              <a:spcBef>
+                <a:spcPts val="500"/>
+              </a:spcBef>
+              <a:spcAft>
+                <a:spcPts val="0"/>
+              </a:spcAft>
+              <a:buClr>
+                <a:schemeClr val="dk1"/>
+              </a:buClr>
+              <a:buSzPts val="2400"/>
+              <a:buFont typeface="Calibri"/>
+              <a:buAutoNum type="arabicPeriod"/>
+            </a:pPr>
+            <a:r>
+              <a:rPr lang="en-US"/>
+              <a:t>Docutils: </a:t>
+            </a:r>
+            <a:r>
+              <a:rPr b="1" lang="en-US" sz="1800">
+                <a:latin typeface="Courier New"/>
+                <a:ea typeface="Courier New"/>
+                <a:cs typeface="Courier New"/>
+                <a:sym typeface="Courier New"/>
+              </a:rPr>
+              <a:t>rst2html.py input.rst output.html</a:t>
+            </a:r>
+            <a:endParaRPr b="1" sz="1800">
+              <a:latin typeface="Courier New"/>
+              <a:ea typeface="Courier New"/>
+              <a:cs typeface="Courier New"/>
+              <a:sym typeface="Courier New"/>
+            </a:endParaRPr>
+          </a:p>
+          <a:p>
+            <a:pPr indent="-457200" lvl="1" marL="914400" rtl="0" algn="l">
+              <a:lnSpc>
+                <a:spcPct val="90000"/>
+              </a:lnSpc>
+              <a:spcBef>
+                <a:spcPts val="500"/>
+              </a:spcBef>
+              <a:spcAft>
+                <a:spcPts val="0"/>
+              </a:spcAft>
+              <a:buClr>
+                <a:schemeClr val="dk1"/>
+              </a:buClr>
+              <a:buSzPts val="2400"/>
+              <a:buFont typeface="Calibri"/>
+              <a:buAutoNum type="arabicPeriod"/>
+            </a:pPr>
+            <a:r>
+              <a:rPr lang="en-US"/>
+              <a:t>Pandoc: </a:t>
+            </a:r>
+            <a:r>
+              <a:rPr b="1" lang="en-US" sz="1800">
+                <a:latin typeface="Courier New"/>
+                <a:ea typeface="Courier New"/>
+                <a:cs typeface="Courier New"/>
+                <a:sym typeface="Courier New"/>
+              </a:rPr>
+              <a:t>pandoc -f rst -t html input.rst &gt; output.html</a:t>
+            </a:r>
+            <a:endParaRPr b="1" sz="1800">
+              <a:latin typeface="Courier New"/>
+              <a:ea typeface="Courier New"/>
+              <a:cs typeface="Courier New"/>
+              <a:sym typeface="Courier New"/>
+            </a:endParaRPr>
+          </a:p>
+          <a:p>
+            <a:pPr indent="-457200" lvl="1" marL="914400" rtl="0" algn="l">
+              <a:lnSpc>
+                <a:spcPct val="90000"/>
+              </a:lnSpc>
+              <a:spcBef>
+                <a:spcPts val="500"/>
+              </a:spcBef>
+              <a:spcAft>
+                <a:spcPts val="0"/>
+              </a:spcAft>
+              <a:buClr>
+                <a:schemeClr val="dk1"/>
+              </a:buClr>
+              <a:buSzPts val="2400"/>
+              <a:buFont typeface="Calibri"/>
+              <a:buAutoNum type="arabicPeriod"/>
+            </a:pPr>
+            <a:r>
+              <a:rPr lang="en-US"/>
+              <a:t>Sphinx: to be covered later in the presentation.</a:t>
+            </a:r>
+            <a:endParaRPr/>
+          </a:p>
+          <a:p>
+            <a:pPr indent="-457200" lvl="1" marL="914400" rtl="0" algn="l">
+              <a:lnSpc>
+                <a:spcPct val="90000"/>
+              </a:lnSpc>
+              <a:spcBef>
+                <a:spcPts val="500"/>
+              </a:spcBef>
+              <a:spcAft>
+                <a:spcPts val="0"/>
+              </a:spcAft>
+              <a:buClr>
+                <a:schemeClr val="dk1"/>
+              </a:buClr>
+              <a:buSzPts val="2400"/>
+              <a:buFont typeface="Calibri"/>
+              <a:buAutoNum type="arabicPeriod"/>
+            </a:pPr>
+            <a:r>
+              <a:rPr lang="en-US"/>
+              <a:t>Automatically in GitHub and GitLab</a:t>
+            </a:r>
+            <a:endParaRPr/>
+          </a:p>
+        </p:txBody>
+      </p:sp>
+      <p:sp>
+        <p:nvSpPr>
+          <p:cNvPr id="110" name="Google Shape;110;p17"/>
           <p:cNvSpPr/>
           <p:nvPr/>
         </p:nvSpPr>
@@ -14165,12 +15292,12 @@
 </p:sld>
 </file>
 
-<file path=ppt/slides/slide5.xml><?xml version="1.0" encoding="utf-8"?>
+<file path=ppt/slides/slide6.xml><?xml version="1.0" encoding="utf-8"?>
 <p:sld xmlns:a="http://schemas.openxmlformats.org/drawingml/2006/main" xmlns:r="http://schemas.openxmlformats.org/officeDocument/2006/relationships" xmlns:mc="http://schemas.openxmlformats.org/markup-compatibility/2006" xmlns:mv="urn:schemas-microsoft-com:mac:vml" xmlns:p="http://schemas.openxmlformats.org/presentationml/2006/main" xmlns:c="http://schemas.openxmlformats.org/drawingml/2006/chart" xmlns:dgm="http://schemas.openxmlformats.org/drawingml/2006/diagram" xmlns:o="urn:schemas-microsoft-com:office:office" xmlns:v="urn:schemas-microsoft-com:vml" xmlns:pvml="urn:schemas-microsoft-com:office:powerpoint" xmlns:com="http://schemas.openxmlformats.org/drawingml/2006/compatibility" xmlns:p14="http://schemas.microsoft.com/office/powerpoint/2010/main" xmlns:p15="http://schemas.microsoft.com/office/powerpoint/2012/main" xmlns:ahyp="http://schemas.microsoft.com/office/drawing/2018/hyperlinkcolor">
   <p:cSld>
     <p:spTree>
       <p:nvGrpSpPr>
-        <p:cNvPr id="108" name="Shape 108"/>
+        <p:cNvPr id="114" name="Shape 114"/>
         <p:cNvGrpSpPr/>
         <p:nvPr/>
       </p:nvGrpSpPr>
@@ -14184,7 +15311,7 @@
       </p:grpSpPr>
       <p:sp>
         <p:nvSpPr>
-          <p:cNvPr id="109" name="Google Shape;109;p17"/>
+          <p:cNvPr id="115" name="Google Shape;115;p18"/>
           <p:cNvSpPr txBox="1"/>
           <p:nvPr>
             <p:ph type="title"/>
@@ -14236,7 +15363,7 @@
       </p:sp>
       <p:sp>
         <p:nvSpPr>
-          <p:cNvPr id="110" name="Google Shape;110;p17"/>
+          <p:cNvPr id="116" name="Google Shape;116;p18"/>
           <p:cNvSpPr txBox="1"/>
           <p:nvPr>
             <p:ph idx="1" type="body"/>
@@ -14454,7 +15581,7 @@
       </p:sp>
       <p:grpSp>
         <p:nvGrpSpPr>
-          <p:cNvPr id="111" name="Google Shape;111;p17"/>
+          <p:cNvPr id="117" name="Google Shape;117;p18"/>
           <p:cNvGrpSpPr/>
           <p:nvPr/>
         </p:nvGrpSpPr>
@@ -14468,7 +15595,7 @@
         </p:grpSpPr>
         <p:pic>
           <p:nvPicPr>
-            <p:cNvPr id="112" name="Google Shape;112;p17"/>
+            <p:cNvPr id="118" name="Google Shape;118;p18"/>
             <p:cNvPicPr preferRelativeResize="0"/>
             <p:nvPr/>
           </p:nvPicPr>
@@ -14495,7 +15622,7 @@
         </p:pic>
         <p:sp>
           <p:nvSpPr>
-            <p:cNvPr id="113" name="Google Shape;113;p17"/>
+            <p:cNvPr id="119" name="Google Shape;119;p18"/>
             <p:cNvSpPr/>
             <p:nvPr/>
           </p:nvSpPr>
@@ -14553,7 +15680,7 @@
         </p:sp>
         <p:sp>
           <p:nvSpPr>
-            <p:cNvPr id="114" name="Google Shape;114;p17"/>
+            <p:cNvPr id="120" name="Google Shape;120;p18"/>
             <p:cNvSpPr/>
             <p:nvPr/>
           </p:nvSpPr>
@@ -14611,7 +15738,7 @@
         </p:sp>
         <p:sp>
           <p:nvSpPr>
-            <p:cNvPr id="115" name="Google Shape;115;p17"/>
+            <p:cNvPr id="121" name="Google Shape;121;p18"/>
             <p:cNvSpPr/>
             <p:nvPr/>
           </p:nvSpPr>
@@ -14669,7 +15796,7 @@
         </p:sp>
         <p:sp>
           <p:nvSpPr>
-            <p:cNvPr id="116" name="Google Shape;116;p17"/>
+            <p:cNvPr id="122" name="Google Shape;122;p18"/>
             <p:cNvSpPr/>
             <p:nvPr/>
           </p:nvSpPr>
@@ -14727,7 +15854,7 @@
         </p:sp>
         <p:sp>
           <p:nvSpPr>
-            <p:cNvPr id="117" name="Google Shape;117;p17"/>
+            <p:cNvPr id="123" name="Google Shape;123;p18"/>
             <p:cNvSpPr/>
             <p:nvPr/>
           </p:nvSpPr>
@@ -14785,7 +15912,7 @@
         </p:sp>
         <p:sp>
           <p:nvSpPr>
-            <p:cNvPr id="118" name="Google Shape;118;p17"/>
+            <p:cNvPr id="124" name="Google Shape;124;p18"/>
             <p:cNvSpPr/>
             <p:nvPr/>
           </p:nvSpPr>
@@ -14843,7 +15970,7 @@
         </p:sp>
         <p:sp>
           <p:nvSpPr>
-            <p:cNvPr id="119" name="Google Shape;119;p17"/>
+            <p:cNvPr id="125" name="Google Shape;125;p18"/>
             <p:cNvSpPr/>
             <p:nvPr/>
           </p:nvSpPr>
@@ -14901,7 +16028,7 @@
         </p:sp>
         <p:sp>
           <p:nvSpPr>
-            <p:cNvPr id="120" name="Google Shape;120;p17"/>
+            <p:cNvPr id="126" name="Google Shape;126;p18"/>
             <p:cNvSpPr/>
             <p:nvPr/>
           </p:nvSpPr>
@@ -14959,9 +16086,9 @@
         </p:sp>
         <p:cxnSp>
           <p:nvCxnSpPr>
-            <p:cNvPr id="121" name="Google Shape;121;p17"/>
+            <p:cNvPr id="127" name="Google Shape;127;p18"/>
             <p:cNvCxnSpPr>
-              <a:stCxn id="122" idx="6"/>
+              <a:stCxn id="128" idx="6"/>
             </p:cNvCxnSpPr>
             <p:nvPr/>
           </p:nvCxnSpPr>
@@ -14987,9 +16114,9 @@
         </p:cxnSp>
         <p:cxnSp>
           <p:nvCxnSpPr>
-            <p:cNvPr id="123" name="Google Shape;123;p17"/>
+            <p:cNvPr id="129" name="Google Shape;129;p18"/>
             <p:cNvCxnSpPr>
-              <a:stCxn id="122" idx="2"/>
+              <a:stCxn id="128" idx="2"/>
             </p:cNvCxnSpPr>
             <p:nvPr/>
           </p:nvCxnSpPr>
@@ -15015,7 +16142,7 @@
         </p:cxnSp>
         <p:sp>
           <p:nvSpPr>
-            <p:cNvPr id="122" name="Google Shape;122;p17"/>
+            <p:cNvPr id="128" name="Google Shape;128;p18"/>
             <p:cNvSpPr/>
             <p:nvPr/>
           </p:nvSpPr>
@@ -15080,12 +16207,12 @@
 </p:sld>
 </file>
 
-<file path=ppt/slides/slide6.xml><?xml version="1.0" encoding="utf-8"?>
+<file path=ppt/slides/slide7.xml><?xml version="1.0" encoding="utf-8"?>
 <p:sld xmlns:a="http://schemas.openxmlformats.org/drawingml/2006/main" xmlns:r="http://schemas.openxmlformats.org/officeDocument/2006/relationships" xmlns:mc="http://schemas.openxmlformats.org/markup-compatibility/2006" xmlns:mv="urn:schemas-microsoft-com:mac:vml" xmlns:p="http://schemas.openxmlformats.org/presentationml/2006/main" xmlns:c="http://schemas.openxmlformats.org/drawingml/2006/chart" xmlns:dgm="http://schemas.openxmlformats.org/drawingml/2006/diagram" xmlns:o="urn:schemas-microsoft-com:office:office" xmlns:v="urn:schemas-microsoft-com:vml" xmlns:pvml="urn:schemas-microsoft-com:office:powerpoint" xmlns:com="http://schemas.openxmlformats.org/drawingml/2006/compatibility" xmlns:p14="http://schemas.microsoft.com/office/powerpoint/2010/main" xmlns:p15="http://schemas.microsoft.com/office/powerpoint/2012/main" xmlns:ahyp="http://schemas.microsoft.com/office/drawing/2018/hyperlinkcolor">
   <p:cSld>
     <p:spTree>
       <p:nvGrpSpPr>
-        <p:cNvPr id="127" name="Shape 127"/>
+        <p:cNvPr id="133" name="Shape 133"/>
         <p:cNvGrpSpPr/>
         <p:nvPr/>
       </p:nvGrpSpPr>
@@ -15099,7 +16226,7 @@
       </p:grpSpPr>
       <p:sp>
         <p:nvSpPr>
-          <p:cNvPr id="128" name="Google Shape;128;p18"/>
+          <p:cNvPr id="134" name="Google Shape;134;p19"/>
           <p:cNvSpPr txBox="1"/>
           <p:nvPr>
             <p:ph type="title"/>
@@ -15160,7 +16287,7 @@
       </p:sp>
       <p:sp>
         <p:nvSpPr>
-          <p:cNvPr id="129" name="Google Shape;129;p18"/>
+          <p:cNvPr id="135" name="Google Shape;135;p19"/>
           <p:cNvSpPr txBox="1"/>
           <p:nvPr>
             <p:ph idx="1" type="body"/>
@@ -15181,7 +16308,7 @@
         </p:spPr>
         <p:txBody>
           <a:bodyPr anchorCtr="0" anchor="t" bIns="45700" lIns="91425" spcFirstLastPara="1" rIns="91425" wrap="square" tIns="45700">
-            <a:normAutofit/>
+            <a:normAutofit lnSpcReduction="20000"/>
           </a:bodyPr>
           <a:lstStyle/>
           <a:p>
@@ -15203,9 +16330,36 @@
             </a:pPr>
             <a:r>
               <a:rPr lang="en-US"/>
-              <a:t>Literal - : ``text`` or :literal:`text`</a:t>
-            </a:r>
-            <a:endParaRPr/>
+              <a:t>Literal - </a:t>
+            </a:r>
+            <a:r>
+              <a:rPr b="1" lang="en-US" sz="1800">
+                <a:latin typeface="Courier New"/>
+                <a:ea typeface="Courier New"/>
+                <a:cs typeface="Courier New"/>
+                <a:sym typeface="Courier New"/>
+              </a:rPr>
+              <a:t>``text``</a:t>
+            </a:r>
+            <a:r>
+              <a:rPr lang="en-US"/>
+              <a:t> or </a:t>
+            </a:r>
+            <a:r>
+              <a:rPr b="1" lang="en-US" sz="1800">
+                <a:latin typeface="Courier New"/>
+                <a:ea typeface="Courier New"/>
+                <a:cs typeface="Courier New"/>
+                <a:sym typeface="Courier New"/>
+              </a:rPr>
+              <a:t>:literal:`text`</a:t>
+            </a:r>
+            <a:endParaRPr b="1" sz="1800">
+              <a:latin typeface="Courier New"/>
+              <a:ea typeface="Courier New"/>
+              <a:cs typeface="Courier New"/>
+              <a:sym typeface="Courier New"/>
+            </a:endParaRPr>
           </a:p>
           <a:p>
             <a:pPr indent="-228600" lvl="0" marL="228600" rtl="0" algn="l">
@@ -15226,9 +16380,23 @@
             </a:pPr>
             <a:r>
               <a:rPr lang="en-US"/>
-              <a:t>Code - :code:``</a:t>
-            </a:r>
-            <a:endParaRPr/>
+              <a:t>Code - </a:t>
+            </a:r>
+            <a:r>
+              <a:rPr b="1" lang="en-US" sz="1800">
+                <a:latin typeface="Courier New"/>
+                <a:ea typeface="Courier New"/>
+                <a:cs typeface="Courier New"/>
+                <a:sym typeface="Courier New"/>
+              </a:rPr>
+              <a:t>:code:``</a:t>
+            </a:r>
+            <a:endParaRPr b="1" sz="1800">
+              <a:latin typeface="Courier New"/>
+              <a:ea typeface="Courier New"/>
+              <a:cs typeface="Courier New"/>
+              <a:sym typeface="Courier New"/>
+            </a:endParaRPr>
           </a:p>
           <a:p>
             <a:pPr indent="-228600" lvl="0" marL="228600" rtl="0" algn="l">
@@ -15249,9 +16417,23 @@
             </a:pPr>
             <a:r>
               <a:rPr lang="en-US"/>
-              <a:t>Math - :math:``</a:t>
-            </a:r>
-            <a:endParaRPr/>
+              <a:t>Math - </a:t>
+            </a:r>
+            <a:r>
+              <a:rPr b="1" lang="en-US" sz="1800">
+                <a:latin typeface="Courier New"/>
+                <a:ea typeface="Courier New"/>
+                <a:cs typeface="Courier New"/>
+                <a:sym typeface="Courier New"/>
+              </a:rPr>
+              <a:t>:math:``</a:t>
+            </a:r>
+            <a:endParaRPr b="1" sz="1800">
+              <a:latin typeface="Courier New"/>
+              <a:ea typeface="Courier New"/>
+              <a:cs typeface="Courier New"/>
+              <a:sym typeface="Courier New"/>
+            </a:endParaRPr>
           </a:p>
           <a:p>
             <a:pPr indent="-228600" lvl="0" marL="228600" rtl="0" algn="l">
@@ -15272,9 +16454,23 @@
             </a:pPr>
             <a:r>
               <a:rPr lang="en-US"/>
-              <a:t>Emphasis - :emphasis:``</a:t>
-            </a:r>
-            <a:endParaRPr/>
+              <a:t>Emphasis - </a:t>
+            </a:r>
+            <a:r>
+              <a:rPr b="1" lang="en-US" sz="1800">
+                <a:latin typeface="Courier New"/>
+                <a:ea typeface="Courier New"/>
+                <a:cs typeface="Courier New"/>
+                <a:sym typeface="Courier New"/>
+              </a:rPr>
+              <a:t>:emphasis:``</a:t>
+            </a:r>
+            <a:endParaRPr b="1" sz="1800">
+              <a:latin typeface="Courier New"/>
+              <a:ea typeface="Courier New"/>
+              <a:cs typeface="Courier New"/>
+              <a:sym typeface="Courier New"/>
+            </a:endParaRPr>
           </a:p>
           <a:p>
             <a:pPr indent="-228600" lvl="0" marL="228600" rtl="0" algn="l">
@@ -15295,9 +16491,23 @@
             </a:pPr>
             <a:r>
               <a:rPr lang="en-US"/>
-              <a:t>Strong - :strong:``</a:t>
-            </a:r>
-            <a:endParaRPr/>
+              <a:t>Strong - </a:t>
+            </a:r>
+            <a:r>
+              <a:rPr b="1" lang="en-US" sz="1800">
+                <a:latin typeface="Courier New"/>
+                <a:ea typeface="Courier New"/>
+                <a:cs typeface="Courier New"/>
+                <a:sym typeface="Courier New"/>
+              </a:rPr>
+              <a:t>:strong:``</a:t>
+            </a:r>
+            <a:endParaRPr b="1" sz="1800">
+              <a:latin typeface="Courier New"/>
+              <a:ea typeface="Courier New"/>
+              <a:cs typeface="Courier New"/>
+              <a:sym typeface="Courier New"/>
+            </a:endParaRPr>
           </a:p>
           <a:p>
             <a:pPr indent="-228600" lvl="0" marL="228600" rtl="0" algn="l">
@@ -15318,9 +16528,36 @@
             </a:pPr>
             <a:r>
               <a:rPr lang="en-US"/>
-              <a:t>Subscript/Superscript - :sub:`` or :sup:``</a:t>
-            </a:r>
-            <a:endParaRPr/>
+              <a:t>Subscript/Superscript - </a:t>
+            </a:r>
+            <a:r>
+              <a:rPr b="1" lang="en-US" sz="1800">
+                <a:latin typeface="Courier New"/>
+                <a:ea typeface="Courier New"/>
+                <a:cs typeface="Courier New"/>
+                <a:sym typeface="Courier New"/>
+              </a:rPr>
+              <a:t>:sub:``</a:t>
+            </a:r>
+            <a:r>
+              <a:rPr lang="en-US"/>
+              <a:t> and </a:t>
+            </a:r>
+            <a:r>
+              <a:rPr b="1" lang="en-US" sz="1800">
+                <a:latin typeface="Courier New"/>
+                <a:ea typeface="Courier New"/>
+                <a:cs typeface="Courier New"/>
+                <a:sym typeface="Courier New"/>
+              </a:rPr>
+              <a:t>:sup:``</a:t>
+            </a:r>
+            <a:endParaRPr b="1" sz="1800">
+              <a:latin typeface="Courier New"/>
+              <a:ea typeface="Courier New"/>
+              <a:cs typeface="Courier New"/>
+              <a:sym typeface="Courier New"/>
+            </a:endParaRPr>
           </a:p>
           <a:p>
             <a:pPr indent="-50800" lvl="0" marL="228600" rtl="0" algn="l">
@@ -15415,7 +16652,7 @@
       </p:sp>
       <p:pic>
         <p:nvPicPr>
-          <p:cNvPr id="130" name="Google Shape;130;p18"/>
+          <p:cNvPr id="136" name="Google Shape;136;p19"/>
           <p:cNvPicPr preferRelativeResize="0"/>
           <p:nvPr/>
         </p:nvPicPr>
@@ -15428,7 +16665,7 @@
         </p:blipFill>
         <p:spPr>
           <a:xfrm>
-            <a:off x="1896512" y="6060327"/>
+            <a:off x="1841562" y="5433877"/>
             <a:ext cx="3743847" cy="371527"/>
           </a:xfrm>
           <a:prstGeom prst="rect">
@@ -15442,14 +16679,14 @@
       </p:pic>
       <p:sp>
         <p:nvSpPr>
-          <p:cNvPr id="131" name="Google Shape;131;p18"/>
+          <p:cNvPr id="137" name="Google Shape;137;p19"/>
           <p:cNvSpPr txBox="1"/>
           <p:nvPr/>
         </p:nvSpPr>
         <p:spPr>
           <a:xfrm>
-            <a:off x="6012872" y="5855252"/>
-            <a:ext cx="4545875" cy="646331"/>
+            <a:off x="5968897" y="5433877"/>
+            <a:ext cx="4545900" cy="646500"/>
           </a:xfrm>
           <a:prstGeom prst="rect">
             <a:avLst/>
@@ -15532,12 +16769,12 @@
 </p:sld>
 </file>
 
-<file path=ppt/slides/slide7.xml><?xml version="1.0" encoding="utf-8"?>
+<file path=ppt/slides/slide8.xml><?xml version="1.0" encoding="utf-8"?>
 <p:sld xmlns:a="http://schemas.openxmlformats.org/drawingml/2006/main" xmlns:r="http://schemas.openxmlformats.org/officeDocument/2006/relationships" xmlns:mc="http://schemas.openxmlformats.org/markup-compatibility/2006" xmlns:mv="urn:schemas-microsoft-com:mac:vml" xmlns:p="http://schemas.openxmlformats.org/presentationml/2006/main" xmlns:c="http://schemas.openxmlformats.org/drawingml/2006/chart" xmlns:dgm="http://schemas.openxmlformats.org/drawingml/2006/diagram" xmlns:o="urn:schemas-microsoft-com:office:office" xmlns:v="urn:schemas-microsoft-com:vml" xmlns:pvml="urn:schemas-microsoft-com:office:powerpoint" xmlns:com="http://schemas.openxmlformats.org/drawingml/2006/compatibility" xmlns:p14="http://schemas.microsoft.com/office/powerpoint/2010/main" xmlns:p15="http://schemas.microsoft.com/office/powerpoint/2012/main" xmlns:ahyp="http://schemas.microsoft.com/office/drawing/2018/hyperlinkcolor">
   <p:cSld>
     <p:spTree>
       <p:nvGrpSpPr>
-        <p:cNvPr id="135" name="Shape 135"/>
+        <p:cNvPr id="141" name="Shape 141"/>
         <p:cNvGrpSpPr/>
         <p:nvPr/>
       </p:nvGrpSpPr>
@@ -15551,7 +16788,7 @@
       </p:grpSpPr>
       <p:sp>
         <p:nvSpPr>
-          <p:cNvPr id="136" name="Google Shape;136;p19"/>
+          <p:cNvPr id="142" name="Google Shape;142;p20"/>
           <p:cNvSpPr txBox="1"/>
           <p:nvPr>
             <p:ph type="title"/>
@@ -15612,7 +16849,7 @@
       </p:sp>
       <p:sp>
         <p:nvSpPr>
-          <p:cNvPr id="137" name="Google Shape;137;p19"/>
+          <p:cNvPr id="143" name="Google Shape;143;p20"/>
           <p:cNvSpPr txBox="1"/>
           <p:nvPr>
             <p:ph idx="1" type="body"/>
@@ -15633,34 +16870,147 @@
         </p:spPr>
         <p:txBody>
           <a:bodyPr anchorCtr="0" anchor="t" bIns="45700" lIns="91425" spcFirstLastPara="1" rIns="91425" wrap="square" tIns="45700">
-            <a:normAutofit/>
+            <a:normAutofit fontScale="92500" lnSpcReduction="20000"/>
           </a:bodyPr>
           <a:lstStyle/>
           <a:p>
-            <a:pPr indent="-228600" lvl="0" marL="228600" rtl="0" algn="l">
-              <a:lnSpc>
-                <a:spcPct val="90000"/>
-              </a:lnSpc>
-              <a:spcBef>
-                <a:spcPts val="0"/>
-              </a:spcBef>
-              <a:spcAft>
-                <a:spcPts val="0"/>
-              </a:spcAft>
-              <a:buClr>
-                <a:schemeClr val="dk1"/>
-              </a:buClr>
-              <a:buSzPts val="2800"/>
+            <a:pPr indent="-215265" lvl="0" marL="228600" rtl="0" algn="l">
+              <a:lnSpc>
+                <a:spcPct val="90000"/>
+              </a:lnSpc>
+              <a:spcBef>
+                <a:spcPts val="0"/>
+              </a:spcBef>
+              <a:spcAft>
+                <a:spcPts val="0"/>
+              </a:spcAft>
+              <a:buClr>
+                <a:schemeClr val="dk1"/>
+              </a:buClr>
+              <a:buSzPct val="155555"/>
               <a:buChar char="•"/>
             </a:pPr>
             <a:r>
               <a:rPr lang="en-US"/>
-              <a:t>Internal table of contents - .. contents::</a:t>
+              <a:t>Internal table of contents - .</a:t>
+            </a:r>
+            <a:r>
+              <a:rPr b="1" lang="en-US" sz="1800">
+                <a:latin typeface="Courier New"/>
+                <a:ea typeface="Courier New"/>
+                <a:cs typeface="Courier New"/>
+                <a:sym typeface="Courier New"/>
+              </a:rPr>
+              <a:t>. contents::</a:t>
+            </a:r>
+            <a:endParaRPr b="1" sz="1800">
+              <a:latin typeface="Courier New"/>
+              <a:ea typeface="Courier New"/>
+              <a:cs typeface="Courier New"/>
+              <a:sym typeface="Courier New"/>
+            </a:endParaRPr>
+          </a:p>
+          <a:p>
+            <a:pPr indent="-215265" lvl="0" marL="228600" rtl="0" algn="l">
+              <a:lnSpc>
+                <a:spcPct val="90000"/>
+              </a:lnSpc>
+              <a:spcBef>
+                <a:spcPts val="1000"/>
+              </a:spcBef>
+              <a:spcAft>
+                <a:spcPts val="0"/>
+              </a:spcAft>
+              <a:buClr>
+                <a:schemeClr val="dk1"/>
+              </a:buClr>
+              <a:buSzPct val="155555"/>
+              <a:buChar char="•"/>
+            </a:pPr>
+            <a:r>
+              <a:rPr lang="en-US"/>
+              <a:t>List Table - </a:t>
+            </a:r>
+            <a:r>
+              <a:rPr b="1" lang="en-US" sz="1800">
+                <a:latin typeface="Courier New"/>
+                <a:ea typeface="Courier New"/>
+                <a:cs typeface="Courier New"/>
+                <a:sym typeface="Courier New"/>
+              </a:rPr>
+              <a:t>.. list-table::</a:t>
+            </a:r>
+            <a:endParaRPr b="1" sz="1800">
+              <a:latin typeface="Courier New"/>
+              <a:ea typeface="Courier New"/>
+              <a:cs typeface="Courier New"/>
+              <a:sym typeface="Courier New"/>
+            </a:endParaRPr>
+          </a:p>
+          <a:p>
+            <a:pPr indent="-215265" lvl="0" marL="228600" rtl="0" algn="l">
+              <a:lnSpc>
+                <a:spcPct val="90000"/>
+              </a:lnSpc>
+              <a:spcBef>
+                <a:spcPts val="1000"/>
+              </a:spcBef>
+              <a:spcAft>
+                <a:spcPts val="0"/>
+              </a:spcAft>
+              <a:buClr>
+                <a:schemeClr val="dk1"/>
+              </a:buClr>
+              <a:buSzPct val="100000"/>
+              <a:buChar char="•"/>
+            </a:pPr>
+            <a:r>
+              <a:rPr lang="en-US"/>
+              <a:t>Notes, Warnings, and Cautions - </a:t>
+            </a:r>
+            <a:r>
+              <a:rPr b="1" lang="en-US" sz="1900">
+                <a:latin typeface="Courier New"/>
+                <a:ea typeface="Courier New"/>
+                <a:cs typeface="Courier New"/>
+                <a:sym typeface="Courier New"/>
+              </a:rPr>
+              <a:t>.. note::</a:t>
+            </a:r>
+            <a:r>
+              <a:rPr lang="en-US"/>
+              <a:t> or </a:t>
+            </a:r>
+            <a:r>
+              <a:rPr b="1" lang="en-US" sz="1900">
+                <a:latin typeface="Courier New"/>
+                <a:ea typeface="Courier New"/>
+                <a:cs typeface="Courier New"/>
+                <a:sym typeface="Courier New"/>
+              </a:rPr>
+              <a:t>.. warning::</a:t>
+            </a:r>
+            <a:r>
+              <a:rPr lang="en-US"/>
+              <a:t> or </a:t>
+            </a:r>
+            <a:r>
+              <a:rPr b="1" lang="en-US" sz="1900">
+                <a:latin typeface="Courier New"/>
+                <a:ea typeface="Courier New"/>
+                <a:cs typeface="Courier New"/>
+                <a:sym typeface="Courier New"/>
+              </a:rPr>
+              <a:t>.. caution::</a:t>
+            </a:r>
+            <a:r>
+              <a:rPr lang="en-US"/>
+              <a:t> </a:t>
             </a:r>
             <a:endParaRPr/>
           </a:p>
           <a:p>
-            <a:pPr indent="-228600" lvl="0" marL="228600" rtl="0" algn="l">
+            <a:pPr indent="-215265" lvl="0" marL="228600" rtl="0" algn="l">
               <a:lnSpc>
                 <a:spcPct val="90000"/>
               </a:lnSpc>
@@ -15673,17 +17023,44 @@
               <a:buClr>
                 <a:schemeClr val="dk1"/>
               </a:buClr>
-              <a:buSzPts val="2800"/>
+              <a:buSzPct val="147368"/>
               <a:buChar char="•"/>
             </a:pPr>
             <a:r>
               <a:rPr lang="en-US"/>
-              <a:t>List Table - .. list-table::</a:t>
-            </a:r>
-            <a:endParaRPr/>
+              <a:t>Images and Figures - </a:t>
+            </a:r>
+            <a:r>
+              <a:rPr b="1" lang="en-US" sz="1900">
+                <a:latin typeface="Courier New"/>
+                <a:ea typeface="Courier New"/>
+                <a:cs typeface="Courier New"/>
+                <a:sym typeface="Courier New"/>
+              </a:rPr>
+              <a:t>.. image::</a:t>
+            </a:r>
+            <a:r>
+              <a:rPr lang="en-US"/>
+              <a:t> or </a:t>
+            </a:r>
+            <a:r>
+              <a:rPr b="1" lang="en-US" sz="1900">
+                <a:latin typeface="Courier New"/>
+                <a:ea typeface="Courier New"/>
+                <a:cs typeface="Courier New"/>
+                <a:sym typeface="Courier New"/>
+              </a:rPr>
+              <a:t>.. figure::</a:t>
+            </a:r>
+            <a:endParaRPr b="1" sz="1900">
+              <a:latin typeface="Courier New"/>
+              <a:ea typeface="Courier New"/>
+              <a:cs typeface="Courier New"/>
+              <a:sym typeface="Courier New"/>
+            </a:endParaRPr>
           </a:p>
           <a:p>
-            <a:pPr indent="-228600" lvl="0" marL="228600" rtl="0" algn="l">
+            <a:pPr indent="-215265" lvl="0" marL="228600" rtl="0" algn="l">
               <a:lnSpc>
                 <a:spcPct val="90000"/>
               </a:lnSpc>
@@ -15696,58 +17073,38 @@
               <a:buClr>
                 <a:schemeClr val="dk1"/>
               </a:buClr>
-              <a:buSzPts val="2800"/>
+              <a:buSzPct val="100000"/>
               <a:buChar char="•"/>
             </a:pPr>
             <a:r>
               <a:rPr lang="en-US"/>
-              <a:t>Notes, Warnings, and Cautions - .. note:: or .. warning:: or .. caution:: </a:t>
-            </a:r>
-            <a:endParaRPr/>
-          </a:p>
-          <a:p>
-            <a:pPr indent="-228600" lvl="0" marL="228600" rtl="0" algn="l">
-              <a:lnSpc>
-                <a:spcPct val="90000"/>
-              </a:lnSpc>
-              <a:spcBef>
-                <a:spcPts val="1000"/>
-              </a:spcBef>
-              <a:spcAft>
-                <a:spcPts val="0"/>
-              </a:spcAft>
-              <a:buClr>
-                <a:schemeClr val="dk1"/>
-              </a:buClr>
-              <a:buSzPts val="2800"/>
-              <a:buChar char="•"/>
-            </a:pPr>
+              <a:t>Code blocks - </a:t>
+            </a:r>
+            <a:r>
+              <a:rPr b="1" lang="en-US" sz="1900">
+                <a:latin typeface="Courier New"/>
+                <a:ea typeface="Courier New"/>
+                <a:cs typeface="Courier New"/>
+                <a:sym typeface="Courier New"/>
+              </a:rPr>
+              <a:t>.. code::</a:t>
+            </a:r>
             <a:r>
               <a:rPr lang="en-US"/>
-              <a:t>Images and Figures - .. image:: or .. figure::</a:t>
-            </a:r>
-            <a:endParaRPr/>
-          </a:p>
-          <a:p>
-            <a:pPr indent="-228600" lvl="0" marL="228600" rtl="0" algn="l">
-              <a:lnSpc>
-                <a:spcPct val="90000"/>
-              </a:lnSpc>
-              <a:spcBef>
-                <a:spcPts val="1000"/>
-              </a:spcBef>
-              <a:spcAft>
-                <a:spcPts val="0"/>
-              </a:spcAft>
-              <a:buClr>
-                <a:schemeClr val="dk1"/>
-              </a:buClr>
-              <a:buSzPts val="2800"/>
-              <a:buChar char="•"/>
-            </a:pPr>
+              <a:t> or </a:t>
+            </a:r>
+            <a:r>
+              <a:rPr b="1" lang="en-US" sz="1900">
+                <a:latin typeface="Courier New"/>
+                <a:ea typeface="Courier New"/>
+                <a:cs typeface="Courier New"/>
+                <a:sym typeface="Courier New"/>
+              </a:rPr>
+              <a:t>.. code-block::</a:t>
+            </a:r>
             <a:r>
               <a:rPr lang="en-US"/>
-              <a:t>Code blocks - .. code:: or .. code-block:: </a:t>
+              <a:t> </a:t>
             </a:r>
             <a:endParaRPr/>
           </a:p>
@@ -15765,7 +17122,7 @@
               <a:buClr>
                 <a:schemeClr val="dk1"/>
               </a:buClr>
-              <a:buSzPts val="2800"/>
+              <a:buSzPct val="100000"/>
               <a:buNone/>
             </a:pPr>
             <a:r>
@@ -15787,7 +17144,7 @@
               <a:buClr>
                 <a:schemeClr val="dk1"/>
               </a:buClr>
-              <a:buSzPts val="2800"/>
+              <a:buSzPct val="100000"/>
               <a:buNone/>
             </a:pPr>
             <a:r>
@@ -15810,7 +17167,7 @@
               <a:buClr>
                 <a:schemeClr val="dk1"/>
               </a:buClr>
-              <a:buSzPts val="2800"/>
+              <a:buSzPct val="100000"/>
               <a:buNone/>
             </a:pPr>
             <a:r>
@@ -15832,7 +17189,7 @@
               <a:buClr>
                 <a:schemeClr val="dk1"/>
               </a:buClr>
-              <a:buSzPts val="2800"/>
+              <a:buSzPct val="100000"/>
               <a:buNone/>
             </a:pPr>
             <a:r>
@@ -15854,7 +17211,7 @@
               <a:buClr>
                 <a:schemeClr val="dk1"/>
               </a:buClr>
-              <a:buSzPts val="2800"/>
+              <a:buSzPct val="100000"/>
               <a:buNone/>
             </a:pPr>
             <a:r>
@@ -15866,7 +17223,7 @@
       </p:sp>
       <p:pic>
         <p:nvPicPr>
-          <p:cNvPr id="138" name="Google Shape;138;p19"/>
+          <p:cNvPr id="144" name="Google Shape;144;p20"/>
           <p:cNvPicPr preferRelativeResize="0"/>
           <p:nvPr/>
         </p:nvPicPr>
@@ -15879,7 +17236,7 @@
         </p:blipFill>
         <p:spPr>
           <a:xfrm>
-            <a:off x="2468704" y="5025137"/>
+            <a:off x="2183329" y="4496100"/>
             <a:ext cx="4467849" cy="1667108"/>
           </a:xfrm>
           <a:prstGeom prst="rect">
@@ -15893,9 +17250,9 @@
       </p:pic>
       <p:cxnSp>
         <p:nvCxnSpPr>
-          <p:cNvPr id="139" name="Google Shape;139;p19"/>
+          <p:cNvPr id="145" name="Google Shape;145;p20"/>
           <p:cNvCxnSpPr>
-            <a:stCxn id="140" idx="6"/>
+            <a:stCxn id="146" idx="6"/>
           </p:cNvCxnSpPr>
           <p:nvPr/>
         </p:nvCxnSpPr>
@@ -15921,7 +17278,7 @@
       </p:cxnSp>
       <p:cxnSp>
         <p:nvCxnSpPr>
-          <p:cNvPr id="141" name="Google Shape;141;p19"/>
+          <p:cNvPr id="147" name="Google Shape;147;p20"/>
           <p:cNvCxnSpPr/>
           <p:nvPr/>
         </p:nvCxnSpPr>
@@ -15947,7 +17304,7 @@
       </p:cxnSp>
       <p:cxnSp>
         <p:nvCxnSpPr>
-          <p:cNvPr id="142" name="Google Shape;142;p19"/>
+          <p:cNvPr id="148" name="Google Shape;148;p20"/>
           <p:cNvCxnSpPr/>
           <p:nvPr/>
         </p:nvCxnSpPr>
@@ -15973,7 +17330,7 @@
       </p:cxnSp>
       <p:sp>
         <p:nvSpPr>
-          <p:cNvPr id="143" name="Google Shape;143;p19"/>
+          <p:cNvPr id="149" name="Google Shape;149;p20"/>
           <p:cNvSpPr/>
           <p:nvPr/>
         </p:nvSpPr>
@@ -16031,7 +17388,7 @@
       </p:sp>
       <p:sp>
         <p:nvSpPr>
-          <p:cNvPr id="144" name="Google Shape;144;p19"/>
+          <p:cNvPr id="150" name="Google Shape;150;p20"/>
           <p:cNvSpPr/>
           <p:nvPr/>
         </p:nvSpPr>
@@ -16089,7 +17446,7 @@
       </p:sp>
       <p:sp>
         <p:nvSpPr>
-          <p:cNvPr id="140" name="Google Shape;140;p19"/>
+          <p:cNvPr id="146" name="Google Shape;146;p20"/>
           <p:cNvSpPr/>
           <p:nvPr/>
         </p:nvSpPr>
@@ -16147,14 +17504,14 @@
       </p:sp>
       <p:sp>
         <p:nvSpPr>
-          <p:cNvPr id="145" name="Google Shape;145;p19"/>
+          <p:cNvPr id="151" name="Google Shape;151;p20"/>
           <p:cNvSpPr txBox="1"/>
           <p:nvPr/>
         </p:nvSpPr>
         <p:spPr>
           <a:xfrm>
-            <a:off x="7350034" y="5025137"/>
-            <a:ext cx="4545875" cy="923330"/>
+            <a:off x="7314284" y="4563462"/>
+            <a:ext cx="4545900" cy="923400"/>
           </a:xfrm>
           <a:prstGeom prst="rect">
             <a:avLst/>
@@ -16260,9 +17617,9 @@
       </p:sp>
       <p:cxnSp>
         <p:nvCxnSpPr>
-          <p:cNvPr id="146" name="Google Shape;146;p19"/>
+          <p:cNvPr id="152" name="Google Shape;152;p20"/>
           <p:cNvCxnSpPr>
-            <a:stCxn id="140" idx="6"/>
+            <a:stCxn id="146" idx="6"/>
           </p:cNvCxnSpPr>
           <p:nvPr/>
         </p:nvCxnSpPr>
@@ -16286,183 +17643,6 @@
           </a:ln>
         </p:spPr>
       </p:cxnSp>
-    </p:spTree>
-  </p:cSld>
-  <p:clrMapOvr>
-    <a:masterClrMapping/>
-  </p:clrMapOvr>
-</p:sld>
-</file>
-
-<file path=ppt/slides/slide8.xml><?xml version="1.0" encoding="utf-8"?>
-<p:sld xmlns:a="http://schemas.openxmlformats.org/drawingml/2006/main" xmlns:r="http://schemas.openxmlformats.org/officeDocument/2006/relationships" xmlns:mc="http://schemas.openxmlformats.org/markup-compatibility/2006" xmlns:mv="urn:schemas-microsoft-com:mac:vml" xmlns:p="http://schemas.openxmlformats.org/presentationml/2006/main" xmlns:c="http://schemas.openxmlformats.org/drawingml/2006/chart" xmlns:dgm="http://schemas.openxmlformats.org/drawingml/2006/diagram" xmlns:o="urn:schemas-microsoft-com:office:office" xmlns:v="urn:schemas-microsoft-com:vml" xmlns:pvml="urn:schemas-microsoft-com:office:powerpoint" xmlns:com="http://schemas.openxmlformats.org/drawingml/2006/compatibility" xmlns:p14="http://schemas.microsoft.com/office/powerpoint/2010/main" xmlns:p15="http://schemas.microsoft.com/office/powerpoint/2012/main" xmlns:ahyp="http://schemas.microsoft.com/office/drawing/2018/hyperlinkcolor">
-  <p:cSld>
-    <p:spTree>
-      <p:nvGrpSpPr>
-        <p:cNvPr id="150" name="Shape 150"/>
-        <p:cNvGrpSpPr/>
-        <p:nvPr/>
-      </p:nvGrpSpPr>
-      <p:grpSpPr>
-        <a:xfrm>
-          <a:off x="0" y="0"/>
-          <a:ext cx="0" cy="0"/>
-          <a:chOff x="0" y="0"/>
-          <a:chExt cx="0" cy="0"/>
-        </a:xfrm>
-      </p:grpSpPr>
-      <p:sp>
-        <p:nvSpPr>
-          <p:cNvPr id="151" name="Google Shape;151;p20"/>
-          <p:cNvSpPr txBox="1"/>
-          <p:nvPr>
-            <p:ph type="title"/>
-          </p:nvPr>
-        </p:nvSpPr>
-        <p:spPr>
-          <a:xfrm>
-            <a:off x="838200" y="365125"/>
-            <a:ext cx="10515600" cy="1325563"/>
-          </a:xfrm>
-          <a:prstGeom prst="rect">
-            <a:avLst/>
-          </a:prstGeom>
-          <a:noFill/>
-          <a:ln>
-            <a:noFill/>
-          </a:ln>
-        </p:spPr>
-        <p:txBody>
-          <a:bodyPr anchorCtr="0" anchor="ctr" bIns="45700" lIns="91425" spcFirstLastPara="1" rIns="91425" wrap="square" tIns="45700">
-            <a:normAutofit/>
-          </a:bodyPr>
-          <a:lstStyle/>
-          <a:p>
-            <a:pPr indent="0" lvl="0" marL="0" rtl="0" algn="l">
-              <a:lnSpc>
-                <a:spcPct val="90000"/>
-              </a:lnSpc>
-              <a:spcBef>
-                <a:spcPts val="0"/>
-              </a:spcBef>
-              <a:spcAft>
-                <a:spcPts val="0"/>
-              </a:spcAft>
-              <a:buClr>
-                <a:schemeClr val="dk1"/>
-              </a:buClr>
-              <a:buSzPts val="4400"/>
-              <a:buFont typeface="Calibri"/>
-              <a:buNone/>
-            </a:pPr>
-            <a:r>
-              <a:rPr lang="en-US"/>
-              <a:t>Create your own version</a:t>
-            </a:r>
-            <a:endParaRPr/>
-          </a:p>
-        </p:txBody>
-      </p:sp>
-      <p:sp>
-        <p:nvSpPr>
-          <p:cNvPr id="152" name="Google Shape;152;p20"/>
-          <p:cNvSpPr txBox="1"/>
-          <p:nvPr>
-            <p:ph idx="1" type="body"/>
-          </p:nvPr>
-        </p:nvSpPr>
-        <p:spPr>
-          <a:xfrm>
-            <a:off x="838200" y="1825625"/>
-            <a:ext cx="10515600" cy="4351338"/>
-          </a:xfrm>
-          <a:prstGeom prst="rect">
-            <a:avLst/>
-          </a:prstGeom>
-          <a:noFill/>
-          <a:ln>
-            <a:noFill/>
-          </a:ln>
-        </p:spPr>
-        <p:txBody>
-          <a:bodyPr anchorCtr="0" anchor="t" bIns="45700" lIns="91425" spcFirstLastPara="1" rIns="91425" wrap="square" tIns="45700">
-            <a:normAutofit/>
-          </a:bodyPr>
-          <a:lstStyle/>
-          <a:p>
-            <a:pPr indent="-514350" lvl="0" marL="514350" rtl="0" algn="l">
-              <a:lnSpc>
-                <a:spcPct val="90000"/>
-              </a:lnSpc>
-              <a:spcBef>
-                <a:spcPts val="0"/>
-              </a:spcBef>
-              <a:spcAft>
-                <a:spcPts val="0"/>
-              </a:spcAft>
-              <a:buClr>
-                <a:schemeClr val="dk1"/>
-              </a:buClr>
-              <a:buSzPts val="2800"/>
-              <a:buFont typeface="Calibri"/>
-              <a:buAutoNum type="arabicPeriod"/>
-            </a:pPr>
-            <a:r>
-              <a:rPr lang="en-US"/>
-              <a:t>Use the example file (ktp-adv.rst) as a template to share some information about yourself.</a:t>
-            </a:r>
-            <a:endParaRPr/>
-          </a:p>
-          <a:p>
-            <a:pPr indent="-514350" lvl="0" marL="514350" rtl="0" algn="l">
-              <a:lnSpc>
-                <a:spcPct val="90000"/>
-              </a:lnSpc>
-              <a:spcBef>
-                <a:spcPts val="1000"/>
-              </a:spcBef>
-              <a:spcAft>
-                <a:spcPts val="0"/>
-              </a:spcAft>
-              <a:buClr>
-                <a:schemeClr val="dk1"/>
-              </a:buClr>
-              <a:buSzPts val="2800"/>
-              <a:buFont typeface="Calibri"/>
-              <a:buAutoNum type="arabicPeriod"/>
-            </a:pPr>
-            <a:r>
-              <a:rPr lang="en-US"/>
-              <a:t>Rename the file using your initials or your name.</a:t>
-            </a:r>
-            <a:endParaRPr/>
-          </a:p>
-          <a:p>
-            <a:pPr indent="-514350" lvl="0" marL="514350" rtl="0" algn="l">
-              <a:lnSpc>
-                <a:spcPct val="90000"/>
-              </a:lnSpc>
-              <a:spcBef>
-                <a:spcPts val="1000"/>
-              </a:spcBef>
-              <a:spcAft>
-                <a:spcPts val="0"/>
-              </a:spcAft>
-              <a:buClr>
-                <a:schemeClr val="dk1"/>
-              </a:buClr>
-              <a:buSzPts val="2800"/>
-              <a:buFont typeface="Calibri"/>
-              <a:buAutoNum type="arabicPeriod"/>
-            </a:pPr>
-            <a:r>
-              <a:rPr lang="en-US"/>
-              <a:t>Send it to me via email. Don’t forget to send your image file too, if you used one.</a:t>
-            </a:r>
-            <a:endParaRPr/>
-          </a:p>
-        </p:txBody>
-      </p:sp>
     </p:spTree>
   </p:cSld>
   <p:clrMapOvr>
@@ -16534,7 +17714,7 @@
             </a:pPr>
             <a:r>
               <a:rPr lang="en-US"/>
-              <a:t>Sphinx</a:t>
+              <a:t>Create your own version</a:t>
             </a:r>
             <a:endParaRPr/>
           </a:p>
@@ -16563,43 +17743,48 @@
         </p:spPr>
         <p:txBody>
           <a:bodyPr anchorCtr="0" anchor="t" bIns="45700" lIns="91425" spcFirstLastPara="1" rIns="91425" wrap="square" tIns="45700">
-            <a:normAutofit fontScale="92500" lnSpcReduction="10000"/>
+            <a:normAutofit/>
           </a:bodyPr>
           <a:lstStyle/>
           <a:p>
-            <a:pPr indent="0" lvl="0" marL="0" rtl="0" algn="l">
-              <a:lnSpc>
-                <a:spcPct val="90000"/>
-              </a:lnSpc>
-              <a:spcBef>
-                <a:spcPts val="0"/>
-              </a:spcBef>
-              <a:spcAft>
-                <a:spcPts val="0"/>
-              </a:spcAft>
-              <a:buClr>
-                <a:schemeClr val="dk1"/>
-              </a:buClr>
-              <a:buSzPct val="100000"/>
-              <a:buNone/>
+            <a:pPr indent="-514350" lvl="0" marL="514350" rtl="0" algn="l">
+              <a:lnSpc>
+                <a:spcPct val="90000"/>
+              </a:lnSpc>
+              <a:spcBef>
+                <a:spcPts val="0"/>
+              </a:spcBef>
+              <a:spcAft>
+                <a:spcPts val="0"/>
+              </a:spcAft>
+              <a:buClr>
+                <a:schemeClr val="dk1"/>
+              </a:buClr>
+              <a:buSzPts val="2800"/>
+              <a:buFont typeface="Calibri"/>
+              <a:buAutoNum type="arabicPeriod"/>
             </a:pPr>
             <a:r>
-              <a:rPr lang="en-US" u="sng">
-                <a:solidFill>
-                  <a:schemeClr val="hlink"/>
-                </a:solidFill>
-                <a:hlinkClick r:id="rId3"/>
+              <a:rPr lang="en-US"/>
+              <a:t>Use the example file (</a:t>
+            </a:r>
+            <a:r>
+              <a:rPr b="1" lang="en-US" sz="1800">
+                <a:latin typeface="Courier New"/>
+                <a:ea typeface="Courier New"/>
+                <a:cs typeface="Courier New"/>
+                <a:sym typeface="Courier New"/>
               </a:rPr>
-              <a:t>Sphinx</a:t>
+              <a:t>ktp-adv.rst</a:t>
             </a:r>
             <a:r>
               <a:rPr lang="en-US"/>
-              <a:t> is an open-source documentation generation framework that uses reStructureText as its source. </a:t>
+              <a:t>) as a template to share some information about yourself.</a:t>
             </a:r>
             <a:endParaRPr/>
           </a:p>
           <a:p>
-            <a:pPr indent="0" lvl="0" marL="0" rtl="0" algn="l">
+            <a:pPr indent="-514350" lvl="0" marL="514350" rtl="0" algn="l">
               <a:lnSpc>
                 <a:spcPct val="90000"/>
               </a:lnSpc>
@@ -16612,16 +17797,18 @@
               <a:buClr>
                 <a:schemeClr val="dk1"/>
               </a:buClr>
-              <a:buSzPct val="100000"/>
-              <a:buNone/>
+              <a:buSzPts val="2800"/>
+              <a:buFont typeface="Calibri"/>
+              <a:buAutoNum type="arabicPeriod"/>
             </a:pPr>
             <a:r>
-              <a:t/>
+              <a:rPr lang="en-US"/>
+              <a:t>Rename the file using your initials or your name.</a:t>
             </a:r>
             <a:endParaRPr/>
           </a:p>
           <a:p>
-            <a:pPr indent="0" lvl="0" marL="0" rtl="0" algn="l">
+            <a:pPr indent="-514350" lvl="0" marL="514350" rtl="0" algn="l">
               <a:lnSpc>
                 <a:spcPct val="90000"/>
               </a:lnSpc>
@@ -16634,140 +17821,13 @@
               <a:buClr>
                 <a:schemeClr val="dk1"/>
               </a:buClr>
-              <a:buSzPct val="100000"/>
-              <a:buNone/>
+              <a:buSzPts val="2800"/>
+              <a:buFont typeface="Calibri"/>
+              <a:buAutoNum type="arabicPeriod"/>
             </a:pPr>
             <a:r>
               <a:rPr lang="en-US"/>
-              <a:t>It was originally developed to create documentation for the Python programming language and is written in Python.</a:t>
-            </a:r>
-            <a:endParaRPr/>
-          </a:p>
-          <a:p>
-            <a:pPr indent="0" lvl="0" marL="0" rtl="0" algn="l">
-              <a:lnSpc>
-                <a:spcPct val="90000"/>
-              </a:lnSpc>
-              <a:spcBef>
-                <a:spcPts val="1000"/>
-              </a:spcBef>
-              <a:spcAft>
-                <a:spcPts val="0"/>
-              </a:spcAft>
-              <a:buClr>
-                <a:schemeClr val="dk1"/>
-              </a:buClr>
-              <a:buSzPct val="100000"/>
-              <a:buNone/>
-            </a:pPr>
-            <a:r>
-              <a:t/>
-            </a:r>
-            <a:endParaRPr/>
-          </a:p>
-          <a:p>
-            <a:pPr indent="0" lvl="0" marL="0" rtl="0" algn="l">
-              <a:lnSpc>
-                <a:spcPct val="90000"/>
-              </a:lnSpc>
-              <a:spcBef>
-                <a:spcPts val="1000"/>
-              </a:spcBef>
-              <a:spcAft>
-                <a:spcPts val="0"/>
-              </a:spcAft>
-              <a:buClr>
-                <a:schemeClr val="dk1"/>
-              </a:buClr>
-              <a:buSzPct val="100000"/>
-              <a:buNone/>
-            </a:pPr>
-            <a:r>
-              <a:rPr lang="en-US"/>
-              <a:t>It can combine any number of reST files into a single document set. Sphinx markup is a superset of reStructuredText, defining new </a:t>
-            </a:r>
-            <a:r>
-              <a:rPr b="1" lang="en-US"/>
-              <a:t>directives</a:t>
-            </a:r>
-            <a:r>
-              <a:rPr lang="en-US"/>
-              <a:t> and </a:t>
-            </a:r>
-            <a:r>
-              <a:rPr b="1" lang="en-US"/>
-              <a:t>roles</a:t>
-            </a:r>
-            <a:r>
-              <a:rPr lang="en-US"/>
-              <a:t>. </a:t>
-            </a:r>
-            <a:endParaRPr/>
-          </a:p>
-          <a:p>
-            <a:pPr indent="0" lvl="0" marL="0" rtl="0" algn="l">
-              <a:lnSpc>
-                <a:spcPct val="90000"/>
-              </a:lnSpc>
-              <a:spcBef>
-                <a:spcPts val="1000"/>
-              </a:spcBef>
-              <a:spcAft>
-                <a:spcPts val="0"/>
-              </a:spcAft>
-              <a:buClr>
-                <a:schemeClr val="dk1"/>
-              </a:buClr>
-              <a:buSzPct val="100000"/>
-              <a:buNone/>
-            </a:pPr>
-            <a:r>
-              <a:t/>
-            </a:r>
-            <a:endParaRPr/>
-          </a:p>
-          <a:p>
-            <a:pPr indent="0" lvl="0" marL="0" rtl="0" algn="l">
-              <a:lnSpc>
-                <a:spcPct val="90000"/>
-              </a:lnSpc>
-              <a:spcBef>
-                <a:spcPts val="1000"/>
-              </a:spcBef>
-              <a:spcAft>
-                <a:spcPts val="0"/>
-              </a:spcAft>
-              <a:buClr>
-                <a:schemeClr val="dk1"/>
-              </a:buClr>
-              <a:buSzPct val="100000"/>
-              <a:buNone/>
-            </a:pPr>
-            <a:r>
-              <a:rPr lang="en-US"/>
-              <a:t>Sphinx makes it easy to customize the look and feel of the static HTML output.</a:t>
-            </a:r>
-            <a:endParaRPr/>
-          </a:p>
-          <a:p>
-            <a:pPr indent="0" lvl="0" marL="0" rtl="0" algn="l">
-              <a:lnSpc>
-                <a:spcPct val="90000"/>
-              </a:lnSpc>
-              <a:spcBef>
-                <a:spcPts val="1000"/>
-              </a:spcBef>
-              <a:spcAft>
-                <a:spcPts val="0"/>
-              </a:spcAft>
-              <a:buClr>
-                <a:schemeClr val="dk1"/>
-              </a:buClr>
-              <a:buSzPct val="100000"/>
-              <a:buNone/>
-            </a:pPr>
-            <a:r>
-              <a:t/>
+              <a:t>Send it to me via email. Don’t forget to send your image file too, if you used one.</a:t>
             </a:r>
             <a:endParaRPr/>
           </a:p>

</xml_diff>